<commit_message>
Update Drug Review presentation.pptx
</commit_message>
<xml_diff>
--- a/Plots/Drug Review presentation.pptx
+++ b/Plots/Drug Review presentation.pptx
@@ -137,15 +137,15 @@
 </file>
 
 <file path=ppt/diagrams/colors1.xml><?xml version="1.0" encoding="utf-8"?>
-<dgm:colorsDef xmlns:dgm="http://schemas.openxmlformats.org/drawingml/2006/diagram" xmlns:a="http://schemas.openxmlformats.org/drawingml/2006/main" uniqueId="urn:microsoft.com/office/officeart/2005/8/colors/accent1_2">
+<dgm:colorsDef xmlns:dgm="http://schemas.openxmlformats.org/drawingml/2006/diagram" xmlns:a="http://schemas.openxmlformats.org/drawingml/2006/main" uniqueId="urn:microsoft.com/office/officeart/2005/8/colors/colorful5">
   <dgm:title val=""/>
   <dgm:desc val=""/>
   <dgm:catLst>
-    <dgm:cat type="accent1" pri="11200"/>
+    <dgm:cat type="colorful" pri="10500"/>
   </dgm:catLst>
   <dgm:styleLbl name="node0">
     <dgm:fillClrLst meth="repeat">
-      <a:schemeClr val="accent1"/>
+      <a:schemeClr val="accent4"/>
     </dgm:fillClrLst>
     <dgm:linClrLst meth="repeat">
       <a:schemeClr val="lt1"/>
@@ -155,21 +155,10 @@
     <dgm:txFillClrLst/>
     <dgm:txEffectClrLst/>
   </dgm:styleLbl>
-  <dgm:styleLbl name="alignNode1">
-    <dgm:fillClrLst meth="repeat">
-      <a:schemeClr val="accent1"/>
-    </dgm:fillClrLst>
-    <dgm:linClrLst meth="repeat">
-      <a:schemeClr val="accent1"/>
-    </dgm:linClrLst>
-    <dgm:effectClrLst/>
-    <dgm:txLinClrLst/>
-    <dgm:txFillClrLst/>
-    <dgm:txEffectClrLst/>
-  </dgm:styleLbl>
   <dgm:styleLbl name="node1">
-    <dgm:fillClrLst meth="repeat">
-      <a:schemeClr val="accent1"/>
+    <dgm:fillClrLst>
+      <a:schemeClr val="accent5"/>
+      <a:schemeClr val="accent6"/>
     </dgm:fillClrLst>
     <dgm:linClrLst meth="repeat">
       <a:schemeClr val="lt1"/>
@@ -179,9 +168,24 @@
     <dgm:txFillClrLst/>
     <dgm:txEffectClrLst/>
   </dgm:styleLbl>
+  <dgm:styleLbl name="alignNode1">
+    <dgm:fillClrLst>
+      <a:schemeClr val="accent5"/>
+      <a:schemeClr val="accent6"/>
+    </dgm:fillClrLst>
+    <dgm:linClrLst>
+      <a:schemeClr val="accent5"/>
+      <a:schemeClr val="accent6"/>
+    </dgm:linClrLst>
+    <dgm:effectClrLst/>
+    <dgm:txLinClrLst/>
+    <dgm:txFillClrLst/>
+    <dgm:txEffectClrLst/>
+  </dgm:styleLbl>
   <dgm:styleLbl name="lnNode1">
-    <dgm:fillClrLst meth="repeat">
-      <a:schemeClr val="accent1"/>
+    <dgm:fillClrLst>
+      <a:schemeClr val="accent5"/>
+      <a:schemeClr val="accent6"/>
     </dgm:fillClrLst>
     <dgm:linClrLst meth="repeat">
       <a:schemeClr val="lt1"/>
@@ -192,8 +196,11 @@
     <dgm:txEffectClrLst/>
   </dgm:styleLbl>
   <dgm:styleLbl name="vennNode1">
-    <dgm:fillClrLst meth="repeat">
-      <a:schemeClr val="accent1">
+    <dgm:fillClrLst>
+      <a:schemeClr val="accent5">
+        <a:alpha val="50000"/>
+      </a:schemeClr>
+      <a:schemeClr val="accent6">
         <a:alpha val="50000"/>
       </a:schemeClr>
     </dgm:fillClrLst>
@@ -206,7 +213,19 @@
     <dgm:txEffectClrLst/>
   </dgm:styleLbl>
   <dgm:styleLbl name="node2">
-    <dgm:fillClrLst meth="repeat">
+    <dgm:fillClrLst>
+      <a:schemeClr val="accent6"/>
+    </dgm:fillClrLst>
+    <dgm:linClrLst meth="repeat">
+      <a:schemeClr val="lt1"/>
+    </dgm:linClrLst>
+    <dgm:effectClrLst/>
+    <dgm:txLinClrLst/>
+    <dgm:txFillClrLst/>
+    <dgm:txEffectClrLst/>
+  </dgm:styleLbl>
+  <dgm:styleLbl name="node3">
+    <dgm:fillClrLst>
       <a:schemeClr val="accent1"/>
     </dgm:fillClrLst>
     <dgm:linClrLst meth="repeat">
@@ -217,9 +236,9 @@
     <dgm:txFillClrLst/>
     <dgm:txEffectClrLst/>
   </dgm:styleLbl>
-  <dgm:styleLbl name="node3">
-    <dgm:fillClrLst meth="repeat">
-      <a:schemeClr val="accent1"/>
+  <dgm:styleLbl name="node4">
+    <dgm:fillClrLst>
+      <a:schemeClr val="accent2"/>
     </dgm:fillClrLst>
     <dgm:linClrLst meth="repeat">
       <a:schemeClr val="lt1"/>
@@ -229,21 +248,12 @@
     <dgm:txFillClrLst/>
     <dgm:txEffectClrLst/>
   </dgm:styleLbl>
-  <dgm:styleLbl name="node4">
-    <dgm:fillClrLst meth="repeat">
-      <a:schemeClr val="accent1"/>
-    </dgm:fillClrLst>
-    <dgm:linClrLst meth="repeat">
-      <a:schemeClr val="lt1"/>
-    </dgm:linClrLst>
-    <dgm:effectClrLst/>
-    <dgm:txLinClrLst/>
-    <dgm:txFillClrLst/>
-    <dgm:txEffectClrLst/>
-  </dgm:styleLbl>
   <dgm:styleLbl name="fgImgPlace1">
-    <dgm:fillClrLst meth="repeat">
-      <a:schemeClr val="accent1">
+    <dgm:fillClrLst>
+      <a:schemeClr val="accent5">
+        <a:tint val="50000"/>
+      </a:schemeClr>
+      <a:schemeClr val="accent6">
         <a:tint val="50000"/>
       </a:schemeClr>
     </dgm:fillClrLst>
@@ -258,9 +268,12 @@
     <dgm:txEffectClrLst/>
   </dgm:styleLbl>
   <dgm:styleLbl name="alignImgPlace1">
-    <dgm:fillClrLst meth="repeat">
-      <a:schemeClr val="accent1">
+    <dgm:fillClrLst>
+      <a:schemeClr val="accent5">
         <a:tint val="50000"/>
+      </a:schemeClr>
+      <a:schemeClr val="accent6">
+        <a:tint val="20000"/>
       </a:schemeClr>
     </dgm:fillClrLst>
     <dgm:linClrLst meth="repeat">
@@ -274,9 +287,12 @@
     <dgm:txEffectClrLst/>
   </dgm:styleLbl>
   <dgm:styleLbl name="bgImgPlace1">
-    <dgm:fillClrLst meth="repeat">
-      <a:schemeClr val="accent1">
+    <dgm:fillClrLst>
+      <a:schemeClr val="accent5">
         <a:tint val="50000"/>
+      </a:schemeClr>
+      <a:schemeClr val="accent6">
+        <a:tint val="20000"/>
       </a:schemeClr>
     </dgm:fillClrLst>
     <dgm:linClrLst meth="repeat">
@@ -290,14 +306,84 @@
     <dgm:txEffectClrLst/>
   </dgm:styleLbl>
   <dgm:styleLbl name="sibTrans2D1">
-    <dgm:fillClrLst meth="repeat">
-      <a:schemeClr val="accent1">
-        <a:tint val="60000"/>
-      </a:schemeClr>
+    <dgm:fillClrLst>
+      <a:schemeClr val="accent5"/>
+      <a:schemeClr val="accent6"/>
     </dgm:fillClrLst>
     <dgm:linClrLst meth="repeat">
-      <a:schemeClr val="accent1">
-        <a:tint val="60000"/>
+      <a:schemeClr val="lt1"/>
+    </dgm:linClrLst>
+    <dgm:effectClrLst/>
+    <dgm:txLinClrLst/>
+    <dgm:txFillClrLst/>
+    <dgm:txEffectClrLst/>
+  </dgm:styleLbl>
+  <dgm:styleLbl name="fgSibTrans2D1">
+    <dgm:fillClrLst>
+      <a:schemeClr val="accent5"/>
+      <a:schemeClr val="accent6"/>
+    </dgm:fillClrLst>
+    <dgm:linClrLst meth="repeat">
+      <a:schemeClr val="lt1"/>
+    </dgm:linClrLst>
+    <dgm:effectClrLst/>
+    <dgm:txLinClrLst/>
+    <dgm:txFillClrLst meth="repeat">
+      <a:schemeClr val="lt1"/>
+    </dgm:txFillClrLst>
+    <dgm:txEffectClrLst/>
+  </dgm:styleLbl>
+  <dgm:styleLbl name="bgSibTrans2D1">
+    <dgm:fillClrLst>
+      <a:schemeClr val="accent5"/>
+      <a:schemeClr val="accent6"/>
+    </dgm:fillClrLst>
+    <dgm:linClrLst meth="repeat">
+      <a:schemeClr val="lt1"/>
+    </dgm:linClrLst>
+    <dgm:effectClrLst/>
+    <dgm:txLinClrLst/>
+    <dgm:txFillClrLst meth="repeat">
+      <a:schemeClr val="lt1"/>
+    </dgm:txFillClrLst>
+    <dgm:txEffectClrLst/>
+  </dgm:styleLbl>
+  <dgm:styleLbl name="sibTrans1D1">
+    <dgm:fillClrLst/>
+    <dgm:linClrLst>
+      <a:schemeClr val="accent5"/>
+      <a:schemeClr val="accent6"/>
+    </dgm:linClrLst>
+    <dgm:effectClrLst/>
+    <dgm:txLinClrLst/>
+    <dgm:txFillClrLst meth="repeat">
+      <a:schemeClr val="tx1"/>
+    </dgm:txFillClrLst>
+    <dgm:txEffectClrLst/>
+  </dgm:styleLbl>
+  <dgm:styleLbl name="callout">
+    <dgm:fillClrLst meth="repeat">
+      <a:schemeClr val="accent5"/>
+    </dgm:fillClrLst>
+    <dgm:linClrLst meth="repeat">
+      <a:schemeClr val="accent5">
+        <a:tint val="50000"/>
+      </a:schemeClr>
+    </dgm:linClrLst>
+    <dgm:effectClrLst/>
+    <dgm:txLinClrLst/>
+    <dgm:txFillClrLst meth="repeat">
+      <a:schemeClr val="tx1"/>
+    </dgm:txFillClrLst>
+    <dgm:txEffectClrLst/>
+  </dgm:styleLbl>
+  <dgm:styleLbl name="asst0">
+    <dgm:fillClrLst meth="repeat">
+      <a:schemeClr val="accent5"/>
+    </dgm:fillClrLst>
+    <dgm:linClrLst meth="repeat">
+      <a:schemeClr val="lt1">
+        <a:shade val="80000"/>
       </a:schemeClr>
     </dgm:linClrLst>
     <dgm:effectClrLst/>
@@ -305,15 +391,13 @@
     <dgm:txFillClrLst/>
     <dgm:txEffectClrLst/>
   </dgm:styleLbl>
-  <dgm:styleLbl name="fgSibTrans2D1">
+  <dgm:styleLbl name="asst1">
     <dgm:fillClrLst meth="repeat">
-      <a:schemeClr val="accent1">
-        <a:tint val="60000"/>
-      </a:schemeClr>
+      <a:schemeClr val="accent6"/>
     </dgm:fillClrLst>
     <dgm:linClrLst meth="repeat">
-      <a:schemeClr val="accent1">
-        <a:tint val="60000"/>
+      <a:schemeClr val="lt1">
+        <a:shade val="80000"/>
       </a:schemeClr>
     </dgm:linClrLst>
     <dgm:effectClrLst/>
@@ -321,25 +405,129 @@
     <dgm:txFillClrLst/>
     <dgm:txEffectClrLst/>
   </dgm:styleLbl>
-  <dgm:styleLbl name="bgSibTrans2D1">
-    <dgm:fillClrLst meth="repeat">
-      <a:schemeClr val="accent1">
-        <a:tint val="60000"/>
-      </a:schemeClr>
+  <dgm:styleLbl name="asst2">
+    <dgm:fillClrLst>
+      <a:schemeClr val="accent1"/>
     </dgm:fillClrLst>
     <dgm:linClrLst meth="repeat">
-      <a:schemeClr val="accent1">
-        <a:tint val="60000"/>
-      </a:schemeClr>
+      <a:schemeClr val="lt1"/>
     </dgm:linClrLst>
     <dgm:effectClrLst/>
     <dgm:txLinClrLst/>
     <dgm:txFillClrLst/>
     <dgm:txEffectClrLst/>
   </dgm:styleLbl>
-  <dgm:styleLbl name="sibTrans1D1">
+  <dgm:styleLbl name="asst3">
+    <dgm:fillClrLst>
+      <a:schemeClr val="accent2"/>
+    </dgm:fillClrLst>
+    <dgm:linClrLst meth="repeat">
+      <a:schemeClr val="lt1"/>
+    </dgm:linClrLst>
+    <dgm:effectClrLst/>
+    <dgm:txLinClrLst/>
+    <dgm:txFillClrLst/>
+    <dgm:txEffectClrLst/>
+  </dgm:styleLbl>
+  <dgm:styleLbl name="asst4">
+    <dgm:fillClrLst>
+      <a:schemeClr val="accent3"/>
+    </dgm:fillClrLst>
+    <dgm:linClrLst meth="repeat">
+      <a:schemeClr val="lt1"/>
+    </dgm:linClrLst>
+    <dgm:effectClrLst/>
+    <dgm:txLinClrLst/>
+    <dgm:txFillClrLst/>
+    <dgm:txEffectClrLst/>
+  </dgm:styleLbl>
+  <dgm:styleLbl name="parChTrans2D1">
+    <dgm:fillClrLst meth="repeat">
+      <a:schemeClr val="accent5"/>
+    </dgm:fillClrLst>
+    <dgm:linClrLst meth="repeat">
+      <a:schemeClr val="lt1"/>
+    </dgm:linClrLst>
+    <dgm:effectClrLst/>
+    <dgm:txLinClrLst/>
+    <dgm:txFillClrLst meth="repeat">
+      <a:schemeClr val="lt1"/>
+    </dgm:txFillClrLst>
+    <dgm:txEffectClrLst/>
+  </dgm:styleLbl>
+  <dgm:styleLbl name="parChTrans2D2">
+    <dgm:fillClrLst meth="repeat">
+      <a:schemeClr val="accent6"/>
+    </dgm:fillClrLst>
+    <dgm:linClrLst meth="repeat">
+      <a:schemeClr val="lt1"/>
+    </dgm:linClrLst>
+    <dgm:effectClrLst/>
+    <dgm:txLinClrLst/>
+    <dgm:txFillClrLst/>
+    <dgm:txEffectClrLst/>
+  </dgm:styleLbl>
+  <dgm:styleLbl name="parChTrans2D3">
+    <dgm:fillClrLst meth="repeat">
+      <a:schemeClr val="accent6"/>
+    </dgm:fillClrLst>
+    <dgm:linClrLst meth="repeat">
+      <a:schemeClr val="lt1"/>
+    </dgm:linClrLst>
+    <dgm:effectClrLst/>
+    <dgm:txLinClrLst/>
+    <dgm:txFillClrLst/>
+    <dgm:txEffectClrLst/>
+  </dgm:styleLbl>
+  <dgm:styleLbl name="parChTrans2D4">
     <dgm:fillClrLst meth="repeat">
       <a:schemeClr val="accent1"/>
+    </dgm:fillClrLst>
+    <dgm:linClrLst meth="repeat">
+      <a:schemeClr val="lt1"/>
+    </dgm:linClrLst>
+    <dgm:effectClrLst/>
+    <dgm:txLinClrLst/>
+    <dgm:txFillClrLst meth="repeat">
+      <a:schemeClr val="lt1"/>
+    </dgm:txFillClrLst>
+    <dgm:txEffectClrLst/>
+  </dgm:styleLbl>
+  <dgm:styleLbl name="parChTrans1D1">
+    <dgm:fillClrLst meth="repeat">
+      <a:schemeClr val="accent5"/>
+    </dgm:fillClrLst>
+    <dgm:linClrLst meth="repeat">
+      <a:schemeClr val="accent5"/>
+    </dgm:linClrLst>
+    <dgm:effectClrLst/>
+    <dgm:txLinClrLst/>
+    <dgm:txFillClrLst meth="repeat">
+      <a:schemeClr val="tx1"/>
+    </dgm:txFillClrLst>
+    <dgm:txEffectClrLst/>
+  </dgm:styleLbl>
+  <dgm:styleLbl name="parChTrans1D2">
+    <dgm:fillClrLst meth="repeat">
+      <a:schemeClr val="accent6">
+        <a:tint val="90000"/>
+      </a:schemeClr>
+    </dgm:fillClrLst>
+    <dgm:linClrLst meth="repeat">
+      <a:schemeClr val="accent6"/>
+    </dgm:linClrLst>
+    <dgm:effectClrLst/>
+    <dgm:txLinClrLst/>
+    <dgm:txFillClrLst meth="repeat">
+      <a:schemeClr val="tx1"/>
+    </dgm:txFillClrLst>
+    <dgm:txEffectClrLst/>
+  </dgm:styleLbl>
+  <dgm:styleLbl name="parChTrans1D3">
+    <dgm:fillClrLst meth="repeat">
+      <a:schemeClr val="accent6">
+        <a:tint val="70000"/>
+      </a:schemeClr>
     </dgm:fillClrLst>
     <dgm:linClrLst meth="repeat">
       <a:schemeClr val="accent1"/>
@@ -351,14 +539,14 @@
     </dgm:txFillClrLst>
     <dgm:txEffectClrLst/>
   </dgm:styleLbl>
-  <dgm:styleLbl name="callout">
+  <dgm:styleLbl name="parChTrans1D4">
     <dgm:fillClrLst meth="repeat">
-      <a:schemeClr val="accent1"/>
+      <a:schemeClr val="accent6">
+        <a:tint val="50000"/>
+      </a:schemeClr>
     </dgm:fillClrLst>
     <dgm:linClrLst meth="repeat">
-      <a:schemeClr val="accent1">
-        <a:tint val="50000"/>
-      </a:schemeClr>
+      <a:schemeClr val="accent2"/>
     </dgm:linClrLst>
     <dgm:effectClrLst/>
     <dgm:txLinClrLst/>
@@ -367,197 +555,258 @@
     </dgm:txFillClrLst>
     <dgm:txEffectClrLst/>
   </dgm:styleLbl>
-  <dgm:styleLbl name="asst0">
-    <dgm:fillClrLst meth="repeat">
-      <a:schemeClr val="accent1"/>
-    </dgm:fillClrLst>
-    <dgm:linClrLst meth="repeat">
-      <a:schemeClr val="lt1"/>
-    </dgm:linClrLst>
-    <dgm:effectClrLst/>
-    <dgm:txLinClrLst/>
-    <dgm:txFillClrLst/>
-    <dgm:txEffectClrLst/>
-  </dgm:styleLbl>
-  <dgm:styleLbl name="asst1">
-    <dgm:fillClrLst meth="repeat">
-      <a:schemeClr val="accent1"/>
-    </dgm:fillClrLst>
-    <dgm:linClrLst meth="repeat">
-      <a:schemeClr val="lt1"/>
-    </dgm:linClrLst>
-    <dgm:effectClrLst/>
-    <dgm:txLinClrLst/>
-    <dgm:txFillClrLst/>
-    <dgm:txEffectClrLst/>
-  </dgm:styleLbl>
-  <dgm:styleLbl name="asst2">
-    <dgm:fillClrLst meth="repeat">
-      <a:schemeClr val="accent1"/>
-    </dgm:fillClrLst>
-    <dgm:linClrLst meth="repeat">
-      <a:schemeClr val="lt1"/>
-    </dgm:linClrLst>
-    <dgm:effectClrLst/>
-    <dgm:txLinClrLst/>
-    <dgm:txFillClrLst/>
-    <dgm:txEffectClrLst/>
-  </dgm:styleLbl>
-  <dgm:styleLbl name="asst3">
-    <dgm:fillClrLst meth="repeat">
-      <a:schemeClr val="accent1"/>
-    </dgm:fillClrLst>
-    <dgm:linClrLst meth="repeat">
-      <a:schemeClr val="lt1"/>
-    </dgm:linClrLst>
-    <dgm:effectClrLst/>
-    <dgm:txLinClrLst/>
-    <dgm:txFillClrLst/>
-    <dgm:txEffectClrLst/>
-  </dgm:styleLbl>
-  <dgm:styleLbl name="asst4">
-    <dgm:fillClrLst meth="repeat">
-      <a:schemeClr val="accent1"/>
-    </dgm:fillClrLst>
-    <dgm:linClrLst meth="repeat">
-      <a:schemeClr val="lt1"/>
-    </dgm:linClrLst>
-    <dgm:effectClrLst/>
-    <dgm:txLinClrLst/>
-    <dgm:txFillClrLst/>
-    <dgm:txEffectClrLst/>
-  </dgm:styleLbl>
-  <dgm:styleLbl name="parChTrans2D1">
-    <dgm:fillClrLst meth="repeat">
-      <a:schemeClr val="accent1">
-        <a:tint val="60000"/>
-      </a:schemeClr>
-    </dgm:fillClrLst>
-    <dgm:linClrLst meth="repeat">
-      <a:schemeClr val="accent1">
-        <a:tint val="60000"/>
-      </a:schemeClr>
-    </dgm:linClrLst>
-    <dgm:effectClrLst/>
-    <dgm:txLinClrLst/>
-    <dgm:txFillClrLst meth="repeat">
-      <a:schemeClr val="lt1"/>
-    </dgm:txFillClrLst>
-    <dgm:txEffectClrLst/>
-  </dgm:styleLbl>
-  <dgm:styleLbl name="parChTrans2D2">
-    <dgm:fillClrLst meth="repeat">
-      <a:schemeClr val="accent1"/>
-    </dgm:fillClrLst>
-    <dgm:linClrLst meth="repeat">
-      <a:schemeClr val="accent1"/>
-    </dgm:linClrLst>
-    <dgm:effectClrLst/>
-    <dgm:txLinClrLst/>
-    <dgm:txFillClrLst meth="repeat">
-      <a:schemeClr val="lt1"/>
-    </dgm:txFillClrLst>
-    <dgm:txEffectClrLst/>
-  </dgm:styleLbl>
-  <dgm:styleLbl name="parChTrans2D3">
-    <dgm:fillClrLst meth="repeat">
-      <a:schemeClr val="accent1"/>
-    </dgm:fillClrLst>
-    <dgm:linClrLst meth="repeat">
-      <a:schemeClr val="accent1"/>
-    </dgm:linClrLst>
-    <dgm:effectClrLst/>
-    <dgm:txLinClrLst/>
-    <dgm:txFillClrLst meth="repeat">
-      <a:schemeClr val="lt1"/>
-    </dgm:txFillClrLst>
-    <dgm:txEffectClrLst/>
-  </dgm:styleLbl>
-  <dgm:styleLbl name="parChTrans2D4">
-    <dgm:fillClrLst meth="repeat">
-      <a:schemeClr val="accent1"/>
-    </dgm:fillClrLst>
-    <dgm:linClrLst meth="repeat">
-      <a:schemeClr val="accent1"/>
-    </dgm:linClrLst>
-    <dgm:effectClrLst/>
-    <dgm:txLinClrLst/>
-    <dgm:txFillClrLst meth="repeat">
-      <a:schemeClr val="lt1"/>
-    </dgm:txFillClrLst>
-    <dgm:txEffectClrLst/>
-  </dgm:styleLbl>
-  <dgm:styleLbl name="parChTrans1D1">
-    <dgm:fillClrLst meth="repeat">
-      <a:schemeClr val="accent1"/>
-    </dgm:fillClrLst>
-    <dgm:linClrLst meth="repeat">
-      <a:schemeClr val="accent1">
-        <a:shade val="60000"/>
-      </a:schemeClr>
-    </dgm:linClrLst>
-    <dgm:effectClrLst/>
-    <dgm:txLinClrLst/>
-    <dgm:txFillClrLst meth="repeat">
-      <a:schemeClr val="tx1"/>
-    </dgm:txFillClrLst>
-    <dgm:txEffectClrLst/>
-  </dgm:styleLbl>
-  <dgm:styleLbl name="parChTrans1D2">
-    <dgm:fillClrLst meth="repeat">
-      <a:schemeClr val="accent1"/>
-    </dgm:fillClrLst>
-    <dgm:linClrLst meth="repeat">
-      <a:schemeClr val="accent1">
-        <a:shade val="60000"/>
-      </a:schemeClr>
-    </dgm:linClrLst>
-    <dgm:effectClrLst/>
-    <dgm:txLinClrLst/>
-    <dgm:txFillClrLst meth="repeat">
-      <a:schemeClr val="tx1"/>
-    </dgm:txFillClrLst>
-    <dgm:txEffectClrLst/>
-  </dgm:styleLbl>
-  <dgm:styleLbl name="parChTrans1D3">
-    <dgm:fillClrLst meth="repeat">
-      <a:schemeClr val="accent1"/>
-    </dgm:fillClrLst>
-    <dgm:linClrLst meth="repeat">
-      <a:schemeClr val="accent1">
-        <a:shade val="80000"/>
-      </a:schemeClr>
-    </dgm:linClrLst>
-    <dgm:effectClrLst/>
-    <dgm:txLinClrLst/>
-    <dgm:txFillClrLst meth="repeat">
-      <a:schemeClr val="tx1"/>
-    </dgm:txFillClrLst>
-    <dgm:txEffectClrLst/>
-  </dgm:styleLbl>
-  <dgm:styleLbl name="parChTrans1D4">
-    <dgm:fillClrLst meth="repeat">
-      <a:schemeClr val="accent1"/>
-    </dgm:fillClrLst>
-    <dgm:linClrLst meth="repeat">
-      <a:schemeClr val="accent1">
-        <a:shade val="80000"/>
-      </a:schemeClr>
-    </dgm:linClrLst>
-    <dgm:effectClrLst/>
-    <dgm:txLinClrLst/>
-    <dgm:txFillClrLst meth="repeat">
-      <a:schemeClr val="tx1"/>
-    </dgm:txFillClrLst>
-    <dgm:txEffectClrLst/>
-  </dgm:styleLbl>
   <dgm:styleLbl name="fgAcc1">
     <dgm:fillClrLst meth="repeat">
       <a:schemeClr val="lt1">
         <a:alpha val="90000"/>
       </a:schemeClr>
     </dgm:fillClrLst>
+    <dgm:linClrLst>
+      <a:schemeClr val="accent5"/>
+      <a:schemeClr val="accent6"/>
+    </dgm:linClrLst>
+    <dgm:effectClrLst/>
+    <dgm:txLinClrLst/>
+    <dgm:txFillClrLst meth="repeat">
+      <a:schemeClr val="dk1"/>
+    </dgm:txFillClrLst>
+    <dgm:txEffectClrLst/>
+  </dgm:styleLbl>
+  <dgm:styleLbl name="conFgAcc1">
+    <dgm:fillClrLst meth="repeat">
+      <a:schemeClr val="lt1">
+        <a:alpha val="90000"/>
+      </a:schemeClr>
+    </dgm:fillClrLst>
+    <dgm:linClrLst>
+      <a:schemeClr val="accent5"/>
+      <a:schemeClr val="accent6"/>
+    </dgm:linClrLst>
+    <dgm:effectClrLst/>
+    <dgm:txLinClrLst/>
+    <dgm:txFillClrLst meth="repeat">
+      <a:schemeClr val="dk1"/>
+    </dgm:txFillClrLst>
+    <dgm:txEffectClrLst/>
+  </dgm:styleLbl>
+  <dgm:styleLbl name="alignAcc1">
+    <dgm:fillClrLst meth="repeat">
+      <a:schemeClr val="lt1">
+        <a:alpha val="90000"/>
+      </a:schemeClr>
+    </dgm:fillClrLst>
+    <dgm:linClrLst>
+      <a:schemeClr val="accent5"/>
+      <a:schemeClr val="accent6"/>
+    </dgm:linClrLst>
+    <dgm:effectClrLst/>
+    <dgm:txLinClrLst/>
+    <dgm:txFillClrLst meth="repeat">
+      <a:schemeClr val="dk1"/>
+    </dgm:txFillClrLst>
+    <dgm:txEffectClrLst/>
+  </dgm:styleLbl>
+  <dgm:styleLbl name="trAlignAcc1">
+    <dgm:fillClrLst meth="repeat">
+      <a:schemeClr val="lt1">
+        <a:alpha val="40000"/>
+      </a:schemeClr>
+    </dgm:fillClrLst>
     <dgm:linClrLst meth="repeat">
+      <a:schemeClr val="accent5"/>
+    </dgm:linClrLst>
+    <dgm:effectClrLst/>
+    <dgm:txLinClrLst/>
+    <dgm:txFillClrLst meth="repeat">
+      <a:schemeClr val="dk1"/>
+    </dgm:txFillClrLst>
+    <dgm:txEffectClrLst/>
+  </dgm:styleLbl>
+  <dgm:styleLbl name="bgAcc1">
+    <dgm:fillClrLst meth="repeat">
+      <a:schemeClr val="lt1">
+        <a:alpha val="90000"/>
+      </a:schemeClr>
+    </dgm:fillClrLst>
+    <dgm:linClrLst>
+      <a:schemeClr val="accent5"/>
+      <a:schemeClr val="accent6"/>
+    </dgm:linClrLst>
+    <dgm:effectClrLst/>
+    <dgm:txLinClrLst/>
+    <dgm:txFillClrLst meth="repeat">
+      <a:schemeClr val="dk1"/>
+    </dgm:txFillClrLst>
+    <dgm:txEffectClrLst/>
+  </dgm:styleLbl>
+  <dgm:styleLbl name="solidFgAcc1">
+    <dgm:fillClrLst meth="repeat">
+      <a:schemeClr val="lt1"/>
+    </dgm:fillClrLst>
+    <dgm:linClrLst>
+      <a:schemeClr val="accent5"/>
+      <a:schemeClr val="accent6"/>
+    </dgm:linClrLst>
+    <dgm:effectClrLst/>
+    <dgm:txLinClrLst/>
+    <dgm:txFillClrLst meth="repeat">
+      <a:schemeClr val="dk1"/>
+    </dgm:txFillClrLst>
+    <dgm:txEffectClrLst/>
+  </dgm:styleLbl>
+  <dgm:styleLbl name="solidAlignAcc1">
+    <dgm:fillClrLst meth="repeat">
+      <a:schemeClr val="lt1"/>
+    </dgm:fillClrLst>
+    <dgm:linClrLst>
+      <a:schemeClr val="accent5"/>
+      <a:schemeClr val="accent6"/>
+    </dgm:linClrLst>
+    <dgm:effectClrLst/>
+    <dgm:txLinClrLst/>
+    <dgm:txFillClrLst meth="repeat">
+      <a:schemeClr val="dk1"/>
+    </dgm:txFillClrLst>
+    <dgm:txEffectClrLst/>
+  </dgm:styleLbl>
+  <dgm:styleLbl name="solidBgAcc1">
+    <dgm:fillClrLst meth="repeat">
+      <a:schemeClr val="lt1"/>
+    </dgm:fillClrLst>
+    <dgm:linClrLst>
+      <a:schemeClr val="accent5"/>
+      <a:schemeClr val="accent6"/>
+    </dgm:linClrLst>
+    <dgm:effectClrLst/>
+    <dgm:txLinClrLst/>
+    <dgm:txFillClrLst meth="repeat">
+      <a:schemeClr val="dk1"/>
+    </dgm:txFillClrLst>
+    <dgm:txEffectClrLst/>
+  </dgm:styleLbl>
+  <dgm:styleLbl name="fgAccFollowNode1">
+    <dgm:fillClrLst>
+      <a:schemeClr val="accent5">
+        <a:tint val="40000"/>
+        <a:alpha val="90000"/>
+      </a:schemeClr>
+      <a:schemeClr val="accent6">
+        <a:tint val="40000"/>
+        <a:alpha val="90000"/>
+      </a:schemeClr>
+    </dgm:fillClrLst>
+    <dgm:linClrLst>
+      <a:schemeClr val="accent5">
+        <a:tint val="40000"/>
+        <a:alpha val="90000"/>
+      </a:schemeClr>
+      <a:schemeClr val="accent5">
+        <a:tint val="40000"/>
+        <a:alpha val="90000"/>
+      </a:schemeClr>
+    </dgm:linClrLst>
+    <dgm:effectClrLst/>
+    <dgm:txLinClrLst/>
+    <dgm:txFillClrLst meth="repeat">
+      <a:schemeClr val="dk1"/>
+    </dgm:txFillClrLst>
+    <dgm:txEffectClrLst/>
+  </dgm:styleLbl>
+  <dgm:styleLbl name="alignAccFollowNode1">
+    <dgm:fillClrLst>
+      <a:schemeClr val="accent5">
+        <a:tint val="40000"/>
+        <a:alpha val="90000"/>
+      </a:schemeClr>
+      <a:schemeClr val="accent6">
+        <a:tint val="40000"/>
+        <a:alpha val="90000"/>
+      </a:schemeClr>
+    </dgm:fillClrLst>
+    <dgm:linClrLst>
+      <a:schemeClr val="accent5">
+        <a:tint val="40000"/>
+        <a:alpha val="90000"/>
+      </a:schemeClr>
+      <a:schemeClr val="accent6">
+        <a:tint val="40000"/>
+        <a:alpha val="90000"/>
+      </a:schemeClr>
+    </dgm:linClrLst>
+    <dgm:effectClrLst/>
+    <dgm:txLinClrLst/>
+    <dgm:txFillClrLst meth="repeat">
+      <a:schemeClr val="dk1"/>
+    </dgm:txFillClrLst>
+    <dgm:txEffectClrLst/>
+  </dgm:styleLbl>
+  <dgm:styleLbl name="bgAccFollowNode1">
+    <dgm:fillClrLst>
+      <a:schemeClr val="accent5">
+        <a:tint val="40000"/>
+        <a:alpha val="90000"/>
+      </a:schemeClr>
+      <a:schemeClr val="accent6">
+        <a:tint val="40000"/>
+        <a:alpha val="90000"/>
+      </a:schemeClr>
+    </dgm:fillClrLst>
+    <dgm:linClrLst>
+      <a:schemeClr val="accent5">
+        <a:tint val="40000"/>
+        <a:alpha val="90000"/>
+      </a:schemeClr>
+      <a:schemeClr val="accent6">
+        <a:tint val="40000"/>
+        <a:alpha val="90000"/>
+      </a:schemeClr>
+    </dgm:linClrLst>
+    <dgm:effectClrLst/>
+    <dgm:txLinClrLst/>
+    <dgm:txFillClrLst meth="repeat">
+      <a:schemeClr val="dk1"/>
+    </dgm:txFillClrLst>
+    <dgm:txEffectClrLst/>
+  </dgm:styleLbl>
+  <dgm:styleLbl name="fgAcc0">
+    <dgm:fillClrLst meth="repeat">
+      <a:schemeClr val="lt1">
+        <a:alpha val="90000"/>
+      </a:schemeClr>
+    </dgm:fillClrLst>
+    <dgm:linClrLst>
+      <a:schemeClr val="accent4"/>
+    </dgm:linClrLst>
+    <dgm:effectClrLst/>
+    <dgm:txLinClrLst/>
+    <dgm:txFillClrLst meth="repeat">
+      <a:schemeClr val="dk1"/>
+    </dgm:txFillClrLst>
+    <dgm:txEffectClrLst/>
+  </dgm:styleLbl>
+  <dgm:styleLbl name="fgAcc2">
+    <dgm:fillClrLst meth="repeat">
+      <a:schemeClr val="lt1">
+        <a:alpha val="90000"/>
+      </a:schemeClr>
+    </dgm:fillClrLst>
+    <dgm:linClrLst>
+      <a:schemeClr val="accent6"/>
+    </dgm:linClrLst>
+    <dgm:effectClrLst/>
+    <dgm:txLinClrLst/>
+    <dgm:txFillClrLst meth="repeat">
+      <a:schemeClr val="dk1"/>
+    </dgm:txFillClrLst>
+    <dgm:txEffectClrLst/>
+  </dgm:styleLbl>
+  <dgm:styleLbl name="fgAcc3">
+    <dgm:fillClrLst meth="repeat">
+      <a:schemeClr val="lt1">
+        <a:alpha val="90000"/>
+      </a:schemeClr>
+    </dgm:fillClrLst>
+    <dgm:linClrLst>
       <a:schemeClr val="accent1"/>
     </dgm:linClrLst>
     <dgm:effectClrLst/>
@@ -567,14 +816,14 @@
     </dgm:txFillClrLst>
     <dgm:txEffectClrLst/>
   </dgm:styleLbl>
-  <dgm:styleLbl name="conFgAcc1">
+  <dgm:styleLbl name="fgAcc4">
     <dgm:fillClrLst meth="repeat">
       <a:schemeClr val="lt1">
         <a:alpha val="90000"/>
       </a:schemeClr>
     </dgm:fillClrLst>
-    <dgm:linClrLst meth="repeat">
-      <a:schemeClr val="accent1"/>
+    <dgm:linClrLst>
+      <a:schemeClr val="accent2"/>
     </dgm:linClrLst>
     <dgm:effectClrLst/>
     <dgm:txLinClrLst/>
@@ -583,14 +832,14 @@
     </dgm:txFillClrLst>
     <dgm:txEffectClrLst/>
   </dgm:styleLbl>
-  <dgm:styleLbl name="alignAcc1">
+  <dgm:styleLbl name="bgShp">
     <dgm:fillClrLst meth="repeat">
-      <a:schemeClr val="lt1">
-        <a:alpha val="90000"/>
+      <a:schemeClr val="accent5">
+        <a:tint val="40000"/>
       </a:schemeClr>
     </dgm:fillClrLst>
     <dgm:linClrLst meth="repeat">
-      <a:schemeClr val="accent1"/>
+      <a:schemeClr val="dk1"/>
     </dgm:linClrLst>
     <dgm:effectClrLst/>
     <dgm:txLinClrLst/>
@@ -599,228 +848,14 @@
     </dgm:txFillClrLst>
     <dgm:txEffectClrLst/>
   </dgm:styleLbl>
-  <dgm:styleLbl name="trAlignAcc1">
+  <dgm:styleLbl name="dkBgShp">
     <dgm:fillClrLst meth="repeat">
-      <a:schemeClr val="lt1">
-        <a:alpha val="40000"/>
+      <a:schemeClr val="accent5">
+        <a:shade val="90000"/>
       </a:schemeClr>
     </dgm:fillClrLst>
     <dgm:linClrLst meth="repeat">
-      <a:schemeClr val="accent1"/>
-    </dgm:linClrLst>
-    <dgm:effectClrLst/>
-    <dgm:txLinClrLst/>
-    <dgm:txFillClrLst meth="repeat">
       <a:schemeClr val="dk1"/>
-    </dgm:txFillClrLst>
-    <dgm:txEffectClrLst/>
-  </dgm:styleLbl>
-  <dgm:styleLbl name="bgAcc1">
-    <dgm:fillClrLst meth="repeat">
-      <a:schemeClr val="lt1">
-        <a:alpha val="90000"/>
-      </a:schemeClr>
-    </dgm:fillClrLst>
-    <dgm:linClrLst meth="repeat">
-      <a:schemeClr val="accent1"/>
-    </dgm:linClrLst>
-    <dgm:effectClrLst/>
-    <dgm:txLinClrLst/>
-    <dgm:txFillClrLst meth="repeat">
-      <a:schemeClr val="dk1"/>
-    </dgm:txFillClrLst>
-    <dgm:txEffectClrLst/>
-  </dgm:styleLbl>
-  <dgm:styleLbl name="solidFgAcc1">
-    <dgm:fillClrLst meth="repeat">
-      <a:schemeClr val="lt1"/>
-    </dgm:fillClrLst>
-    <dgm:linClrLst meth="repeat">
-      <a:schemeClr val="accent1"/>
-    </dgm:linClrLst>
-    <dgm:effectClrLst/>
-    <dgm:txLinClrLst/>
-    <dgm:txFillClrLst meth="repeat">
-      <a:schemeClr val="dk1"/>
-    </dgm:txFillClrLst>
-    <dgm:txEffectClrLst/>
-  </dgm:styleLbl>
-  <dgm:styleLbl name="solidAlignAcc1">
-    <dgm:fillClrLst meth="repeat">
-      <a:schemeClr val="lt1"/>
-    </dgm:fillClrLst>
-    <dgm:linClrLst meth="repeat">
-      <a:schemeClr val="accent1"/>
-    </dgm:linClrLst>
-    <dgm:effectClrLst/>
-    <dgm:txLinClrLst/>
-    <dgm:txFillClrLst meth="repeat">
-      <a:schemeClr val="dk1"/>
-    </dgm:txFillClrLst>
-    <dgm:txEffectClrLst/>
-  </dgm:styleLbl>
-  <dgm:styleLbl name="solidBgAcc1">
-    <dgm:fillClrLst meth="repeat">
-      <a:schemeClr val="lt1"/>
-    </dgm:fillClrLst>
-    <dgm:linClrLst meth="repeat">
-      <a:schemeClr val="accent1"/>
-    </dgm:linClrLst>
-    <dgm:effectClrLst/>
-    <dgm:txLinClrLst/>
-    <dgm:txFillClrLst meth="repeat">
-      <a:schemeClr val="dk1"/>
-    </dgm:txFillClrLst>
-    <dgm:txEffectClrLst/>
-  </dgm:styleLbl>
-  <dgm:styleLbl name="fgAccFollowNode1">
-    <dgm:fillClrLst meth="repeat">
-      <a:schemeClr val="accent1">
-        <a:alpha val="90000"/>
-        <a:tint val="40000"/>
-      </a:schemeClr>
-    </dgm:fillClrLst>
-    <dgm:linClrLst meth="repeat">
-      <a:schemeClr val="accent1">
-        <a:alpha val="90000"/>
-        <a:tint val="40000"/>
-      </a:schemeClr>
-    </dgm:linClrLst>
-    <dgm:effectClrLst/>
-    <dgm:txLinClrLst/>
-    <dgm:txFillClrLst meth="repeat">
-      <a:schemeClr val="dk1"/>
-    </dgm:txFillClrLst>
-    <dgm:txEffectClrLst/>
-  </dgm:styleLbl>
-  <dgm:styleLbl name="alignAccFollowNode1">
-    <dgm:fillClrLst meth="repeat">
-      <a:schemeClr val="accent1">
-        <a:alpha val="90000"/>
-        <a:tint val="40000"/>
-      </a:schemeClr>
-    </dgm:fillClrLst>
-    <dgm:linClrLst meth="repeat">
-      <a:schemeClr val="accent1">
-        <a:alpha val="90000"/>
-        <a:tint val="40000"/>
-      </a:schemeClr>
-    </dgm:linClrLst>
-    <dgm:effectClrLst/>
-    <dgm:txLinClrLst/>
-    <dgm:txFillClrLst meth="repeat">
-      <a:schemeClr val="dk1"/>
-    </dgm:txFillClrLst>
-    <dgm:txEffectClrLst/>
-  </dgm:styleLbl>
-  <dgm:styleLbl name="bgAccFollowNode1">
-    <dgm:fillClrLst meth="repeat">
-      <a:schemeClr val="accent1">
-        <a:alpha val="90000"/>
-        <a:tint val="40000"/>
-      </a:schemeClr>
-    </dgm:fillClrLst>
-    <dgm:linClrLst meth="repeat">
-      <a:schemeClr val="accent1">
-        <a:alpha val="90000"/>
-        <a:tint val="40000"/>
-      </a:schemeClr>
-    </dgm:linClrLst>
-    <dgm:effectClrLst/>
-    <dgm:txLinClrLst/>
-    <dgm:txFillClrLst meth="repeat">
-      <a:schemeClr val="dk1"/>
-    </dgm:txFillClrLst>
-    <dgm:txEffectClrLst/>
-  </dgm:styleLbl>
-  <dgm:styleLbl name="fgAcc0">
-    <dgm:fillClrLst meth="repeat">
-      <a:schemeClr val="lt1">
-        <a:alpha val="90000"/>
-      </a:schemeClr>
-    </dgm:fillClrLst>
-    <dgm:linClrLst meth="repeat">
-      <a:schemeClr val="accent1"/>
-    </dgm:linClrLst>
-    <dgm:effectClrLst/>
-    <dgm:txLinClrLst/>
-    <dgm:txFillClrLst meth="repeat">
-      <a:schemeClr val="dk1"/>
-    </dgm:txFillClrLst>
-    <dgm:txEffectClrLst/>
-  </dgm:styleLbl>
-  <dgm:styleLbl name="fgAcc2">
-    <dgm:fillClrLst meth="repeat">
-      <a:schemeClr val="lt1">
-        <a:alpha val="90000"/>
-      </a:schemeClr>
-    </dgm:fillClrLst>
-    <dgm:linClrLst meth="repeat">
-      <a:schemeClr val="accent1"/>
-    </dgm:linClrLst>
-    <dgm:effectClrLst/>
-    <dgm:txLinClrLst/>
-    <dgm:txFillClrLst meth="repeat">
-      <a:schemeClr val="dk1"/>
-    </dgm:txFillClrLst>
-    <dgm:txEffectClrLst/>
-  </dgm:styleLbl>
-  <dgm:styleLbl name="fgAcc3">
-    <dgm:fillClrLst meth="repeat">
-      <a:schemeClr val="lt1">
-        <a:alpha val="90000"/>
-      </a:schemeClr>
-    </dgm:fillClrLst>
-    <dgm:linClrLst meth="repeat">
-      <a:schemeClr val="accent1"/>
-    </dgm:linClrLst>
-    <dgm:effectClrLst/>
-    <dgm:txLinClrLst/>
-    <dgm:txFillClrLst meth="repeat">
-      <a:schemeClr val="dk1"/>
-    </dgm:txFillClrLst>
-    <dgm:txEffectClrLst/>
-  </dgm:styleLbl>
-  <dgm:styleLbl name="fgAcc4">
-    <dgm:fillClrLst meth="repeat">
-      <a:schemeClr val="lt1">
-        <a:alpha val="90000"/>
-      </a:schemeClr>
-    </dgm:fillClrLst>
-    <dgm:linClrLst meth="repeat">
-      <a:schemeClr val="accent1"/>
-    </dgm:linClrLst>
-    <dgm:effectClrLst/>
-    <dgm:txLinClrLst/>
-    <dgm:txFillClrLst meth="repeat">
-      <a:schemeClr val="dk1"/>
-    </dgm:txFillClrLst>
-    <dgm:txEffectClrLst/>
-  </dgm:styleLbl>
-  <dgm:styleLbl name="bgShp">
-    <dgm:fillClrLst meth="repeat">
-      <a:schemeClr val="accent1">
-        <a:tint val="40000"/>
-      </a:schemeClr>
-    </dgm:fillClrLst>
-    <dgm:linClrLst meth="repeat">
-      <a:schemeClr val="accent1"/>
-    </dgm:linClrLst>
-    <dgm:effectClrLst/>
-    <dgm:txLinClrLst/>
-    <dgm:txFillClrLst meth="repeat">
-      <a:schemeClr val="dk1"/>
-    </dgm:txFillClrLst>
-    <dgm:txEffectClrLst/>
-  </dgm:styleLbl>
-  <dgm:styleLbl name="dkBgShp">
-    <dgm:fillClrLst meth="repeat">
-      <a:schemeClr val="accent1">
-        <a:shade val="80000"/>
-      </a:schemeClr>
-    </dgm:fillClrLst>
-    <dgm:linClrLst meth="repeat">
-      <a:schemeClr val="accent1"/>
     </dgm:linClrLst>
     <dgm:effectClrLst/>
     <dgm:txLinClrLst/>
@@ -831,13 +866,13 @@
   </dgm:styleLbl>
   <dgm:styleLbl name="trBgShp">
     <dgm:fillClrLst meth="repeat">
-      <a:schemeClr val="accent1">
+      <a:schemeClr val="accent5">
         <a:tint val="50000"/>
         <a:alpha val="40000"/>
       </a:schemeClr>
     </dgm:fillClrLst>
     <dgm:linClrLst meth="repeat">
-      <a:schemeClr val="accent1"/>
+      <a:schemeClr val="accent5"/>
     </dgm:linClrLst>
     <dgm:effectClrLst/>
     <dgm:txLinClrLst/>
@@ -848,8 +883,8 @@
   </dgm:styleLbl>
   <dgm:styleLbl name="fgShp">
     <dgm:fillClrLst meth="repeat">
-      <a:schemeClr val="accent1">
-        <a:tint val="60000"/>
+      <a:schemeClr val="accent5">
+        <a:tint val="40000"/>
       </a:schemeClr>
     </dgm:fillClrLst>
     <dgm:linClrLst meth="repeat">
@@ -2381,7 +2416,7 @@
 <dgm:dataModel xmlns:dgm="http://schemas.openxmlformats.org/drawingml/2006/diagram" xmlns:a="http://schemas.openxmlformats.org/drawingml/2006/main">
   <dgm:ptLst>
     <dgm:pt modelId="{CE27370B-858D-493E-BD34-0FA799B5A297}" type="doc">
-      <dgm:prSet loTypeId="urn:microsoft.com/office/officeart/2018/5/layout/IconCircleLabelList" loCatId="icon" qsTypeId="urn:microsoft.com/office/officeart/2005/8/quickstyle/simple1" qsCatId="simple" csTypeId="urn:microsoft.com/office/officeart/2005/8/colors/accent1_2" csCatId="accent1" phldr="1"/>
+      <dgm:prSet loTypeId="urn:microsoft.com/office/officeart/2008/layout/LinedList" loCatId="list" qsTypeId="urn:microsoft.com/office/officeart/2005/8/quickstyle/simple4" qsCatId="simple" csTypeId="urn:microsoft.com/office/officeart/2005/8/colors/colorful5" csCatId="colorful" phldr="1"/>
       <dgm:spPr/>
       <dgm:t>
         <a:bodyPr/>
@@ -2399,9 +2434,6 @@
         <a:lstStyle/>
         <a:p>
           <a:pPr>
-            <a:lnSpc>
-              <a:spcPct val="100000"/>
-            </a:lnSpc>
             <a:defRPr cap="all"/>
           </a:pPr>
           <a:r>
@@ -2441,9 +2473,6 @@
         <a:lstStyle/>
         <a:p>
           <a:pPr>
-            <a:lnSpc>
-              <a:spcPct val="100000"/>
-            </a:lnSpc>
             <a:defRPr cap="all"/>
           </a:pPr>
           <a:r>
@@ -2483,9 +2512,6 @@
         <a:lstStyle/>
         <a:p>
           <a:pPr>
-            <a:lnSpc>
-              <a:spcPct val="100000"/>
-            </a:lnSpc>
             <a:defRPr cap="all"/>
           </a:pPr>
           <a:r>
@@ -2525,9 +2551,6 @@
         <a:lstStyle/>
         <a:p>
           <a:pPr>
-            <a:lnSpc>
-              <a:spcPct val="100000"/>
-            </a:lnSpc>
             <a:defRPr cap="all"/>
           </a:pPr>
           <a:r>
@@ -2567,9 +2590,6 @@
         <a:lstStyle/>
         <a:p>
           <a:pPr>
-            <a:lnSpc>
-              <a:spcPct val="100000"/>
-            </a:lnSpc>
             <a:defRPr cap="all"/>
           </a:pPr>
           <a:r>
@@ -2609,9 +2629,6 @@
         <a:lstStyle/>
         <a:p>
           <a:pPr>
-            <a:lnSpc>
-              <a:spcPct val="100000"/>
-            </a:lnSpc>
             <a:defRPr cap="all"/>
           </a:pPr>
           <a:r>
@@ -2651,9 +2668,6 @@
         <a:lstStyle/>
         <a:p>
           <a:pPr>
-            <a:lnSpc>
-              <a:spcPct val="100000"/>
-            </a:lnSpc>
             <a:defRPr cap="all"/>
           </a:pPr>
           <a:r>
@@ -2685,419 +2699,173 @@
         </a:p>
       </dgm:t>
     </dgm:pt>
-    <dgm:pt modelId="{14B7C387-312F-4EE6-99B2-90BA88D50279}" type="pres">
-      <dgm:prSet presAssocID="{CE27370B-858D-493E-BD34-0FA799B5A297}" presName="root" presStyleCnt="0">
+    <dgm:pt modelId="{BFFDC14A-1BBE-3141-B3EA-182472957DA5}" type="pres">
+      <dgm:prSet presAssocID="{CE27370B-858D-493E-BD34-0FA799B5A297}" presName="vert0" presStyleCnt="0">
         <dgm:presLayoutVars>
           <dgm:dir/>
-          <dgm:resizeHandles val="exact"/>
+          <dgm:animOne val="branch"/>
+          <dgm:animLvl val="lvl"/>
         </dgm:presLayoutVars>
       </dgm:prSet>
       <dgm:spPr/>
     </dgm:pt>
-    <dgm:pt modelId="{47C2C4C0-714C-4FC6-AE91-F0AFFE858C0E}" type="pres">
-      <dgm:prSet presAssocID="{87FAA01B-FE04-4990-8B8D-93EF8F0334C8}" presName="compNode" presStyleCnt="0"/>
+    <dgm:pt modelId="{C9B57FB8-7802-2D4E-B3B3-66FC3D0D1A99}" type="pres">
+      <dgm:prSet presAssocID="{87FAA01B-FE04-4990-8B8D-93EF8F0334C8}" presName="thickLine" presStyleLbl="alignNode1" presStyleIdx="0" presStyleCnt="7"/>
       <dgm:spPr/>
     </dgm:pt>
-    <dgm:pt modelId="{F084566D-8B52-4D65-9F97-6FBEE01C5886}" type="pres">
-      <dgm:prSet presAssocID="{87FAA01B-FE04-4990-8B8D-93EF8F0334C8}" presName="iconBgRect" presStyleLbl="bgShp" presStyleIdx="0" presStyleCnt="7"/>
+    <dgm:pt modelId="{BC72C828-0436-314A-8C5A-5C11C6D631D2}" type="pres">
+      <dgm:prSet presAssocID="{87FAA01B-FE04-4990-8B8D-93EF8F0334C8}" presName="horz1" presStyleCnt="0"/>
       <dgm:spPr/>
     </dgm:pt>
-    <dgm:pt modelId="{AA62569A-9583-49A1-B79D-33E8B82439D0}" type="pres">
-      <dgm:prSet presAssocID="{87FAA01B-FE04-4990-8B8D-93EF8F0334C8}" presName="iconRect" presStyleLbl="node1" presStyleIdx="0" presStyleCnt="7"/>
-      <dgm:spPr>
-        <a:blipFill>
-          <a:blip xmlns:r="http://schemas.openxmlformats.org/officeDocument/2006/relationships" r:embed="rId1">
-            <a:extLst>
-              <a:ext uri="{28A0092B-C50C-407E-A947-70E740481C1C}">
-                <a14:useLocalDpi xmlns:a14="http://schemas.microsoft.com/office/drawing/2010/main" val="0"/>
-              </a:ext>
-              <a:ext uri="{96DAC541-7B7A-43D3-8B79-37D633B846F1}">
-                <asvg:svgBlip xmlns:asvg="http://schemas.microsoft.com/office/drawing/2016/SVG/main" r:embed="rId2"/>
-              </a:ext>
-            </a:extLst>
-          </a:blip>
-          <a:stretch>
-            <a:fillRect/>
-          </a:stretch>
-        </a:blipFill>
-      </dgm:spPr>
-      <dgm:extLst>
-        <a:ext uri="{E40237B7-FDA0-4F09-8148-C483321AD2D9}">
-          <dgm14:cNvPr xmlns:dgm14="http://schemas.microsoft.com/office/drawing/2010/diagram" id="0" name="" descr="Head with Gears"/>
-        </a:ext>
-      </dgm:extLst>
-    </dgm:pt>
-    <dgm:pt modelId="{FAC1B746-1F10-401E-8AB8-7D09D037F4D9}" type="pres">
-      <dgm:prSet presAssocID="{87FAA01B-FE04-4990-8B8D-93EF8F0334C8}" presName="spaceRect" presStyleCnt="0"/>
+    <dgm:pt modelId="{05F585F3-0958-6D4C-ACAD-A5CE501DD963}" type="pres">
+      <dgm:prSet presAssocID="{87FAA01B-FE04-4990-8B8D-93EF8F0334C8}" presName="tx1" presStyleLbl="revTx" presStyleIdx="0" presStyleCnt="7"/>
       <dgm:spPr/>
     </dgm:pt>
-    <dgm:pt modelId="{0F84B23C-E371-47F3-A074-495AA21187D2}" type="pres">
-      <dgm:prSet presAssocID="{87FAA01B-FE04-4990-8B8D-93EF8F0334C8}" presName="textRect" presStyleLbl="revTx" presStyleIdx="0" presStyleCnt="7">
-        <dgm:presLayoutVars>
-          <dgm:chMax val="1"/>
-          <dgm:chPref val="1"/>
-        </dgm:presLayoutVars>
-      </dgm:prSet>
+    <dgm:pt modelId="{9D03F634-7684-9049-9447-A2135CAACFB3}" type="pres">
+      <dgm:prSet presAssocID="{87FAA01B-FE04-4990-8B8D-93EF8F0334C8}" presName="vert1" presStyleCnt="0"/>
       <dgm:spPr/>
     </dgm:pt>
-    <dgm:pt modelId="{EB100C3A-705D-4E34-BB61-9BCE5C343E04}" type="pres">
-      <dgm:prSet presAssocID="{5784F7D3-1554-4B6E-9B03-9190CB342F7A}" presName="sibTrans" presStyleCnt="0"/>
+    <dgm:pt modelId="{C7C83C3F-6289-B346-B885-B2ADEA94A996}" type="pres">
+      <dgm:prSet presAssocID="{DB193872-305A-4B87-B772-5389CBA4A0FE}" presName="thickLine" presStyleLbl="alignNode1" presStyleIdx="1" presStyleCnt="7"/>
       <dgm:spPr/>
     </dgm:pt>
-    <dgm:pt modelId="{07B2276A-81AB-45FC-96D3-6E964AF21B45}" type="pres">
-      <dgm:prSet presAssocID="{DB193872-305A-4B87-B772-5389CBA4A0FE}" presName="compNode" presStyleCnt="0"/>
+    <dgm:pt modelId="{1A2469F3-6249-D241-B8D7-720A27E3C5EA}" type="pres">
+      <dgm:prSet presAssocID="{DB193872-305A-4B87-B772-5389CBA4A0FE}" presName="horz1" presStyleCnt="0"/>
       <dgm:spPr/>
     </dgm:pt>
-    <dgm:pt modelId="{7737C683-5C27-40AA-8674-E82B864C11A5}" type="pres">
-      <dgm:prSet presAssocID="{DB193872-305A-4B87-B772-5389CBA4A0FE}" presName="iconBgRect" presStyleLbl="bgShp" presStyleIdx="1" presStyleCnt="7"/>
+    <dgm:pt modelId="{5E47D8DD-0986-1F4C-8688-B175846769D4}" type="pres">
+      <dgm:prSet presAssocID="{DB193872-305A-4B87-B772-5389CBA4A0FE}" presName="tx1" presStyleLbl="revTx" presStyleIdx="1" presStyleCnt="7"/>
       <dgm:spPr/>
     </dgm:pt>
-    <dgm:pt modelId="{AE7FA6C0-4BE9-4AAC-9DC8-12B4A8B6C097}" type="pres">
-      <dgm:prSet presAssocID="{DB193872-305A-4B87-B772-5389CBA4A0FE}" presName="iconRect" presStyleLbl="node1" presStyleIdx="1" presStyleCnt="7"/>
-      <dgm:spPr>
-        <a:blipFill>
-          <a:blip xmlns:r="http://schemas.openxmlformats.org/officeDocument/2006/relationships" r:embed="rId3">
-            <a:extLst>
-              <a:ext uri="{28A0092B-C50C-407E-A947-70E740481C1C}">
-                <a14:useLocalDpi xmlns:a14="http://schemas.microsoft.com/office/drawing/2010/main" val="0"/>
-              </a:ext>
-              <a:ext uri="{96DAC541-7B7A-43D3-8B79-37D633B846F1}">
-                <asvg:svgBlip xmlns:asvg="http://schemas.microsoft.com/office/drawing/2016/SVG/main" r:embed="rId4"/>
-              </a:ext>
-            </a:extLst>
-          </a:blip>
-          <a:stretch>
-            <a:fillRect/>
-          </a:stretch>
-        </a:blipFill>
-      </dgm:spPr>
-      <dgm:extLst>
-        <a:ext uri="{E40237B7-FDA0-4F09-8148-C483321AD2D9}">
-          <dgm14:cNvPr xmlns:dgm14="http://schemas.microsoft.com/office/drawing/2010/diagram" id="0" name="" descr="Bar chart"/>
-        </a:ext>
-      </dgm:extLst>
-    </dgm:pt>
-    <dgm:pt modelId="{9E087BFB-8C9F-4688-A7A3-B7712B31C578}" type="pres">
-      <dgm:prSet presAssocID="{DB193872-305A-4B87-B772-5389CBA4A0FE}" presName="spaceRect" presStyleCnt="0"/>
+    <dgm:pt modelId="{58AC9EE7-644A-294F-B074-40E8AAF9B1EA}" type="pres">
+      <dgm:prSet presAssocID="{DB193872-305A-4B87-B772-5389CBA4A0FE}" presName="vert1" presStyleCnt="0"/>
       <dgm:spPr/>
     </dgm:pt>
-    <dgm:pt modelId="{6F68E393-6AF5-4F8A-9D74-7B0153D994C4}" type="pres">
-      <dgm:prSet presAssocID="{DB193872-305A-4B87-B772-5389CBA4A0FE}" presName="textRect" presStyleLbl="revTx" presStyleIdx="1" presStyleCnt="7">
-        <dgm:presLayoutVars>
-          <dgm:chMax val="1"/>
-          <dgm:chPref val="1"/>
-        </dgm:presLayoutVars>
-      </dgm:prSet>
+    <dgm:pt modelId="{52B514F3-D55E-B84F-B1A4-4B9BAE029A06}" type="pres">
+      <dgm:prSet presAssocID="{663115C6-539C-4765-894E-FFEA8097FAE8}" presName="thickLine" presStyleLbl="alignNode1" presStyleIdx="2" presStyleCnt="7"/>
       <dgm:spPr/>
     </dgm:pt>
-    <dgm:pt modelId="{9BF6E0C5-54A4-4C9A-8AE1-59EF5B46BCE3}" type="pres">
-      <dgm:prSet presAssocID="{C34A3BE6-8F96-49FE-BC77-DC49B7B93E13}" presName="sibTrans" presStyleCnt="0"/>
+    <dgm:pt modelId="{0E07D636-1070-C744-A1CC-30CDD917B0E7}" type="pres">
+      <dgm:prSet presAssocID="{663115C6-539C-4765-894E-FFEA8097FAE8}" presName="horz1" presStyleCnt="0"/>
       <dgm:spPr/>
     </dgm:pt>
-    <dgm:pt modelId="{1B97FB63-C4BB-44E8-A604-4DCCA1FC3E10}" type="pres">
-      <dgm:prSet presAssocID="{663115C6-539C-4765-894E-FFEA8097FAE8}" presName="compNode" presStyleCnt="0"/>
+    <dgm:pt modelId="{3AA19037-EF22-7243-BBB4-2DE22086B85E}" type="pres">
+      <dgm:prSet presAssocID="{663115C6-539C-4765-894E-FFEA8097FAE8}" presName="tx1" presStyleLbl="revTx" presStyleIdx="2" presStyleCnt="7"/>
       <dgm:spPr/>
     </dgm:pt>
-    <dgm:pt modelId="{238F2A96-66A3-4EEE-9C60-96C4DB39771D}" type="pres">
-      <dgm:prSet presAssocID="{663115C6-539C-4765-894E-FFEA8097FAE8}" presName="iconBgRect" presStyleLbl="bgShp" presStyleIdx="2" presStyleCnt="7"/>
+    <dgm:pt modelId="{1AF4E430-7190-CA43-8740-4123C1848A65}" type="pres">
+      <dgm:prSet presAssocID="{663115C6-539C-4765-894E-FFEA8097FAE8}" presName="vert1" presStyleCnt="0"/>
       <dgm:spPr/>
     </dgm:pt>
-    <dgm:pt modelId="{22DC39AE-674B-456A-AF83-E2DB34D22B41}" type="pres">
-      <dgm:prSet presAssocID="{663115C6-539C-4765-894E-FFEA8097FAE8}" presName="iconRect" presStyleLbl="node1" presStyleIdx="2" presStyleCnt="7"/>
-      <dgm:spPr>
-        <a:blipFill>
-          <a:blip xmlns:r="http://schemas.openxmlformats.org/officeDocument/2006/relationships" r:embed="rId5">
-            <a:extLst>
-              <a:ext uri="{28A0092B-C50C-407E-A947-70E740481C1C}">
-                <a14:useLocalDpi xmlns:a14="http://schemas.microsoft.com/office/drawing/2010/main" val="0"/>
-              </a:ext>
-              <a:ext uri="{96DAC541-7B7A-43D3-8B79-37D633B846F1}">
-                <asvg:svgBlip xmlns:asvg="http://schemas.microsoft.com/office/drawing/2016/SVG/main" r:embed="rId6"/>
-              </a:ext>
-            </a:extLst>
-          </a:blip>
-          <a:stretch>
-            <a:fillRect/>
-          </a:stretch>
-        </a:blipFill>
-      </dgm:spPr>
-      <dgm:extLst>
-        <a:ext uri="{E40237B7-FDA0-4F09-8148-C483321AD2D9}">
-          <dgm14:cNvPr xmlns:dgm14="http://schemas.microsoft.com/office/drawing/2010/diagram" id="0" name="" descr="Magnifying glass"/>
-        </a:ext>
-      </dgm:extLst>
-    </dgm:pt>
-    <dgm:pt modelId="{20E1376A-A55B-4780-BA4A-7563B04F57AA}" type="pres">
-      <dgm:prSet presAssocID="{663115C6-539C-4765-894E-FFEA8097FAE8}" presName="spaceRect" presStyleCnt="0"/>
+    <dgm:pt modelId="{0758DFA1-3AC5-E843-BB97-B7FE3EBA3FB8}" type="pres">
+      <dgm:prSet presAssocID="{1BB8B8A7-761A-403B-99A9-3ECF0E8514F5}" presName="thickLine" presStyleLbl="alignNode1" presStyleIdx="3" presStyleCnt="7"/>
       <dgm:spPr/>
     </dgm:pt>
-    <dgm:pt modelId="{B6FD67D3-EDA1-48F6-81EE-74266433FEAA}" type="pres">
-      <dgm:prSet presAssocID="{663115C6-539C-4765-894E-FFEA8097FAE8}" presName="textRect" presStyleLbl="revTx" presStyleIdx="2" presStyleCnt="7">
-        <dgm:presLayoutVars>
-          <dgm:chMax val="1"/>
-          <dgm:chPref val="1"/>
-        </dgm:presLayoutVars>
-      </dgm:prSet>
+    <dgm:pt modelId="{268654FE-4B3D-6D40-B9F3-B937F3A6304A}" type="pres">
+      <dgm:prSet presAssocID="{1BB8B8A7-761A-403B-99A9-3ECF0E8514F5}" presName="horz1" presStyleCnt="0"/>
       <dgm:spPr/>
     </dgm:pt>
-    <dgm:pt modelId="{88E007BF-AD8E-4420-A4C2-EB1F8D1FBCDB}" type="pres">
-      <dgm:prSet presAssocID="{79B325C0-9F3C-4C73-B058-F85106B271E3}" presName="sibTrans" presStyleCnt="0"/>
+    <dgm:pt modelId="{AA346AE6-2276-4A46-BC6B-F98832AC9508}" type="pres">
+      <dgm:prSet presAssocID="{1BB8B8A7-761A-403B-99A9-3ECF0E8514F5}" presName="tx1" presStyleLbl="revTx" presStyleIdx="3" presStyleCnt="7"/>
       <dgm:spPr/>
     </dgm:pt>
-    <dgm:pt modelId="{75C67FAD-56C9-40EE-9C22-A7A95B04DDCA}" type="pres">
-      <dgm:prSet presAssocID="{1BB8B8A7-761A-403B-99A9-3ECF0E8514F5}" presName="compNode" presStyleCnt="0"/>
+    <dgm:pt modelId="{C14541B2-834F-DE48-ACFD-1A9212966B8A}" type="pres">
+      <dgm:prSet presAssocID="{1BB8B8A7-761A-403B-99A9-3ECF0E8514F5}" presName="vert1" presStyleCnt="0"/>
       <dgm:spPr/>
     </dgm:pt>
-    <dgm:pt modelId="{04A75B45-C7A6-45C0-8037-2AF4B8824BFF}" type="pres">
-      <dgm:prSet presAssocID="{1BB8B8A7-761A-403B-99A9-3ECF0E8514F5}" presName="iconBgRect" presStyleLbl="bgShp" presStyleIdx="3" presStyleCnt="7"/>
+    <dgm:pt modelId="{F9A18106-0726-4447-A05B-C2EF9665FCC7}" type="pres">
+      <dgm:prSet presAssocID="{1692F536-7005-4279-B761-4E164ABC7E46}" presName="thickLine" presStyleLbl="alignNode1" presStyleIdx="4" presStyleCnt="7"/>
       <dgm:spPr/>
     </dgm:pt>
-    <dgm:pt modelId="{34CF9674-128E-44A4-97BC-3FB413135D3C}" type="pres">
-      <dgm:prSet presAssocID="{1BB8B8A7-761A-403B-99A9-3ECF0E8514F5}" presName="iconRect" presStyleLbl="node1" presStyleIdx="3" presStyleCnt="7"/>
-      <dgm:spPr>
-        <a:blipFill>
-          <a:blip xmlns:r="http://schemas.openxmlformats.org/officeDocument/2006/relationships" r:embed="rId7">
-            <a:extLst>
-              <a:ext uri="{28A0092B-C50C-407E-A947-70E740481C1C}">
-                <a14:useLocalDpi xmlns:a14="http://schemas.microsoft.com/office/drawing/2010/main" val="0"/>
-              </a:ext>
-              <a:ext uri="{96DAC541-7B7A-43D3-8B79-37D633B846F1}">
-                <asvg:svgBlip xmlns:asvg="http://schemas.microsoft.com/office/drawing/2016/SVG/main" r:embed="rId8"/>
-              </a:ext>
-            </a:extLst>
-          </a:blip>
-          <a:stretch>
-            <a:fillRect/>
-          </a:stretch>
-        </a:blipFill>
-      </dgm:spPr>
-      <dgm:extLst>
-        <a:ext uri="{E40237B7-FDA0-4F09-8148-C483321AD2D9}">
-          <dgm14:cNvPr xmlns:dgm14="http://schemas.microsoft.com/office/drawing/2010/diagram" id="0" name="" descr="Tag"/>
-        </a:ext>
-      </dgm:extLst>
-    </dgm:pt>
-    <dgm:pt modelId="{F7A4CC74-95D7-4191-B519-AF159B3B706A}" type="pres">
-      <dgm:prSet presAssocID="{1BB8B8A7-761A-403B-99A9-3ECF0E8514F5}" presName="spaceRect" presStyleCnt="0"/>
+    <dgm:pt modelId="{AC49934A-C5ED-B948-966E-6996C86D182C}" type="pres">
+      <dgm:prSet presAssocID="{1692F536-7005-4279-B761-4E164ABC7E46}" presName="horz1" presStyleCnt="0"/>
       <dgm:spPr/>
     </dgm:pt>
-    <dgm:pt modelId="{F0F5AA22-769E-4511-A7E4-1DBFCEBFC33C}" type="pres">
-      <dgm:prSet presAssocID="{1BB8B8A7-761A-403B-99A9-3ECF0E8514F5}" presName="textRect" presStyleLbl="revTx" presStyleIdx="3" presStyleCnt="7">
-        <dgm:presLayoutVars>
-          <dgm:chMax val="1"/>
-          <dgm:chPref val="1"/>
-        </dgm:presLayoutVars>
-      </dgm:prSet>
+    <dgm:pt modelId="{77E6E2C3-79A5-B046-9BBB-BAA527100FB6}" type="pres">
+      <dgm:prSet presAssocID="{1692F536-7005-4279-B761-4E164ABC7E46}" presName="tx1" presStyleLbl="revTx" presStyleIdx="4" presStyleCnt="7"/>
       <dgm:spPr/>
     </dgm:pt>
-    <dgm:pt modelId="{EFE0F96E-46DD-4521-A9D9-F37BB853058F}" type="pres">
-      <dgm:prSet presAssocID="{17C46723-AA43-4A7A-A091-FE90544F09B4}" presName="sibTrans" presStyleCnt="0"/>
+    <dgm:pt modelId="{7F6B0773-0CB9-3F4F-BC30-FBF875B51CC2}" type="pres">
+      <dgm:prSet presAssocID="{1692F536-7005-4279-B761-4E164ABC7E46}" presName="vert1" presStyleCnt="0"/>
       <dgm:spPr/>
     </dgm:pt>
-    <dgm:pt modelId="{529AECBC-8691-4A86-9B4D-0B201A8CB896}" type="pres">
-      <dgm:prSet presAssocID="{1692F536-7005-4279-B761-4E164ABC7E46}" presName="compNode" presStyleCnt="0"/>
+    <dgm:pt modelId="{8618B720-E39D-E447-8883-0F88EBBEE0D0}" type="pres">
+      <dgm:prSet presAssocID="{7348BD6F-AEBB-4FD1-B719-1F2D8D05A367}" presName="thickLine" presStyleLbl="alignNode1" presStyleIdx="5" presStyleCnt="7"/>
       <dgm:spPr/>
     </dgm:pt>
-    <dgm:pt modelId="{95DDEBC6-7A78-4FB1-B086-9DA5D068570E}" type="pres">
-      <dgm:prSet presAssocID="{1692F536-7005-4279-B761-4E164ABC7E46}" presName="iconBgRect" presStyleLbl="bgShp" presStyleIdx="4" presStyleCnt="7"/>
+    <dgm:pt modelId="{B2FD43BC-A6F1-B54D-8CAD-65455202AAB7}" type="pres">
+      <dgm:prSet presAssocID="{7348BD6F-AEBB-4FD1-B719-1F2D8D05A367}" presName="horz1" presStyleCnt="0"/>
       <dgm:spPr/>
     </dgm:pt>
-    <dgm:pt modelId="{DC75B735-A84A-47B1-AFA4-01BDC4088474}" type="pres">
-      <dgm:prSet presAssocID="{1692F536-7005-4279-B761-4E164ABC7E46}" presName="iconRect" presStyleLbl="node1" presStyleIdx="4" presStyleCnt="7"/>
-      <dgm:spPr>
-        <a:blipFill>
-          <a:blip xmlns:r="http://schemas.openxmlformats.org/officeDocument/2006/relationships" r:embed="rId9">
-            <a:extLst>
-              <a:ext uri="{28A0092B-C50C-407E-A947-70E740481C1C}">
-                <a14:useLocalDpi xmlns:a14="http://schemas.microsoft.com/office/drawing/2010/main" val="0"/>
-              </a:ext>
-              <a:ext uri="{96DAC541-7B7A-43D3-8B79-37D633B846F1}">
-                <asvg:svgBlip xmlns:asvg="http://schemas.microsoft.com/office/drawing/2016/SVG/main" r:embed="rId10"/>
-              </a:ext>
-            </a:extLst>
-          </a:blip>
-          <a:stretch>
-            <a:fillRect/>
-          </a:stretch>
-        </a:blipFill>
-      </dgm:spPr>
-      <dgm:extLst>
-        <a:ext uri="{E40237B7-FDA0-4F09-8148-C483321AD2D9}">
-          <dgm14:cNvPr xmlns:dgm14="http://schemas.microsoft.com/office/drawing/2010/diagram" id="0" name="" descr="Gears"/>
-        </a:ext>
-      </dgm:extLst>
-    </dgm:pt>
-    <dgm:pt modelId="{1B1EEFE2-AD4D-45C3-B13F-7A6D1D0A368A}" type="pres">
-      <dgm:prSet presAssocID="{1692F536-7005-4279-B761-4E164ABC7E46}" presName="spaceRect" presStyleCnt="0"/>
+    <dgm:pt modelId="{7502EBF9-1C77-AA44-9957-27A80BFC27C5}" type="pres">
+      <dgm:prSet presAssocID="{7348BD6F-AEBB-4FD1-B719-1F2D8D05A367}" presName="tx1" presStyleLbl="revTx" presStyleIdx="5" presStyleCnt="7"/>
       <dgm:spPr/>
     </dgm:pt>
-    <dgm:pt modelId="{A97B7A72-CFA4-46D9-AFB7-85DBA1E200D3}" type="pres">
-      <dgm:prSet presAssocID="{1692F536-7005-4279-B761-4E164ABC7E46}" presName="textRect" presStyleLbl="revTx" presStyleIdx="4" presStyleCnt="7">
-        <dgm:presLayoutVars>
-          <dgm:chMax val="1"/>
-          <dgm:chPref val="1"/>
-        </dgm:presLayoutVars>
-      </dgm:prSet>
+    <dgm:pt modelId="{C4AFE05E-E31C-BD45-863B-1F05E0FD5F4D}" type="pres">
+      <dgm:prSet presAssocID="{7348BD6F-AEBB-4FD1-B719-1F2D8D05A367}" presName="vert1" presStyleCnt="0"/>
       <dgm:spPr/>
     </dgm:pt>
-    <dgm:pt modelId="{B978C07D-E5D7-41F6-B00A-D4E168284821}" type="pres">
-      <dgm:prSet presAssocID="{E96D7767-1111-4B5B-9ECB-24A35767CAC7}" presName="sibTrans" presStyleCnt="0"/>
+    <dgm:pt modelId="{58785474-204E-4C49-92CA-784B66D2E897}" type="pres">
+      <dgm:prSet presAssocID="{9CA83777-9BB1-414E-BC77-346AE662A804}" presName="thickLine" presStyleLbl="alignNode1" presStyleIdx="6" presStyleCnt="7"/>
       <dgm:spPr/>
     </dgm:pt>
-    <dgm:pt modelId="{EB093545-1505-4CA2-A5A1-B041EB87E72A}" type="pres">
-      <dgm:prSet presAssocID="{7348BD6F-AEBB-4FD1-B719-1F2D8D05A367}" presName="compNode" presStyleCnt="0"/>
+    <dgm:pt modelId="{51C077FA-7E7D-0C48-B24B-5935BF3354AC}" type="pres">
+      <dgm:prSet presAssocID="{9CA83777-9BB1-414E-BC77-346AE662A804}" presName="horz1" presStyleCnt="0"/>
       <dgm:spPr/>
     </dgm:pt>
-    <dgm:pt modelId="{58F5ED13-A3F7-4ADF-927F-CA39F01553A9}" type="pres">
-      <dgm:prSet presAssocID="{7348BD6F-AEBB-4FD1-B719-1F2D8D05A367}" presName="iconBgRect" presStyleLbl="bgShp" presStyleIdx="5" presStyleCnt="7"/>
+    <dgm:pt modelId="{B6D4D8ED-EE98-0D4C-9F8B-C9033D658274}" type="pres">
+      <dgm:prSet presAssocID="{9CA83777-9BB1-414E-BC77-346AE662A804}" presName="tx1" presStyleLbl="revTx" presStyleIdx="6" presStyleCnt="7"/>
       <dgm:spPr/>
     </dgm:pt>
-    <dgm:pt modelId="{960A88A1-50CF-4CAD-8EF4-CDB36579BBF1}" type="pres">
-      <dgm:prSet presAssocID="{7348BD6F-AEBB-4FD1-B719-1F2D8D05A367}" presName="iconRect" presStyleLbl="node1" presStyleIdx="5" presStyleCnt="7"/>
-      <dgm:spPr>
-        <a:blipFill>
-          <a:blip xmlns:r="http://schemas.openxmlformats.org/officeDocument/2006/relationships" r:embed="rId11">
-            <a:extLst>
-              <a:ext uri="{28A0092B-C50C-407E-A947-70E740481C1C}">
-                <a14:useLocalDpi xmlns:a14="http://schemas.microsoft.com/office/drawing/2010/main" val="0"/>
-              </a:ext>
-              <a:ext uri="{96DAC541-7B7A-43D3-8B79-37D633B846F1}">
-                <asvg:svgBlip xmlns:asvg="http://schemas.microsoft.com/office/drawing/2016/SVG/main" r:embed="rId12"/>
-              </a:ext>
-            </a:extLst>
-          </a:blip>
-          <a:stretch>
-            <a:fillRect/>
-          </a:stretch>
-        </a:blipFill>
-      </dgm:spPr>
-      <dgm:extLst>
-        <a:ext uri="{E40237B7-FDA0-4F09-8148-C483321AD2D9}">
-          <dgm14:cNvPr xmlns:dgm14="http://schemas.microsoft.com/office/drawing/2010/diagram" id="0" name="" descr="Tick"/>
-        </a:ext>
-      </dgm:extLst>
-    </dgm:pt>
-    <dgm:pt modelId="{6322C0D4-6296-4C33-8CE5-CC2AF4B595CB}" type="pres">
-      <dgm:prSet presAssocID="{7348BD6F-AEBB-4FD1-B719-1F2D8D05A367}" presName="spaceRect" presStyleCnt="0"/>
-      <dgm:spPr/>
-    </dgm:pt>
-    <dgm:pt modelId="{9CBFA9F2-F57F-4FB9-8F18-19E1CE5B0AA7}" type="pres">
-      <dgm:prSet presAssocID="{7348BD6F-AEBB-4FD1-B719-1F2D8D05A367}" presName="textRect" presStyleLbl="revTx" presStyleIdx="5" presStyleCnt="7">
-        <dgm:presLayoutVars>
-          <dgm:chMax val="1"/>
-          <dgm:chPref val="1"/>
-        </dgm:presLayoutVars>
-      </dgm:prSet>
-      <dgm:spPr/>
-    </dgm:pt>
-    <dgm:pt modelId="{AE882D23-A740-464F-A366-BCD2B9B53052}" type="pres">
-      <dgm:prSet presAssocID="{4663C2FC-4DBB-499F-A38E-3D5C4AAAA05E}" presName="sibTrans" presStyleCnt="0"/>
-      <dgm:spPr/>
-    </dgm:pt>
-    <dgm:pt modelId="{5DEDD1AE-03BD-4D9A-8E25-2E16EDD7042E}" type="pres">
-      <dgm:prSet presAssocID="{9CA83777-9BB1-414E-BC77-346AE662A804}" presName="compNode" presStyleCnt="0"/>
-      <dgm:spPr/>
-    </dgm:pt>
-    <dgm:pt modelId="{FBAFA1A7-9588-4EAA-9AC4-96AE829226C4}" type="pres">
-      <dgm:prSet presAssocID="{9CA83777-9BB1-414E-BC77-346AE662A804}" presName="iconBgRect" presStyleLbl="bgShp" presStyleIdx="6" presStyleCnt="7"/>
-      <dgm:spPr/>
-    </dgm:pt>
-    <dgm:pt modelId="{9EADA870-72F4-4D39-AF6A-82F81DC7E3B7}" type="pres">
-      <dgm:prSet presAssocID="{9CA83777-9BB1-414E-BC77-346AE662A804}" presName="iconRect" presStyleLbl="node1" presStyleIdx="6" presStyleCnt="7"/>
-      <dgm:spPr>
-        <a:blipFill>
-          <a:blip xmlns:r="http://schemas.openxmlformats.org/officeDocument/2006/relationships" r:embed="rId13">
-            <a:extLst>
-              <a:ext uri="{28A0092B-C50C-407E-A947-70E740481C1C}">
-                <a14:useLocalDpi xmlns:a14="http://schemas.microsoft.com/office/drawing/2010/main" val="0"/>
-              </a:ext>
-              <a:ext uri="{96DAC541-7B7A-43D3-8B79-37D633B846F1}">
-                <asvg:svgBlip xmlns:asvg="http://schemas.microsoft.com/office/drawing/2016/SVG/main" r:embed="rId14"/>
-              </a:ext>
-            </a:extLst>
-          </a:blip>
-          <a:stretch>
-            <a:fillRect/>
-          </a:stretch>
-        </a:blipFill>
-      </dgm:spPr>
-      <dgm:extLst>
-        <a:ext uri="{E40237B7-FDA0-4F09-8148-C483321AD2D9}">
-          <dgm14:cNvPr xmlns:dgm14="http://schemas.microsoft.com/office/drawing/2010/diagram" id="0" name="" descr="Future"/>
-        </a:ext>
-      </dgm:extLst>
-    </dgm:pt>
-    <dgm:pt modelId="{6B4B143F-7783-4855-ACE4-53CF181AD9B1}" type="pres">
-      <dgm:prSet presAssocID="{9CA83777-9BB1-414E-BC77-346AE662A804}" presName="spaceRect" presStyleCnt="0"/>
-      <dgm:spPr/>
-    </dgm:pt>
-    <dgm:pt modelId="{F12AA22A-B1BF-4037-91A8-1FA70E50454A}" type="pres">
-      <dgm:prSet presAssocID="{9CA83777-9BB1-414E-BC77-346AE662A804}" presName="textRect" presStyleLbl="revTx" presStyleIdx="6" presStyleCnt="7">
-        <dgm:presLayoutVars>
-          <dgm:chMax val="1"/>
-          <dgm:chPref val="1"/>
-        </dgm:presLayoutVars>
-      </dgm:prSet>
+    <dgm:pt modelId="{3E48B1D6-6AA4-7044-902F-A1017875CDD7}" type="pres">
+      <dgm:prSet presAssocID="{9CA83777-9BB1-414E-BC77-346AE662A804}" presName="vert1" presStyleCnt="0"/>
       <dgm:spPr/>
     </dgm:pt>
   </dgm:ptLst>
   <dgm:cxnLst>
-    <dgm:cxn modelId="{2DA4BB0F-9157-446F-BD4E-2C8B77B1A70F}" type="presOf" srcId="{87FAA01B-FE04-4990-8B8D-93EF8F0334C8}" destId="{0F84B23C-E371-47F3-A074-495AA21187D2}" srcOrd="0" destOrd="0" presId="urn:microsoft.com/office/officeart/2018/5/layout/IconCircleLabelList"/>
-    <dgm:cxn modelId="{0342C510-1120-4FD0-A414-E08CFE492D6C}" type="presOf" srcId="{1BB8B8A7-761A-403B-99A9-3ECF0E8514F5}" destId="{F0F5AA22-769E-4511-A7E4-1DBFCEBFC33C}" srcOrd="0" destOrd="0" presId="urn:microsoft.com/office/officeart/2018/5/layout/IconCircleLabelList"/>
+    <dgm:cxn modelId="{1440EF04-1102-A048-A992-9B330BA68522}" type="presOf" srcId="{1692F536-7005-4279-B761-4E164ABC7E46}" destId="{77E6E2C3-79A5-B046-9BBB-BAA527100FB6}" srcOrd="0" destOrd="0" presId="urn:microsoft.com/office/officeart/2008/layout/LinedList"/>
+    <dgm:cxn modelId="{2D0DF813-B975-3C41-B5AB-6DBEF4374EE7}" type="presOf" srcId="{7348BD6F-AEBB-4FD1-B719-1F2D8D05A367}" destId="{7502EBF9-1C77-AA44-9957-27A80BFC27C5}" srcOrd="0" destOrd="0" presId="urn:microsoft.com/office/officeart/2008/layout/LinedList"/>
     <dgm:cxn modelId="{1863D52B-01B3-4C93-96BB-ECDDC6F40483}" srcId="{CE27370B-858D-493E-BD34-0FA799B5A297}" destId="{87FAA01B-FE04-4990-8B8D-93EF8F0334C8}" srcOrd="0" destOrd="0" parTransId="{E600A9A8-7153-4872-A269-D793FB7502FE}" sibTransId="{5784F7D3-1554-4B6E-9B03-9190CB342F7A}"/>
-    <dgm:cxn modelId="{F36AAA3C-FD64-4D0C-862D-EE7B2657AD8E}" type="presOf" srcId="{DB193872-305A-4B87-B772-5389CBA4A0FE}" destId="{6F68E393-6AF5-4F8A-9D74-7B0153D994C4}" srcOrd="0" destOrd="0" presId="urn:microsoft.com/office/officeart/2018/5/layout/IconCircleLabelList"/>
+    <dgm:cxn modelId="{B1537B2E-55AC-D34C-A02E-2957BC09EFB3}" type="presOf" srcId="{9CA83777-9BB1-414E-BC77-346AE662A804}" destId="{B6D4D8ED-EE98-0D4C-9F8B-C9033D658274}" srcOrd="0" destOrd="0" presId="urn:microsoft.com/office/officeart/2008/layout/LinedList"/>
     <dgm:cxn modelId="{2410824C-CE78-49E6-9ED4-37DEA88E6120}" srcId="{CE27370B-858D-493E-BD34-0FA799B5A297}" destId="{1BB8B8A7-761A-403B-99A9-3ECF0E8514F5}" srcOrd="3" destOrd="0" parTransId="{0FEFCAB4-9F69-4171-884F-23C4CE8146F0}" sibTransId="{17C46723-AA43-4A7A-A091-FE90544F09B4}"/>
     <dgm:cxn modelId="{D5369957-DB6F-46C9-8FF0-D57354E33FA1}" srcId="{CE27370B-858D-493E-BD34-0FA799B5A297}" destId="{DB193872-305A-4B87-B772-5389CBA4A0FE}" srcOrd="1" destOrd="0" parTransId="{7CAE4FAC-FD85-4F16-AD82-EB5E20869801}" sibTransId="{C34A3BE6-8F96-49FE-BC77-DC49B7B93E13}"/>
-    <dgm:cxn modelId="{D00CA261-E601-4AF9-AA6D-37194E070605}" type="presOf" srcId="{7348BD6F-AEBB-4FD1-B719-1F2D8D05A367}" destId="{9CBFA9F2-F57F-4FB9-8F18-19E1CE5B0AA7}" srcOrd="0" destOrd="0" presId="urn:microsoft.com/office/officeart/2018/5/layout/IconCircleLabelList"/>
     <dgm:cxn modelId="{B13ACF63-270D-4C81-B139-E7F4D74321B4}" srcId="{CE27370B-858D-493E-BD34-0FA799B5A297}" destId="{7348BD6F-AEBB-4FD1-B719-1F2D8D05A367}" srcOrd="5" destOrd="0" parTransId="{FA1337A3-9B2A-48FB-A44D-8A1B4AE4C079}" sibTransId="{4663C2FC-4DBB-499F-A38E-3D5C4AAAA05E}"/>
-    <dgm:cxn modelId="{681E9767-6136-4EA0-A90D-40BB89E5E109}" type="presOf" srcId="{9CA83777-9BB1-414E-BC77-346AE662A804}" destId="{F12AA22A-B1BF-4037-91A8-1FA70E50454A}" srcOrd="0" destOrd="0" presId="urn:microsoft.com/office/officeart/2018/5/layout/IconCircleLabelList"/>
-    <dgm:cxn modelId="{75C46473-20DD-4D9E-8F17-3522506D38C9}" type="presOf" srcId="{663115C6-539C-4765-894E-FFEA8097FAE8}" destId="{B6FD67D3-EDA1-48F6-81EE-74266433FEAA}" srcOrd="0" destOrd="0" presId="urn:microsoft.com/office/officeart/2018/5/layout/IconCircleLabelList"/>
-    <dgm:cxn modelId="{864A6EA8-27BD-4E1A-BA0E-D21F6D91E708}" type="presOf" srcId="{1692F536-7005-4279-B761-4E164ABC7E46}" destId="{A97B7A72-CFA4-46D9-AFB7-85DBA1E200D3}" srcOrd="0" destOrd="0" presId="urn:microsoft.com/office/officeart/2018/5/layout/IconCircleLabelList"/>
+    <dgm:cxn modelId="{A4DA2C78-D0E2-2E41-92B7-09CE5EA0EA54}" type="presOf" srcId="{1BB8B8A7-761A-403B-99A9-3ECF0E8514F5}" destId="{AA346AE6-2276-4A46-BC6B-F98832AC9508}" srcOrd="0" destOrd="0" presId="urn:microsoft.com/office/officeart/2008/layout/LinedList"/>
+    <dgm:cxn modelId="{2B52F078-6904-2041-9588-9055E03CEA6E}" type="presOf" srcId="{663115C6-539C-4765-894E-FFEA8097FAE8}" destId="{3AA19037-EF22-7243-BBB4-2DE22086B85E}" srcOrd="0" destOrd="0" presId="urn:microsoft.com/office/officeart/2008/layout/LinedList"/>
     <dgm:cxn modelId="{094FC3AE-8765-4878-B5B8-74C6A01D3F3A}" srcId="{CE27370B-858D-493E-BD34-0FA799B5A297}" destId="{1692F536-7005-4279-B761-4E164ABC7E46}" srcOrd="4" destOrd="0" parTransId="{1E8FA77E-2818-4180-9A80-F202C0754424}" sibTransId="{E96D7767-1111-4B5B-9ECB-24A35767CAC7}"/>
-    <dgm:cxn modelId="{DF239EB3-D2AD-44C5-A968-77978215A445}" type="presOf" srcId="{CE27370B-858D-493E-BD34-0FA799B5A297}" destId="{14B7C387-312F-4EE6-99B2-90BA88D50279}" srcOrd="0" destOrd="0" presId="urn:microsoft.com/office/officeart/2018/5/layout/IconCircleLabelList"/>
+    <dgm:cxn modelId="{021D96B1-F82E-0144-96FC-6A8C5713AFCE}" type="presOf" srcId="{87FAA01B-FE04-4990-8B8D-93EF8F0334C8}" destId="{05F585F3-0958-6D4C-ACAD-A5CE501DD963}" srcOrd="0" destOrd="0" presId="urn:microsoft.com/office/officeart/2008/layout/LinedList"/>
+    <dgm:cxn modelId="{AE5C45B3-D0DA-6A48-8832-738CA7A51757}" type="presOf" srcId="{DB193872-305A-4B87-B772-5389CBA4A0FE}" destId="{5E47D8DD-0986-1F4C-8688-B175846769D4}" srcOrd="0" destOrd="0" presId="urn:microsoft.com/office/officeart/2008/layout/LinedList"/>
     <dgm:cxn modelId="{3EF136CA-628D-4661-B452-BA2EB65253FB}" srcId="{CE27370B-858D-493E-BD34-0FA799B5A297}" destId="{663115C6-539C-4765-894E-FFEA8097FAE8}" srcOrd="2" destOrd="0" parTransId="{CD7CB55B-7285-42A0-B302-95D7A16252EA}" sibTransId="{79B325C0-9F3C-4C73-B058-F85106B271E3}"/>
     <dgm:cxn modelId="{603A5CE1-16F9-4976-93B7-1B61E08F81D2}" srcId="{CE27370B-858D-493E-BD34-0FA799B5A297}" destId="{9CA83777-9BB1-414E-BC77-346AE662A804}" srcOrd="6" destOrd="0" parTransId="{1F595B7F-6086-46BB-A4FF-80FB2AF1D385}" sibTransId="{2B531DE3-1893-40B8-87F3-4E627E36ACAC}"/>
-    <dgm:cxn modelId="{62939F63-EBF8-42BB-A6EA-253A3E5B080A}" type="presParOf" srcId="{14B7C387-312F-4EE6-99B2-90BA88D50279}" destId="{47C2C4C0-714C-4FC6-AE91-F0AFFE858C0E}" srcOrd="0" destOrd="0" presId="urn:microsoft.com/office/officeart/2018/5/layout/IconCircleLabelList"/>
-    <dgm:cxn modelId="{DB2302E8-16AF-4447-8C33-DEF345CDC455}" type="presParOf" srcId="{47C2C4C0-714C-4FC6-AE91-F0AFFE858C0E}" destId="{F084566D-8B52-4D65-9F97-6FBEE01C5886}" srcOrd="0" destOrd="0" presId="urn:microsoft.com/office/officeart/2018/5/layout/IconCircleLabelList"/>
-    <dgm:cxn modelId="{9E1D800D-D932-437E-8B27-0639F8D4E2DB}" type="presParOf" srcId="{47C2C4C0-714C-4FC6-AE91-F0AFFE858C0E}" destId="{AA62569A-9583-49A1-B79D-33E8B82439D0}" srcOrd="1" destOrd="0" presId="urn:microsoft.com/office/officeart/2018/5/layout/IconCircleLabelList"/>
-    <dgm:cxn modelId="{869E88D4-4C43-4020-8DCC-94F30136ECD6}" type="presParOf" srcId="{47C2C4C0-714C-4FC6-AE91-F0AFFE858C0E}" destId="{FAC1B746-1F10-401E-8AB8-7D09D037F4D9}" srcOrd="2" destOrd="0" presId="urn:microsoft.com/office/officeart/2018/5/layout/IconCircleLabelList"/>
-    <dgm:cxn modelId="{2C6D4A35-DEC3-4977-A95F-79A5AB02A55F}" type="presParOf" srcId="{47C2C4C0-714C-4FC6-AE91-F0AFFE858C0E}" destId="{0F84B23C-E371-47F3-A074-495AA21187D2}" srcOrd="3" destOrd="0" presId="urn:microsoft.com/office/officeart/2018/5/layout/IconCircleLabelList"/>
-    <dgm:cxn modelId="{804A910A-94C0-4B71-924A-2733B440363E}" type="presParOf" srcId="{14B7C387-312F-4EE6-99B2-90BA88D50279}" destId="{EB100C3A-705D-4E34-BB61-9BCE5C343E04}" srcOrd="1" destOrd="0" presId="urn:microsoft.com/office/officeart/2018/5/layout/IconCircleLabelList"/>
-    <dgm:cxn modelId="{676AB6AC-60D7-4BAB-A99D-DEBC15E21AE1}" type="presParOf" srcId="{14B7C387-312F-4EE6-99B2-90BA88D50279}" destId="{07B2276A-81AB-45FC-96D3-6E964AF21B45}" srcOrd="2" destOrd="0" presId="urn:microsoft.com/office/officeart/2018/5/layout/IconCircleLabelList"/>
-    <dgm:cxn modelId="{6CA0F4FE-5898-4FC9-890F-750F2EBAAF00}" type="presParOf" srcId="{07B2276A-81AB-45FC-96D3-6E964AF21B45}" destId="{7737C683-5C27-40AA-8674-E82B864C11A5}" srcOrd="0" destOrd="0" presId="urn:microsoft.com/office/officeart/2018/5/layout/IconCircleLabelList"/>
-    <dgm:cxn modelId="{9B76A839-D190-4629-BBAA-EBC60A8727BF}" type="presParOf" srcId="{07B2276A-81AB-45FC-96D3-6E964AF21B45}" destId="{AE7FA6C0-4BE9-4AAC-9DC8-12B4A8B6C097}" srcOrd="1" destOrd="0" presId="urn:microsoft.com/office/officeart/2018/5/layout/IconCircleLabelList"/>
-    <dgm:cxn modelId="{23181F6C-48A2-4FE7-9890-220C863C9A18}" type="presParOf" srcId="{07B2276A-81AB-45FC-96D3-6E964AF21B45}" destId="{9E087BFB-8C9F-4688-A7A3-B7712B31C578}" srcOrd="2" destOrd="0" presId="urn:microsoft.com/office/officeart/2018/5/layout/IconCircleLabelList"/>
-    <dgm:cxn modelId="{29E06899-25F7-4194-9FB1-12883512FC9A}" type="presParOf" srcId="{07B2276A-81AB-45FC-96D3-6E964AF21B45}" destId="{6F68E393-6AF5-4F8A-9D74-7B0153D994C4}" srcOrd="3" destOrd="0" presId="urn:microsoft.com/office/officeart/2018/5/layout/IconCircleLabelList"/>
-    <dgm:cxn modelId="{CB80F487-084D-4870-9E61-3AC6C2550C0F}" type="presParOf" srcId="{14B7C387-312F-4EE6-99B2-90BA88D50279}" destId="{9BF6E0C5-54A4-4C9A-8AE1-59EF5B46BCE3}" srcOrd="3" destOrd="0" presId="urn:microsoft.com/office/officeart/2018/5/layout/IconCircleLabelList"/>
-    <dgm:cxn modelId="{29D63729-5166-48C2-BAA4-74CDD0CBCBAE}" type="presParOf" srcId="{14B7C387-312F-4EE6-99B2-90BA88D50279}" destId="{1B97FB63-C4BB-44E8-A604-4DCCA1FC3E10}" srcOrd="4" destOrd="0" presId="urn:microsoft.com/office/officeart/2018/5/layout/IconCircleLabelList"/>
-    <dgm:cxn modelId="{E80C7C56-DF81-413E-934D-AD72EBBC8E86}" type="presParOf" srcId="{1B97FB63-C4BB-44E8-A604-4DCCA1FC3E10}" destId="{238F2A96-66A3-4EEE-9C60-96C4DB39771D}" srcOrd="0" destOrd="0" presId="urn:microsoft.com/office/officeart/2018/5/layout/IconCircleLabelList"/>
-    <dgm:cxn modelId="{FA1C5D6E-B958-43EE-A796-502B6742A329}" type="presParOf" srcId="{1B97FB63-C4BB-44E8-A604-4DCCA1FC3E10}" destId="{22DC39AE-674B-456A-AF83-E2DB34D22B41}" srcOrd="1" destOrd="0" presId="urn:microsoft.com/office/officeart/2018/5/layout/IconCircleLabelList"/>
-    <dgm:cxn modelId="{7DFC7E69-B300-40A5-90DF-09E0CA6E99F5}" type="presParOf" srcId="{1B97FB63-C4BB-44E8-A604-4DCCA1FC3E10}" destId="{20E1376A-A55B-4780-BA4A-7563B04F57AA}" srcOrd="2" destOrd="0" presId="urn:microsoft.com/office/officeart/2018/5/layout/IconCircleLabelList"/>
-    <dgm:cxn modelId="{C073D3BF-E36C-4DD8-8782-C09B5C90E41D}" type="presParOf" srcId="{1B97FB63-C4BB-44E8-A604-4DCCA1FC3E10}" destId="{B6FD67D3-EDA1-48F6-81EE-74266433FEAA}" srcOrd="3" destOrd="0" presId="urn:microsoft.com/office/officeart/2018/5/layout/IconCircleLabelList"/>
-    <dgm:cxn modelId="{2AB0B17F-8190-4CDC-8EEE-48F4134B5110}" type="presParOf" srcId="{14B7C387-312F-4EE6-99B2-90BA88D50279}" destId="{88E007BF-AD8E-4420-A4C2-EB1F8D1FBCDB}" srcOrd="5" destOrd="0" presId="urn:microsoft.com/office/officeart/2018/5/layout/IconCircleLabelList"/>
-    <dgm:cxn modelId="{8BEFCA65-1E50-4DC8-8123-B770752BFE59}" type="presParOf" srcId="{14B7C387-312F-4EE6-99B2-90BA88D50279}" destId="{75C67FAD-56C9-40EE-9C22-A7A95B04DDCA}" srcOrd="6" destOrd="0" presId="urn:microsoft.com/office/officeart/2018/5/layout/IconCircleLabelList"/>
-    <dgm:cxn modelId="{A83172A3-7DFA-4BB7-8E9C-F98CE705C7DC}" type="presParOf" srcId="{75C67FAD-56C9-40EE-9C22-A7A95B04DDCA}" destId="{04A75B45-C7A6-45C0-8037-2AF4B8824BFF}" srcOrd="0" destOrd="0" presId="urn:microsoft.com/office/officeart/2018/5/layout/IconCircleLabelList"/>
-    <dgm:cxn modelId="{54F18CA2-88A9-4BC2-86FD-390A16FE6D13}" type="presParOf" srcId="{75C67FAD-56C9-40EE-9C22-A7A95B04DDCA}" destId="{34CF9674-128E-44A4-97BC-3FB413135D3C}" srcOrd="1" destOrd="0" presId="urn:microsoft.com/office/officeart/2018/5/layout/IconCircleLabelList"/>
-    <dgm:cxn modelId="{163E20B1-B054-4C35-AD00-C9BF6766FEFC}" type="presParOf" srcId="{75C67FAD-56C9-40EE-9C22-A7A95B04DDCA}" destId="{F7A4CC74-95D7-4191-B519-AF159B3B706A}" srcOrd="2" destOrd="0" presId="urn:microsoft.com/office/officeart/2018/5/layout/IconCircleLabelList"/>
-    <dgm:cxn modelId="{54679298-B1A3-452B-A19B-E7B2094892F0}" type="presParOf" srcId="{75C67FAD-56C9-40EE-9C22-A7A95B04DDCA}" destId="{F0F5AA22-769E-4511-A7E4-1DBFCEBFC33C}" srcOrd="3" destOrd="0" presId="urn:microsoft.com/office/officeart/2018/5/layout/IconCircleLabelList"/>
-    <dgm:cxn modelId="{CB936E8D-78A2-4909-AD67-0F10BD1CE59D}" type="presParOf" srcId="{14B7C387-312F-4EE6-99B2-90BA88D50279}" destId="{EFE0F96E-46DD-4521-A9D9-F37BB853058F}" srcOrd="7" destOrd="0" presId="urn:microsoft.com/office/officeart/2018/5/layout/IconCircleLabelList"/>
-    <dgm:cxn modelId="{05A0D070-BEF8-4BCC-B36B-4ED9D6EB186F}" type="presParOf" srcId="{14B7C387-312F-4EE6-99B2-90BA88D50279}" destId="{529AECBC-8691-4A86-9B4D-0B201A8CB896}" srcOrd="8" destOrd="0" presId="urn:microsoft.com/office/officeart/2018/5/layout/IconCircleLabelList"/>
-    <dgm:cxn modelId="{83F36CBA-4F38-4494-BD24-295058D5CE99}" type="presParOf" srcId="{529AECBC-8691-4A86-9B4D-0B201A8CB896}" destId="{95DDEBC6-7A78-4FB1-B086-9DA5D068570E}" srcOrd="0" destOrd="0" presId="urn:microsoft.com/office/officeart/2018/5/layout/IconCircleLabelList"/>
-    <dgm:cxn modelId="{6772E3D4-D845-41F9-B27F-CB1D84B13159}" type="presParOf" srcId="{529AECBC-8691-4A86-9B4D-0B201A8CB896}" destId="{DC75B735-A84A-47B1-AFA4-01BDC4088474}" srcOrd="1" destOrd="0" presId="urn:microsoft.com/office/officeart/2018/5/layout/IconCircleLabelList"/>
-    <dgm:cxn modelId="{4E2DAD75-6703-4143-A02C-7D862FC40E41}" type="presParOf" srcId="{529AECBC-8691-4A86-9B4D-0B201A8CB896}" destId="{1B1EEFE2-AD4D-45C3-B13F-7A6D1D0A368A}" srcOrd="2" destOrd="0" presId="urn:microsoft.com/office/officeart/2018/5/layout/IconCircleLabelList"/>
-    <dgm:cxn modelId="{4866E4A1-EE59-4C66-80AA-58794934EDFF}" type="presParOf" srcId="{529AECBC-8691-4A86-9B4D-0B201A8CB896}" destId="{A97B7A72-CFA4-46D9-AFB7-85DBA1E200D3}" srcOrd="3" destOrd="0" presId="urn:microsoft.com/office/officeart/2018/5/layout/IconCircleLabelList"/>
-    <dgm:cxn modelId="{C0F14D85-C05A-450F-957C-73CC157B452E}" type="presParOf" srcId="{14B7C387-312F-4EE6-99B2-90BA88D50279}" destId="{B978C07D-E5D7-41F6-B00A-D4E168284821}" srcOrd="9" destOrd="0" presId="urn:microsoft.com/office/officeart/2018/5/layout/IconCircleLabelList"/>
-    <dgm:cxn modelId="{2C6D0D47-D02A-4000-9104-F879959A2906}" type="presParOf" srcId="{14B7C387-312F-4EE6-99B2-90BA88D50279}" destId="{EB093545-1505-4CA2-A5A1-B041EB87E72A}" srcOrd="10" destOrd="0" presId="urn:microsoft.com/office/officeart/2018/5/layout/IconCircleLabelList"/>
-    <dgm:cxn modelId="{ADF1AF98-202C-4555-A43F-FDAB14C0C730}" type="presParOf" srcId="{EB093545-1505-4CA2-A5A1-B041EB87E72A}" destId="{58F5ED13-A3F7-4ADF-927F-CA39F01553A9}" srcOrd="0" destOrd="0" presId="urn:microsoft.com/office/officeart/2018/5/layout/IconCircleLabelList"/>
-    <dgm:cxn modelId="{7F9E407B-9F05-4E55-83FE-AE6A8E5ECCBA}" type="presParOf" srcId="{EB093545-1505-4CA2-A5A1-B041EB87E72A}" destId="{960A88A1-50CF-4CAD-8EF4-CDB36579BBF1}" srcOrd="1" destOrd="0" presId="urn:microsoft.com/office/officeart/2018/5/layout/IconCircleLabelList"/>
-    <dgm:cxn modelId="{5ADC5ECD-9420-48B3-9FA9-6299B41F84B4}" type="presParOf" srcId="{EB093545-1505-4CA2-A5A1-B041EB87E72A}" destId="{6322C0D4-6296-4C33-8CE5-CC2AF4B595CB}" srcOrd="2" destOrd="0" presId="urn:microsoft.com/office/officeart/2018/5/layout/IconCircleLabelList"/>
-    <dgm:cxn modelId="{D15272C2-7B8C-4B60-A8DE-AF649D81669B}" type="presParOf" srcId="{EB093545-1505-4CA2-A5A1-B041EB87E72A}" destId="{9CBFA9F2-F57F-4FB9-8F18-19E1CE5B0AA7}" srcOrd="3" destOrd="0" presId="urn:microsoft.com/office/officeart/2018/5/layout/IconCircleLabelList"/>
-    <dgm:cxn modelId="{598712B0-0051-4160-B271-3BDDDACCC8F3}" type="presParOf" srcId="{14B7C387-312F-4EE6-99B2-90BA88D50279}" destId="{AE882D23-A740-464F-A366-BCD2B9B53052}" srcOrd="11" destOrd="0" presId="urn:microsoft.com/office/officeart/2018/5/layout/IconCircleLabelList"/>
-    <dgm:cxn modelId="{E02CFB10-A095-4DF9-B3F7-CBE88214E807}" type="presParOf" srcId="{14B7C387-312F-4EE6-99B2-90BA88D50279}" destId="{5DEDD1AE-03BD-4D9A-8E25-2E16EDD7042E}" srcOrd="12" destOrd="0" presId="urn:microsoft.com/office/officeart/2018/5/layout/IconCircleLabelList"/>
-    <dgm:cxn modelId="{400A809E-A757-4962-900A-4CFC1B1B50B3}" type="presParOf" srcId="{5DEDD1AE-03BD-4D9A-8E25-2E16EDD7042E}" destId="{FBAFA1A7-9588-4EAA-9AC4-96AE829226C4}" srcOrd="0" destOrd="0" presId="urn:microsoft.com/office/officeart/2018/5/layout/IconCircleLabelList"/>
-    <dgm:cxn modelId="{52ED1B57-7AB6-45FA-B01F-FE0909C8EC7C}" type="presParOf" srcId="{5DEDD1AE-03BD-4D9A-8E25-2E16EDD7042E}" destId="{9EADA870-72F4-4D39-AF6A-82F81DC7E3B7}" srcOrd="1" destOrd="0" presId="urn:microsoft.com/office/officeart/2018/5/layout/IconCircleLabelList"/>
-    <dgm:cxn modelId="{126111FE-F664-4446-89B1-C4CBC710B67C}" type="presParOf" srcId="{5DEDD1AE-03BD-4D9A-8E25-2E16EDD7042E}" destId="{6B4B143F-7783-4855-ACE4-53CF181AD9B1}" srcOrd="2" destOrd="0" presId="urn:microsoft.com/office/officeart/2018/5/layout/IconCircleLabelList"/>
-    <dgm:cxn modelId="{5D1FFED0-4ADB-4D2A-BE0D-53A4E50BB368}" type="presParOf" srcId="{5DEDD1AE-03BD-4D9A-8E25-2E16EDD7042E}" destId="{F12AA22A-B1BF-4037-91A8-1FA70E50454A}" srcOrd="3" destOrd="0" presId="urn:microsoft.com/office/officeart/2018/5/layout/IconCircleLabelList"/>
+    <dgm:cxn modelId="{62CEFFF2-DA72-E443-8B63-40F61D16A345}" type="presOf" srcId="{CE27370B-858D-493E-BD34-0FA799B5A297}" destId="{BFFDC14A-1BBE-3141-B3EA-182472957DA5}" srcOrd="0" destOrd="0" presId="urn:microsoft.com/office/officeart/2008/layout/LinedList"/>
+    <dgm:cxn modelId="{1A00E232-ED10-5848-928D-34D9E7600AB4}" type="presParOf" srcId="{BFFDC14A-1BBE-3141-B3EA-182472957DA5}" destId="{C9B57FB8-7802-2D4E-B3B3-66FC3D0D1A99}" srcOrd="0" destOrd="0" presId="urn:microsoft.com/office/officeart/2008/layout/LinedList"/>
+    <dgm:cxn modelId="{A909B1E8-051B-D74F-B737-FC05416E08EA}" type="presParOf" srcId="{BFFDC14A-1BBE-3141-B3EA-182472957DA5}" destId="{BC72C828-0436-314A-8C5A-5C11C6D631D2}" srcOrd="1" destOrd="0" presId="urn:microsoft.com/office/officeart/2008/layout/LinedList"/>
+    <dgm:cxn modelId="{14456915-0A4A-094C-AC85-060322302B72}" type="presParOf" srcId="{BC72C828-0436-314A-8C5A-5C11C6D631D2}" destId="{05F585F3-0958-6D4C-ACAD-A5CE501DD963}" srcOrd="0" destOrd="0" presId="urn:microsoft.com/office/officeart/2008/layout/LinedList"/>
+    <dgm:cxn modelId="{9B4ED31A-878E-BC40-82D1-70580895AA0A}" type="presParOf" srcId="{BC72C828-0436-314A-8C5A-5C11C6D631D2}" destId="{9D03F634-7684-9049-9447-A2135CAACFB3}" srcOrd="1" destOrd="0" presId="urn:microsoft.com/office/officeart/2008/layout/LinedList"/>
+    <dgm:cxn modelId="{A6A708AA-0CED-474E-98A0-DA1277DAACAA}" type="presParOf" srcId="{BFFDC14A-1BBE-3141-B3EA-182472957DA5}" destId="{C7C83C3F-6289-B346-B885-B2ADEA94A996}" srcOrd="2" destOrd="0" presId="urn:microsoft.com/office/officeart/2008/layout/LinedList"/>
+    <dgm:cxn modelId="{A1054668-929D-8E44-A7B8-0E109D3974B6}" type="presParOf" srcId="{BFFDC14A-1BBE-3141-B3EA-182472957DA5}" destId="{1A2469F3-6249-D241-B8D7-720A27E3C5EA}" srcOrd="3" destOrd="0" presId="urn:microsoft.com/office/officeart/2008/layout/LinedList"/>
+    <dgm:cxn modelId="{FE4AEC89-D93B-994F-8FB2-571DBD55F546}" type="presParOf" srcId="{1A2469F3-6249-D241-B8D7-720A27E3C5EA}" destId="{5E47D8DD-0986-1F4C-8688-B175846769D4}" srcOrd="0" destOrd="0" presId="urn:microsoft.com/office/officeart/2008/layout/LinedList"/>
+    <dgm:cxn modelId="{4BD0E3C9-DAFC-FE45-82A5-4058A331F51E}" type="presParOf" srcId="{1A2469F3-6249-D241-B8D7-720A27E3C5EA}" destId="{58AC9EE7-644A-294F-B074-40E8AAF9B1EA}" srcOrd="1" destOrd="0" presId="urn:microsoft.com/office/officeart/2008/layout/LinedList"/>
+    <dgm:cxn modelId="{E5DEB927-F2A4-CC49-B4DE-791C9AAFF6BD}" type="presParOf" srcId="{BFFDC14A-1BBE-3141-B3EA-182472957DA5}" destId="{52B514F3-D55E-B84F-B1A4-4B9BAE029A06}" srcOrd="4" destOrd="0" presId="urn:microsoft.com/office/officeart/2008/layout/LinedList"/>
+    <dgm:cxn modelId="{02D0774B-63BF-CA4C-8961-87DA0B8E41C6}" type="presParOf" srcId="{BFFDC14A-1BBE-3141-B3EA-182472957DA5}" destId="{0E07D636-1070-C744-A1CC-30CDD917B0E7}" srcOrd="5" destOrd="0" presId="urn:microsoft.com/office/officeart/2008/layout/LinedList"/>
+    <dgm:cxn modelId="{55BED9C8-E7E9-1A4D-A805-ECF62E5BAC9D}" type="presParOf" srcId="{0E07D636-1070-C744-A1CC-30CDD917B0E7}" destId="{3AA19037-EF22-7243-BBB4-2DE22086B85E}" srcOrd="0" destOrd="0" presId="urn:microsoft.com/office/officeart/2008/layout/LinedList"/>
+    <dgm:cxn modelId="{495D1FCF-4BD9-0540-BACC-1B413BF49C1B}" type="presParOf" srcId="{0E07D636-1070-C744-A1CC-30CDD917B0E7}" destId="{1AF4E430-7190-CA43-8740-4123C1848A65}" srcOrd="1" destOrd="0" presId="urn:microsoft.com/office/officeart/2008/layout/LinedList"/>
+    <dgm:cxn modelId="{ED85A15F-8B5D-E749-8446-8B4C8094E8A7}" type="presParOf" srcId="{BFFDC14A-1BBE-3141-B3EA-182472957DA5}" destId="{0758DFA1-3AC5-E843-BB97-B7FE3EBA3FB8}" srcOrd="6" destOrd="0" presId="urn:microsoft.com/office/officeart/2008/layout/LinedList"/>
+    <dgm:cxn modelId="{AE5E0648-DAC1-B440-BC83-584699F32A2D}" type="presParOf" srcId="{BFFDC14A-1BBE-3141-B3EA-182472957DA5}" destId="{268654FE-4B3D-6D40-B9F3-B937F3A6304A}" srcOrd="7" destOrd="0" presId="urn:microsoft.com/office/officeart/2008/layout/LinedList"/>
+    <dgm:cxn modelId="{7B465DBF-48C0-7E4A-B686-D6069905770D}" type="presParOf" srcId="{268654FE-4B3D-6D40-B9F3-B937F3A6304A}" destId="{AA346AE6-2276-4A46-BC6B-F98832AC9508}" srcOrd="0" destOrd="0" presId="urn:microsoft.com/office/officeart/2008/layout/LinedList"/>
+    <dgm:cxn modelId="{AEFE609C-33BE-F04F-AA6C-D1E906B825CF}" type="presParOf" srcId="{268654FE-4B3D-6D40-B9F3-B937F3A6304A}" destId="{C14541B2-834F-DE48-ACFD-1A9212966B8A}" srcOrd="1" destOrd="0" presId="urn:microsoft.com/office/officeart/2008/layout/LinedList"/>
+    <dgm:cxn modelId="{AC675C1D-9BA9-CD41-88AF-442D695E142C}" type="presParOf" srcId="{BFFDC14A-1BBE-3141-B3EA-182472957DA5}" destId="{F9A18106-0726-4447-A05B-C2EF9665FCC7}" srcOrd="8" destOrd="0" presId="urn:microsoft.com/office/officeart/2008/layout/LinedList"/>
+    <dgm:cxn modelId="{543264B6-31C2-8944-9595-926F3BE9E9DA}" type="presParOf" srcId="{BFFDC14A-1BBE-3141-B3EA-182472957DA5}" destId="{AC49934A-C5ED-B948-966E-6996C86D182C}" srcOrd="9" destOrd="0" presId="urn:microsoft.com/office/officeart/2008/layout/LinedList"/>
+    <dgm:cxn modelId="{B74C2F1B-804C-4741-8577-1AD89C43B58F}" type="presParOf" srcId="{AC49934A-C5ED-B948-966E-6996C86D182C}" destId="{77E6E2C3-79A5-B046-9BBB-BAA527100FB6}" srcOrd="0" destOrd="0" presId="urn:microsoft.com/office/officeart/2008/layout/LinedList"/>
+    <dgm:cxn modelId="{62F1F548-F33E-C340-B95F-711D69089391}" type="presParOf" srcId="{AC49934A-C5ED-B948-966E-6996C86D182C}" destId="{7F6B0773-0CB9-3F4F-BC30-FBF875B51CC2}" srcOrd="1" destOrd="0" presId="urn:microsoft.com/office/officeart/2008/layout/LinedList"/>
+    <dgm:cxn modelId="{BC95DF04-AADF-5248-B21D-CA874BAE9382}" type="presParOf" srcId="{BFFDC14A-1BBE-3141-B3EA-182472957DA5}" destId="{8618B720-E39D-E447-8883-0F88EBBEE0D0}" srcOrd="10" destOrd="0" presId="urn:microsoft.com/office/officeart/2008/layout/LinedList"/>
+    <dgm:cxn modelId="{D1294628-ED63-0241-8515-B27C449D1A3D}" type="presParOf" srcId="{BFFDC14A-1BBE-3141-B3EA-182472957DA5}" destId="{B2FD43BC-A6F1-B54D-8CAD-65455202AAB7}" srcOrd="11" destOrd="0" presId="urn:microsoft.com/office/officeart/2008/layout/LinedList"/>
+    <dgm:cxn modelId="{3A02296D-CEC7-B940-BFC0-2944FDE56721}" type="presParOf" srcId="{B2FD43BC-A6F1-B54D-8CAD-65455202AAB7}" destId="{7502EBF9-1C77-AA44-9957-27A80BFC27C5}" srcOrd="0" destOrd="0" presId="urn:microsoft.com/office/officeart/2008/layout/LinedList"/>
+    <dgm:cxn modelId="{B276C3F2-0960-654C-88ED-136053563AF9}" type="presParOf" srcId="{B2FD43BC-A6F1-B54D-8CAD-65455202AAB7}" destId="{C4AFE05E-E31C-BD45-863B-1F05E0FD5F4D}" srcOrd="1" destOrd="0" presId="urn:microsoft.com/office/officeart/2008/layout/LinedList"/>
+    <dgm:cxn modelId="{619B39D0-DF19-894C-B2BC-A744DCEA5701}" type="presParOf" srcId="{BFFDC14A-1BBE-3141-B3EA-182472957DA5}" destId="{58785474-204E-4C49-92CA-784B66D2E897}" srcOrd="12" destOrd="0" presId="urn:microsoft.com/office/officeart/2008/layout/LinedList"/>
+    <dgm:cxn modelId="{C1FB6CC1-CF50-1645-AF99-C8E3E3DCE93F}" type="presParOf" srcId="{BFFDC14A-1BBE-3141-B3EA-182472957DA5}" destId="{51C077FA-7E7D-0C48-B24B-5935BF3354AC}" srcOrd="13" destOrd="0" presId="urn:microsoft.com/office/officeart/2008/layout/LinedList"/>
+    <dgm:cxn modelId="{DACCA4AE-B3C4-0740-B387-3452A121EFC6}" type="presParOf" srcId="{51C077FA-7E7D-0C48-B24B-5935BF3354AC}" destId="{B6D4D8ED-EE98-0D4C-9F8B-C9033D658274}" srcOrd="0" destOrd="0" presId="urn:microsoft.com/office/officeart/2008/layout/LinedList"/>
+    <dgm:cxn modelId="{BE36C066-8598-C24C-BF92-BF4097340148}" type="presParOf" srcId="{51C077FA-7E7D-0C48-B24B-5935BF3354AC}" destId="{3E48B1D6-6AA4-7044-902F-A1017875CDD7}" srcOrd="1" destOrd="0" presId="urn:microsoft.com/office/officeart/2008/layout/LinedList"/>
   </dgm:cxnLst>
   <dgm:bg/>
   <dgm:whole/>
@@ -3699,77 +3467,60 @@
       <dsp:cNvGrpSpPr/>
     </dsp:nvGrpSpPr>
     <dsp:grpSpPr/>
-    <dsp:sp modelId="{F084566D-8B52-4D65-9F97-6FBEE01C5886}">
+    <dsp:sp modelId="{C9B57FB8-7802-2D4E-B3B3-66FC3D0D1A99}">
       <dsp:nvSpPr>
         <dsp:cNvPr id="0" name=""/>
         <dsp:cNvSpPr/>
       </dsp:nvSpPr>
       <dsp:spPr>
         <a:xfrm>
-          <a:off x="813737" y="1972"/>
-          <a:ext cx="902847" cy="902847"/>
+          <a:off x="0" y="480"/>
+          <a:ext cx="7846501" cy="0"/>
         </a:xfrm>
-        <a:prstGeom prst="ellipse">
+        <a:prstGeom prst="line">
           <a:avLst/>
         </a:prstGeom>
-        <a:solidFill>
-          <a:schemeClr val="accent1">
-            <a:tint val="40000"/>
-            <a:hueOff val="0"/>
-            <a:satOff val="0"/>
-            <a:lumOff val="0"/>
-            <a:alphaOff val="0"/>
-          </a:schemeClr>
-        </a:solidFill>
-        <a:ln>
-          <a:noFill/>
-        </a:ln>
-        <a:effectLst/>
-      </dsp:spPr>
-      <dsp:style>
-        <a:lnRef idx="0">
-          <a:scrgbClr r="0" g="0" b="0"/>
-        </a:lnRef>
-        <a:fillRef idx="1">
-          <a:scrgbClr r="0" g="0" b="0"/>
-        </a:fillRef>
-        <a:effectRef idx="0">
-          <a:scrgbClr r="0" g="0" b="0"/>
-        </a:effectRef>
-        <a:fontRef idx="minor"/>
-      </dsp:style>
-    </dsp:sp>
-    <dsp:sp modelId="{AA62569A-9583-49A1-B79D-33E8B82439D0}">
-      <dsp:nvSpPr>
-        <dsp:cNvPr id="0" name=""/>
-        <dsp:cNvSpPr/>
-      </dsp:nvSpPr>
-      <dsp:spPr>
-        <a:xfrm>
-          <a:off x="1006147" y="194382"/>
-          <a:ext cx="518027" cy="518027"/>
-        </a:xfrm>
-        <a:prstGeom prst="rect">
-          <a:avLst/>
-        </a:prstGeom>
-        <a:blipFill>
-          <a:blip xmlns:r="http://schemas.openxmlformats.org/officeDocument/2006/relationships" r:embed="rId1">
-            <a:extLst>
-              <a:ext uri="{28A0092B-C50C-407E-A947-70E740481C1C}">
-                <a14:useLocalDpi xmlns:a14="http://schemas.microsoft.com/office/drawing/2010/main" val="0"/>
-              </a:ext>
-              <a:ext uri="{96DAC541-7B7A-43D3-8B79-37D633B846F1}">
-                <asvg:svgBlip xmlns:asvg="http://schemas.microsoft.com/office/drawing/2016/SVG/main" r:embed="rId2"/>
-              </a:ext>
-            </a:extLst>
-          </a:blip>
-          <a:stretch>
-            <a:fillRect/>
-          </a:stretch>
-        </a:blipFill>
-        <a:ln w="12700" cap="flat" cmpd="sng" algn="ctr">
+        <a:gradFill rotWithShape="0">
+          <a:gsLst>
+            <a:gs pos="0">
+              <a:schemeClr val="accent5">
+                <a:hueOff val="0"/>
+                <a:satOff val="0"/>
+                <a:lumOff val="0"/>
+                <a:alphaOff val="0"/>
+                <a:satMod val="103000"/>
+                <a:lumMod val="102000"/>
+                <a:tint val="94000"/>
+              </a:schemeClr>
+            </a:gs>
+            <a:gs pos="50000">
+              <a:schemeClr val="accent5">
+                <a:hueOff val="0"/>
+                <a:satOff val="0"/>
+                <a:lumOff val="0"/>
+                <a:alphaOff val="0"/>
+                <a:satMod val="110000"/>
+                <a:lumMod val="100000"/>
+                <a:shade val="100000"/>
+              </a:schemeClr>
+            </a:gs>
+            <a:gs pos="100000">
+              <a:schemeClr val="accent5">
+                <a:hueOff val="0"/>
+                <a:satOff val="0"/>
+                <a:lumOff val="0"/>
+                <a:alphaOff val="0"/>
+                <a:lumMod val="99000"/>
+                <a:satMod val="120000"/>
+                <a:shade val="78000"/>
+              </a:schemeClr>
+            </a:gs>
+          </a:gsLst>
+          <a:lin ang="5400000" scaled="0"/>
+        </a:gradFill>
+        <a:ln w="6350" cap="flat" cmpd="sng" algn="ctr">
           <a:solidFill>
-            <a:schemeClr val="lt1">
+            <a:schemeClr val="accent5">
               <a:hueOff val="0"/>
               <a:satOff val="0"/>
               <a:lumOff val="0"/>
@@ -3782,13 +3533,13 @@
         <a:effectLst/>
       </dsp:spPr>
       <dsp:style>
-        <a:lnRef idx="2">
+        <a:lnRef idx="1">
           <a:scrgbClr r="0" g="0" b="0"/>
         </a:lnRef>
-        <a:fillRef idx="1">
+        <a:fillRef idx="3">
           <a:scrgbClr r="0" g="0" b="0"/>
         </a:fillRef>
-        <a:effectRef idx="0">
+        <a:effectRef idx="2">
           <a:scrgbClr r="0" g="0" b="0"/>
         </a:effectRef>
         <a:fontRef idx="minor">
@@ -3796,15 +3547,15 @@
         </a:fontRef>
       </dsp:style>
     </dsp:sp>
-    <dsp:sp modelId="{0F84B23C-E371-47F3-A074-495AA21187D2}">
+    <dsp:sp modelId="{05F585F3-0958-6D4C-ACAD-A5CE501DD963}">
       <dsp:nvSpPr>
         <dsp:cNvPr id="0" name=""/>
         <dsp:cNvSpPr/>
       </dsp:nvSpPr>
       <dsp:spPr>
         <a:xfrm>
-          <a:off x="525122" y="1186034"/>
-          <a:ext cx="1480078" cy="592031"/>
+          <a:off x="0" y="480"/>
+          <a:ext cx="7846501" cy="561610"/>
         </a:xfrm>
         <a:prstGeom prst="rect">
           <a:avLst/>
@@ -3828,14 +3579,14 @@
         <a:fontRef idx="minor"/>
       </dsp:style>
       <dsp:txBody>
-        <a:bodyPr spcFirstLastPara="0" vert="horz" wrap="square" lIns="0" tIns="0" rIns="0" bIns="0" numCol="1" spcCol="1270" anchor="t" anchorCtr="0">
+        <a:bodyPr spcFirstLastPara="0" vert="horz" wrap="square" lIns="99060" tIns="99060" rIns="99060" bIns="99060" numCol="1" spcCol="1270" anchor="t" anchorCtr="0">
           <a:noAutofit/>
         </a:bodyPr>
         <a:lstStyle/>
         <a:p>
-          <a:pPr marL="0" lvl="0" indent="0" algn="ctr" defTabSz="577850">
+          <a:pPr marL="0" lvl="0" indent="0" algn="l" defTabSz="1155700">
             <a:lnSpc>
-              <a:spcPct val="100000"/>
+              <a:spcPct val="90000"/>
             </a:lnSpc>
             <a:spcBef>
               <a:spcPct val="0"/>
@@ -3847,90 +3598,73 @@
             <a:defRPr cap="all"/>
           </a:pPr>
           <a:r>
-            <a:rPr lang="en-US" sz="1300" kern="1200"/>
+            <a:rPr lang="en-US" sz="2600" kern="1200"/>
             <a:t>Problem Statement </a:t>
           </a:r>
         </a:p>
       </dsp:txBody>
       <dsp:txXfrm>
-        <a:off x="525122" y="1186034"/>
-        <a:ext cx="1480078" cy="592031"/>
+        <a:off x="0" y="480"/>
+        <a:ext cx="7846501" cy="561610"/>
       </dsp:txXfrm>
     </dsp:sp>
-    <dsp:sp modelId="{7737C683-5C27-40AA-8674-E82B864C11A5}">
+    <dsp:sp modelId="{C7C83C3F-6289-B346-B885-B2ADEA94A996}">
       <dsp:nvSpPr>
         <dsp:cNvPr id="0" name=""/>
         <dsp:cNvSpPr/>
       </dsp:nvSpPr>
       <dsp:spPr>
         <a:xfrm>
-          <a:off x="2552829" y="1972"/>
-          <a:ext cx="902847" cy="902847"/>
+          <a:off x="0" y="562091"/>
+          <a:ext cx="7846501" cy="0"/>
         </a:xfrm>
-        <a:prstGeom prst="ellipse">
+        <a:prstGeom prst="line">
           <a:avLst/>
         </a:prstGeom>
-        <a:solidFill>
-          <a:schemeClr val="accent1">
-            <a:tint val="40000"/>
-            <a:hueOff val="0"/>
-            <a:satOff val="0"/>
-            <a:lumOff val="0"/>
-            <a:alphaOff val="0"/>
-          </a:schemeClr>
-        </a:solidFill>
-        <a:ln>
-          <a:noFill/>
-        </a:ln>
-        <a:effectLst/>
-      </dsp:spPr>
-      <dsp:style>
-        <a:lnRef idx="0">
-          <a:scrgbClr r="0" g="0" b="0"/>
-        </a:lnRef>
-        <a:fillRef idx="1">
-          <a:scrgbClr r="0" g="0" b="0"/>
-        </a:fillRef>
-        <a:effectRef idx="0">
-          <a:scrgbClr r="0" g="0" b="0"/>
-        </a:effectRef>
-        <a:fontRef idx="minor"/>
-      </dsp:style>
-    </dsp:sp>
-    <dsp:sp modelId="{AE7FA6C0-4BE9-4AAC-9DC8-12B4A8B6C097}">
-      <dsp:nvSpPr>
-        <dsp:cNvPr id="0" name=""/>
-        <dsp:cNvSpPr/>
-      </dsp:nvSpPr>
-      <dsp:spPr>
-        <a:xfrm>
-          <a:off x="2745239" y="194382"/>
-          <a:ext cx="518027" cy="518027"/>
-        </a:xfrm>
-        <a:prstGeom prst="rect">
-          <a:avLst/>
-        </a:prstGeom>
-        <a:blipFill>
-          <a:blip xmlns:r="http://schemas.openxmlformats.org/officeDocument/2006/relationships" r:embed="rId3">
-            <a:extLst>
-              <a:ext uri="{28A0092B-C50C-407E-A947-70E740481C1C}">
-                <a14:useLocalDpi xmlns:a14="http://schemas.microsoft.com/office/drawing/2010/main" val="0"/>
-              </a:ext>
-              <a:ext uri="{96DAC541-7B7A-43D3-8B79-37D633B846F1}">
-                <asvg:svgBlip xmlns:asvg="http://schemas.microsoft.com/office/drawing/2016/SVG/main" r:embed="rId4"/>
-              </a:ext>
-            </a:extLst>
-          </a:blip>
-          <a:stretch>
-            <a:fillRect/>
-          </a:stretch>
-        </a:blipFill>
-        <a:ln w="12700" cap="flat" cmpd="sng" algn="ctr">
+        <a:gradFill rotWithShape="0">
+          <a:gsLst>
+            <a:gs pos="0">
+              <a:schemeClr val="accent5">
+                <a:hueOff val="-3421864"/>
+                <a:satOff val="7155"/>
+                <a:lumOff val="686"/>
+                <a:alphaOff val="0"/>
+                <a:satMod val="103000"/>
+                <a:lumMod val="102000"/>
+                <a:tint val="94000"/>
+              </a:schemeClr>
+            </a:gs>
+            <a:gs pos="50000">
+              <a:schemeClr val="accent5">
+                <a:hueOff val="-3421864"/>
+                <a:satOff val="7155"/>
+                <a:lumOff val="686"/>
+                <a:alphaOff val="0"/>
+                <a:satMod val="110000"/>
+                <a:lumMod val="100000"/>
+                <a:shade val="100000"/>
+              </a:schemeClr>
+            </a:gs>
+            <a:gs pos="100000">
+              <a:schemeClr val="accent5">
+                <a:hueOff val="-3421864"/>
+                <a:satOff val="7155"/>
+                <a:lumOff val="686"/>
+                <a:alphaOff val="0"/>
+                <a:lumMod val="99000"/>
+                <a:satMod val="120000"/>
+                <a:shade val="78000"/>
+              </a:schemeClr>
+            </a:gs>
+          </a:gsLst>
+          <a:lin ang="5400000" scaled="0"/>
+        </a:gradFill>
+        <a:ln w="6350" cap="flat" cmpd="sng" algn="ctr">
           <a:solidFill>
-            <a:schemeClr val="lt1">
-              <a:hueOff val="0"/>
-              <a:satOff val="0"/>
-              <a:lumOff val="0"/>
+            <a:schemeClr val="accent5">
+              <a:hueOff val="-3421864"/>
+              <a:satOff val="7155"/>
+              <a:lumOff val="686"/>
               <a:alphaOff val="0"/>
             </a:schemeClr>
           </a:solidFill>
@@ -3940,13 +3674,13 @@
         <a:effectLst/>
       </dsp:spPr>
       <dsp:style>
-        <a:lnRef idx="2">
+        <a:lnRef idx="1">
           <a:scrgbClr r="0" g="0" b="0"/>
         </a:lnRef>
-        <a:fillRef idx="1">
+        <a:fillRef idx="3">
           <a:scrgbClr r="0" g="0" b="0"/>
         </a:fillRef>
-        <a:effectRef idx="0">
+        <a:effectRef idx="2">
           <a:scrgbClr r="0" g="0" b="0"/>
         </a:effectRef>
         <a:fontRef idx="minor">
@@ -3954,15 +3688,15 @@
         </a:fontRef>
       </dsp:style>
     </dsp:sp>
-    <dsp:sp modelId="{6F68E393-6AF5-4F8A-9D74-7B0153D994C4}">
+    <dsp:sp modelId="{5E47D8DD-0986-1F4C-8688-B175846769D4}">
       <dsp:nvSpPr>
         <dsp:cNvPr id="0" name=""/>
         <dsp:cNvSpPr/>
       </dsp:nvSpPr>
       <dsp:spPr>
         <a:xfrm>
-          <a:off x="2264214" y="1186034"/>
-          <a:ext cx="1480078" cy="592031"/>
+          <a:off x="0" y="562091"/>
+          <a:ext cx="7846501" cy="561610"/>
         </a:xfrm>
         <a:prstGeom prst="rect">
           <a:avLst/>
@@ -3986,14 +3720,14 @@
         <a:fontRef idx="minor"/>
       </dsp:style>
       <dsp:txBody>
-        <a:bodyPr spcFirstLastPara="0" vert="horz" wrap="square" lIns="0" tIns="0" rIns="0" bIns="0" numCol="1" spcCol="1270" anchor="t" anchorCtr="0">
+        <a:bodyPr spcFirstLastPara="0" vert="horz" wrap="square" lIns="99060" tIns="99060" rIns="99060" bIns="99060" numCol="1" spcCol="1270" anchor="t" anchorCtr="0">
           <a:noAutofit/>
         </a:bodyPr>
         <a:lstStyle/>
         <a:p>
-          <a:pPr marL="0" lvl="0" indent="0" algn="ctr" defTabSz="577850">
+          <a:pPr marL="0" lvl="0" indent="0" algn="l" defTabSz="1155700">
             <a:lnSpc>
-              <a:spcPct val="100000"/>
+              <a:spcPct val="90000"/>
             </a:lnSpc>
             <a:spcBef>
               <a:spcPct val="0"/>
@@ -4005,90 +3739,73 @@
             <a:defRPr cap="all"/>
           </a:pPr>
           <a:r>
-            <a:rPr lang="en-US" sz="1300" kern="1200"/>
+            <a:rPr lang="en-US" sz="2600" kern="1200"/>
             <a:t>Data</a:t>
           </a:r>
         </a:p>
       </dsp:txBody>
       <dsp:txXfrm>
-        <a:off x="2264214" y="1186034"/>
-        <a:ext cx="1480078" cy="592031"/>
+        <a:off x="0" y="562091"/>
+        <a:ext cx="7846501" cy="561610"/>
       </dsp:txXfrm>
     </dsp:sp>
-    <dsp:sp modelId="{238F2A96-66A3-4EEE-9C60-96C4DB39771D}">
+    <dsp:sp modelId="{52B514F3-D55E-B84F-B1A4-4B9BAE029A06}">
       <dsp:nvSpPr>
         <dsp:cNvPr id="0" name=""/>
         <dsp:cNvSpPr/>
       </dsp:nvSpPr>
       <dsp:spPr>
         <a:xfrm>
-          <a:off x="4291921" y="1972"/>
-          <a:ext cx="902847" cy="902847"/>
+          <a:off x="0" y="1123702"/>
+          <a:ext cx="7846501" cy="0"/>
         </a:xfrm>
-        <a:prstGeom prst="ellipse">
+        <a:prstGeom prst="line">
           <a:avLst/>
         </a:prstGeom>
-        <a:solidFill>
-          <a:schemeClr val="accent1">
-            <a:tint val="40000"/>
-            <a:hueOff val="0"/>
-            <a:satOff val="0"/>
-            <a:lumOff val="0"/>
-            <a:alphaOff val="0"/>
-          </a:schemeClr>
-        </a:solidFill>
-        <a:ln>
-          <a:noFill/>
-        </a:ln>
-        <a:effectLst/>
-      </dsp:spPr>
-      <dsp:style>
-        <a:lnRef idx="0">
-          <a:scrgbClr r="0" g="0" b="0"/>
-        </a:lnRef>
-        <a:fillRef idx="1">
-          <a:scrgbClr r="0" g="0" b="0"/>
-        </a:fillRef>
-        <a:effectRef idx="0">
-          <a:scrgbClr r="0" g="0" b="0"/>
-        </a:effectRef>
-        <a:fontRef idx="minor"/>
-      </dsp:style>
-    </dsp:sp>
-    <dsp:sp modelId="{22DC39AE-674B-456A-AF83-E2DB34D22B41}">
-      <dsp:nvSpPr>
-        <dsp:cNvPr id="0" name=""/>
-        <dsp:cNvSpPr/>
-      </dsp:nvSpPr>
-      <dsp:spPr>
-        <a:xfrm>
-          <a:off x="4484331" y="194382"/>
-          <a:ext cx="518027" cy="518027"/>
-        </a:xfrm>
-        <a:prstGeom prst="rect">
-          <a:avLst/>
-        </a:prstGeom>
-        <a:blipFill>
-          <a:blip xmlns:r="http://schemas.openxmlformats.org/officeDocument/2006/relationships" r:embed="rId5">
-            <a:extLst>
-              <a:ext uri="{28A0092B-C50C-407E-A947-70E740481C1C}">
-                <a14:useLocalDpi xmlns:a14="http://schemas.microsoft.com/office/drawing/2010/main" val="0"/>
-              </a:ext>
-              <a:ext uri="{96DAC541-7B7A-43D3-8B79-37D633B846F1}">
-                <asvg:svgBlip xmlns:asvg="http://schemas.microsoft.com/office/drawing/2016/SVG/main" r:embed="rId6"/>
-              </a:ext>
-            </a:extLst>
-          </a:blip>
-          <a:stretch>
-            <a:fillRect/>
-          </a:stretch>
-        </a:blipFill>
-        <a:ln w="12700" cap="flat" cmpd="sng" algn="ctr">
+        <a:gradFill rotWithShape="0">
+          <a:gsLst>
+            <a:gs pos="0">
+              <a:schemeClr val="accent5">
+                <a:hueOff val="-6843728"/>
+                <a:satOff val="14310"/>
+                <a:lumOff val="1373"/>
+                <a:alphaOff val="0"/>
+                <a:satMod val="103000"/>
+                <a:lumMod val="102000"/>
+                <a:tint val="94000"/>
+              </a:schemeClr>
+            </a:gs>
+            <a:gs pos="50000">
+              <a:schemeClr val="accent5">
+                <a:hueOff val="-6843728"/>
+                <a:satOff val="14310"/>
+                <a:lumOff val="1373"/>
+                <a:alphaOff val="0"/>
+                <a:satMod val="110000"/>
+                <a:lumMod val="100000"/>
+                <a:shade val="100000"/>
+              </a:schemeClr>
+            </a:gs>
+            <a:gs pos="100000">
+              <a:schemeClr val="accent5">
+                <a:hueOff val="-6843728"/>
+                <a:satOff val="14310"/>
+                <a:lumOff val="1373"/>
+                <a:alphaOff val="0"/>
+                <a:lumMod val="99000"/>
+                <a:satMod val="120000"/>
+                <a:shade val="78000"/>
+              </a:schemeClr>
+            </a:gs>
+          </a:gsLst>
+          <a:lin ang="5400000" scaled="0"/>
+        </a:gradFill>
+        <a:ln w="6350" cap="flat" cmpd="sng" algn="ctr">
           <a:solidFill>
-            <a:schemeClr val="lt1">
-              <a:hueOff val="0"/>
-              <a:satOff val="0"/>
-              <a:lumOff val="0"/>
+            <a:schemeClr val="accent5">
+              <a:hueOff val="-6843728"/>
+              <a:satOff val="14310"/>
+              <a:lumOff val="1373"/>
               <a:alphaOff val="0"/>
             </a:schemeClr>
           </a:solidFill>
@@ -4098,13 +3815,13 @@
         <a:effectLst/>
       </dsp:spPr>
       <dsp:style>
-        <a:lnRef idx="2">
+        <a:lnRef idx="1">
           <a:scrgbClr r="0" g="0" b="0"/>
         </a:lnRef>
-        <a:fillRef idx="1">
+        <a:fillRef idx="3">
           <a:scrgbClr r="0" g="0" b="0"/>
         </a:fillRef>
-        <a:effectRef idx="0">
+        <a:effectRef idx="2">
           <a:scrgbClr r="0" g="0" b="0"/>
         </a:effectRef>
         <a:fontRef idx="minor">
@@ -4112,15 +3829,15 @@
         </a:fontRef>
       </dsp:style>
     </dsp:sp>
-    <dsp:sp modelId="{B6FD67D3-EDA1-48F6-81EE-74266433FEAA}">
+    <dsp:sp modelId="{3AA19037-EF22-7243-BBB4-2DE22086B85E}">
       <dsp:nvSpPr>
         <dsp:cNvPr id="0" name=""/>
         <dsp:cNvSpPr/>
       </dsp:nvSpPr>
       <dsp:spPr>
         <a:xfrm>
-          <a:off x="4003305" y="1186034"/>
-          <a:ext cx="1480078" cy="592031"/>
+          <a:off x="0" y="1123702"/>
+          <a:ext cx="7846501" cy="561610"/>
         </a:xfrm>
         <a:prstGeom prst="rect">
           <a:avLst/>
@@ -4144,14 +3861,14 @@
         <a:fontRef idx="minor"/>
       </dsp:style>
       <dsp:txBody>
-        <a:bodyPr spcFirstLastPara="0" vert="horz" wrap="square" lIns="0" tIns="0" rIns="0" bIns="0" numCol="1" spcCol="1270" anchor="t" anchorCtr="0">
+        <a:bodyPr spcFirstLastPara="0" vert="horz" wrap="square" lIns="99060" tIns="99060" rIns="99060" bIns="99060" numCol="1" spcCol="1270" anchor="t" anchorCtr="0">
           <a:noAutofit/>
         </a:bodyPr>
         <a:lstStyle/>
         <a:p>
-          <a:pPr marL="0" lvl="0" indent="0" algn="ctr" defTabSz="577850">
+          <a:pPr marL="0" lvl="0" indent="0" algn="l" defTabSz="1155700">
             <a:lnSpc>
-              <a:spcPct val="100000"/>
+              <a:spcPct val="90000"/>
             </a:lnSpc>
             <a:spcBef>
               <a:spcPct val="0"/>
@@ -4163,90 +3880,73 @@
             <a:defRPr cap="all"/>
           </a:pPr>
           <a:r>
-            <a:rPr lang="en-US" sz="1300" kern="1200"/>
+            <a:rPr lang="en-US" sz="2600" kern="1200"/>
             <a:t>Exploratory Data Analysis</a:t>
           </a:r>
         </a:p>
       </dsp:txBody>
       <dsp:txXfrm>
-        <a:off x="4003305" y="1186034"/>
-        <a:ext cx="1480078" cy="592031"/>
+        <a:off x="0" y="1123702"/>
+        <a:ext cx="7846501" cy="561610"/>
       </dsp:txXfrm>
     </dsp:sp>
-    <dsp:sp modelId="{04A75B45-C7A6-45C0-8037-2AF4B8824BFF}">
+    <dsp:sp modelId="{0758DFA1-3AC5-E843-BB97-B7FE3EBA3FB8}">
       <dsp:nvSpPr>
         <dsp:cNvPr id="0" name=""/>
         <dsp:cNvSpPr/>
       </dsp:nvSpPr>
       <dsp:spPr>
         <a:xfrm>
-          <a:off x="6031012" y="1972"/>
-          <a:ext cx="902847" cy="902847"/>
+          <a:off x="0" y="1685313"/>
+          <a:ext cx="7846501" cy="0"/>
         </a:xfrm>
-        <a:prstGeom prst="ellipse">
+        <a:prstGeom prst="line">
           <a:avLst/>
         </a:prstGeom>
-        <a:solidFill>
-          <a:schemeClr val="accent1">
-            <a:tint val="40000"/>
-            <a:hueOff val="0"/>
-            <a:satOff val="0"/>
-            <a:lumOff val="0"/>
-            <a:alphaOff val="0"/>
-          </a:schemeClr>
-        </a:solidFill>
-        <a:ln>
-          <a:noFill/>
-        </a:ln>
-        <a:effectLst/>
-      </dsp:spPr>
-      <dsp:style>
-        <a:lnRef idx="0">
-          <a:scrgbClr r="0" g="0" b="0"/>
-        </a:lnRef>
-        <a:fillRef idx="1">
-          <a:scrgbClr r="0" g="0" b="0"/>
-        </a:fillRef>
-        <a:effectRef idx="0">
-          <a:scrgbClr r="0" g="0" b="0"/>
-        </a:effectRef>
-        <a:fontRef idx="minor"/>
-      </dsp:style>
-    </dsp:sp>
-    <dsp:sp modelId="{34CF9674-128E-44A4-97BC-3FB413135D3C}">
-      <dsp:nvSpPr>
-        <dsp:cNvPr id="0" name=""/>
-        <dsp:cNvSpPr/>
-      </dsp:nvSpPr>
-      <dsp:spPr>
-        <a:xfrm>
-          <a:off x="6223423" y="194382"/>
-          <a:ext cx="518027" cy="518027"/>
-        </a:xfrm>
-        <a:prstGeom prst="rect">
-          <a:avLst/>
-        </a:prstGeom>
-        <a:blipFill>
-          <a:blip xmlns:r="http://schemas.openxmlformats.org/officeDocument/2006/relationships" r:embed="rId7">
-            <a:extLst>
-              <a:ext uri="{28A0092B-C50C-407E-A947-70E740481C1C}">
-                <a14:useLocalDpi xmlns:a14="http://schemas.microsoft.com/office/drawing/2010/main" val="0"/>
-              </a:ext>
-              <a:ext uri="{96DAC541-7B7A-43D3-8B79-37D633B846F1}">
-                <asvg:svgBlip xmlns:asvg="http://schemas.microsoft.com/office/drawing/2016/SVG/main" r:embed="rId8"/>
-              </a:ext>
-            </a:extLst>
-          </a:blip>
-          <a:stretch>
-            <a:fillRect/>
-          </a:stretch>
-        </a:blipFill>
-        <a:ln w="12700" cap="flat" cmpd="sng" algn="ctr">
+        <a:gradFill rotWithShape="0">
+          <a:gsLst>
+            <a:gs pos="0">
+              <a:schemeClr val="accent5">
+                <a:hueOff val="-10265592"/>
+                <a:satOff val="21465"/>
+                <a:lumOff val="2059"/>
+                <a:alphaOff val="0"/>
+                <a:satMod val="103000"/>
+                <a:lumMod val="102000"/>
+                <a:tint val="94000"/>
+              </a:schemeClr>
+            </a:gs>
+            <a:gs pos="50000">
+              <a:schemeClr val="accent5">
+                <a:hueOff val="-10265592"/>
+                <a:satOff val="21465"/>
+                <a:lumOff val="2059"/>
+                <a:alphaOff val="0"/>
+                <a:satMod val="110000"/>
+                <a:lumMod val="100000"/>
+                <a:shade val="100000"/>
+              </a:schemeClr>
+            </a:gs>
+            <a:gs pos="100000">
+              <a:schemeClr val="accent5">
+                <a:hueOff val="-10265592"/>
+                <a:satOff val="21465"/>
+                <a:lumOff val="2059"/>
+                <a:alphaOff val="0"/>
+                <a:lumMod val="99000"/>
+                <a:satMod val="120000"/>
+                <a:shade val="78000"/>
+              </a:schemeClr>
+            </a:gs>
+          </a:gsLst>
+          <a:lin ang="5400000" scaled="0"/>
+        </a:gradFill>
+        <a:ln w="6350" cap="flat" cmpd="sng" algn="ctr">
           <a:solidFill>
-            <a:schemeClr val="lt1">
-              <a:hueOff val="0"/>
-              <a:satOff val="0"/>
-              <a:lumOff val="0"/>
+            <a:schemeClr val="accent5">
+              <a:hueOff val="-10265592"/>
+              <a:satOff val="21465"/>
+              <a:lumOff val="2059"/>
               <a:alphaOff val="0"/>
             </a:schemeClr>
           </a:solidFill>
@@ -4256,13 +3956,13 @@
         <a:effectLst/>
       </dsp:spPr>
       <dsp:style>
-        <a:lnRef idx="2">
+        <a:lnRef idx="1">
           <a:scrgbClr r="0" g="0" b="0"/>
         </a:lnRef>
-        <a:fillRef idx="1">
+        <a:fillRef idx="3">
           <a:scrgbClr r="0" g="0" b="0"/>
         </a:fillRef>
-        <a:effectRef idx="0">
+        <a:effectRef idx="2">
           <a:scrgbClr r="0" g="0" b="0"/>
         </a:effectRef>
         <a:fontRef idx="minor">
@@ -4270,15 +3970,15 @@
         </a:fontRef>
       </dsp:style>
     </dsp:sp>
-    <dsp:sp modelId="{F0F5AA22-769E-4511-A7E4-1DBFCEBFC33C}">
+    <dsp:sp modelId="{AA346AE6-2276-4A46-BC6B-F98832AC9508}">
       <dsp:nvSpPr>
         <dsp:cNvPr id="0" name=""/>
         <dsp:cNvSpPr/>
       </dsp:nvSpPr>
       <dsp:spPr>
         <a:xfrm>
-          <a:off x="5742397" y="1186034"/>
-          <a:ext cx="1480078" cy="592031"/>
+          <a:off x="0" y="1685313"/>
+          <a:ext cx="7846501" cy="561610"/>
         </a:xfrm>
         <a:prstGeom prst="rect">
           <a:avLst/>
@@ -4302,14 +4002,14 @@
         <a:fontRef idx="minor"/>
       </dsp:style>
       <dsp:txBody>
-        <a:bodyPr spcFirstLastPara="0" vert="horz" wrap="square" lIns="0" tIns="0" rIns="0" bIns="0" numCol="1" spcCol="1270" anchor="t" anchorCtr="0">
+        <a:bodyPr spcFirstLastPara="0" vert="horz" wrap="square" lIns="99060" tIns="99060" rIns="99060" bIns="99060" numCol="1" spcCol="1270" anchor="t" anchorCtr="0">
           <a:noAutofit/>
         </a:bodyPr>
         <a:lstStyle/>
         <a:p>
-          <a:pPr marL="0" lvl="0" indent="0" algn="ctr" defTabSz="577850">
+          <a:pPr marL="0" lvl="0" indent="0" algn="l" defTabSz="1155700">
             <a:lnSpc>
-              <a:spcPct val="100000"/>
+              <a:spcPct val="90000"/>
             </a:lnSpc>
             <a:spcBef>
               <a:spcPct val="0"/>
@@ -4321,90 +4021,73 @@
             <a:defRPr cap="all"/>
           </a:pPr>
           <a:r>
-            <a:rPr lang="en-US" sz="1300" kern="1200"/>
+            <a:rPr lang="en-US" sz="2600" kern="1200"/>
             <a:t>NLP &amp; Labels Preprocessing</a:t>
           </a:r>
         </a:p>
       </dsp:txBody>
       <dsp:txXfrm>
-        <a:off x="5742397" y="1186034"/>
-        <a:ext cx="1480078" cy="592031"/>
+        <a:off x="0" y="1685313"/>
+        <a:ext cx="7846501" cy="561610"/>
       </dsp:txXfrm>
     </dsp:sp>
-    <dsp:sp modelId="{95DDEBC6-7A78-4FB1-B086-9DA5D068570E}">
+    <dsp:sp modelId="{F9A18106-0726-4447-A05B-C2EF9665FCC7}">
       <dsp:nvSpPr>
         <dsp:cNvPr id="0" name=""/>
         <dsp:cNvSpPr/>
       </dsp:nvSpPr>
       <dsp:spPr>
         <a:xfrm>
-          <a:off x="7770104" y="1972"/>
-          <a:ext cx="902847" cy="902847"/>
+          <a:off x="0" y="2246923"/>
+          <a:ext cx="7846501" cy="0"/>
         </a:xfrm>
-        <a:prstGeom prst="ellipse">
+        <a:prstGeom prst="line">
           <a:avLst/>
         </a:prstGeom>
-        <a:solidFill>
-          <a:schemeClr val="accent1">
-            <a:tint val="40000"/>
-            <a:hueOff val="0"/>
-            <a:satOff val="0"/>
-            <a:lumOff val="0"/>
-            <a:alphaOff val="0"/>
-          </a:schemeClr>
-        </a:solidFill>
-        <a:ln>
-          <a:noFill/>
-        </a:ln>
-        <a:effectLst/>
-      </dsp:spPr>
-      <dsp:style>
-        <a:lnRef idx="0">
-          <a:scrgbClr r="0" g="0" b="0"/>
-        </a:lnRef>
-        <a:fillRef idx="1">
-          <a:scrgbClr r="0" g="0" b="0"/>
-        </a:fillRef>
-        <a:effectRef idx="0">
-          <a:scrgbClr r="0" g="0" b="0"/>
-        </a:effectRef>
-        <a:fontRef idx="minor"/>
-      </dsp:style>
-    </dsp:sp>
-    <dsp:sp modelId="{DC75B735-A84A-47B1-AFA4-01BDC4088474}">
-      <dsp:nvSpPr>
-        <dsp:cNvPr id="0" name=""/>
-        <dsp:cNvSpPr/>
-      </dsp:nvSpPr>
-      <dsp:spPr>
-        <a:xfrm>
-          <a:off x="7962514" y="194382"/>
-          <a:ext cx="518027" cy="518027"/>
-        </a:xfrm>
-        <a:prstGeom prst="rect">
-          <a:avLst/>
-        </a:prstGeom>
-        <a:blipFill>
-          <a:blip xmlns:r="http://schemas.openxmlformats.org/officeDocument/2006/relationships" r:embed="rId9">
-            <a:extLst>
-              <a:ext uri="{28A0092B-C50C-407E-A947-70E740481C1C}">
-                <a14:useLocalDpi xmlns:a14="http://schemas.microsoft.com/office/drawing/2010/main" val="0"/>
-              </a:ext>
-              <a:ext uri="{96DAC541-7B7A-43D3-8B79-37D633B846F1}">
-                <asvg:svgBlip xmlns:asvg="http://schemas.microsoft.com/office/drawing/2016/SVG/main" r:embed="rId10"/>
-              </a:ext>
-            </a:extLst>
-          </a:blip>
-          <a:stretch>
-            <a:fillRect/>
-          </a:stretch>
-        </a:blipFill>
-        <a:ln w="12700" cap="flat" cmpd="sng" algn="ctr">
+        <a:gradFill rotWithShape="0">
+          <a:gsLst>
+            <a:gs pos="0">
+              <a:schemeClr val="accent5">
+                <a:hueOff val="-13687456"/>
+                <a:satOff val="28620"/>
+                <a:lumOff val="2745"/>
+                <a:alphaOff val="0"/>
+                <a:satMod val="103000"/>
+                <a:lumMod val="102000"/>
+                <a:tint val="94000"/>
+              </a:schemeClr>
+            </a:gs>
+            <a:gs pos="50000">
+              <a:schemeClr val="accent5">
+                <a:hueOff val="-13687456"/>
+                <a:satOff val="28620"/>
+                <a:lumOff val="2745"/>
+                <a:alphaOff val="0"/>
+                <a:satMod val="110000"/>
+                <a:lumMod val="100000"/>
+                <a:shade val="100000"/>
+              </a:schemeClr>
+            </a:gs>
+            <a:gs pos="100000">
+              <a:schemeClr val="accent5">
+                <a:hueOff val="-13687456"/>
+                <a:satOff val="28620"/>
+                <a:lumOff val="2745"/>
+                <a:alphaOff val="0"/>
+                <a:lumMod val="99000"/>
+                <a:satMod val="120000"/>
+                <a:shade val="78000"/>
+              </a:schemeClr>
+            </a:gs>
+          </a:gsLst>
+          <a:lin ang="5400000" scaled="0"/>
+        </a:gradFill>
+        <a:ln w="6350" cap="flat" cmpd="sng" algn="ctr">
           <a:solidFill>
-            <a:schemeClr val="lt1">
-              <a:hueOff val="0"/>
-              <a:satOff val="0"/>
-              <a:lumOff val="0"/>
+            <a:schemeClr val="accent5">
+              <a:hueOff val="-13687456"/>
+              <a:satOff val="28620"/>
+              <a:lumOff val="2745"/>
               <a:alphaOff val="0"/>
             </a:schemeClr>
           </a:solidFill>
@@ -4414,13 +4097,13 @@
         <a:effectLst/>
       </dsp:spPr>
       <dsp:style>
-        <a:lnRef idx="2">
+        <a:lnRef idx="1">
           <a:scrgbClr r="0" g="0" b="0"/>
         </a:lnRef>
-        <a:fillRef idx="1">
+        <a:fillRef idx="3">
           <a:scrgbClr r="0" g="0" b="0"/>
         </a:fillRef>
-        <a:effectRef idx="0">
+        <a:effectRef idx="2">
           <a:scrgbClr r="0" g="0" b="0"/>
         </a:effectRef>
         <a:fontRef idx="minor">
@@ -4428,15 +4111,15 @@
         </a:fontRef>
       </dsp:style>
     </dsp:sp>
-    <dsp:sp modelId="{A97B7A72-CFA4-46D9-AFB7-85DBA1E200D3}">
+    <dsp:sp modelId="{77E6E2C3-79A5-B046-9BBB-BAA527100FB6}">
       <dsp:nvSpPr>
         <dsp:cNvPr id="0" name=""/>
         <dsp:cNvSpPr/>
       </dsp:nvSpPr>
       <dsp:spPr>
         <a:xfrm>
-          <a:off x="7481489" y="1186034"/>
-          <a:ext cx="1480078" cy="592031"/>
+          <a:off x="0" y="2246923"/>
+          <a:ext cx="7846501" cy="561610"/>
         </a:xfrm>
         <a:prstGeom prst="rect">
           <a:avLst/>
@@ -4460,14 +4143,14 @@
         <a:fontRef idx="minor"/>
       </dsp:style>
       <dsp:txBody>
-        <a:bodyPr spcFirstLastPara="0" vert="horz" wrap="square" lIns="0" tIns="0" rIns="0" bIns="0" numCol="1" spcCol="1270" anchor="t" anchorCtr="0">
+        <a:bodyPr spcFirstLastPara="0" vert="horz" wrap="square" lIns="99060" tIns="99060" rIns="99060" bIns="99060" numCol="1" spcCol="1270" anchor="t" anchorCtr="0">
           <a:noAutofit/>
         </a:bodyPr>
         <a:lstStyle/>
         <a:p>
-          <a:pPr marL="0" lvl="0" indent="0" algn="ctr" defTabSz="577850">
+          <a:pPr marL="0" lvl="0" indent="0" algn="l" defTabSz="1155700">
             <a:lnSpc>
-              <a:spcPct val="100000"/>
+              <a:spcPct val="90000"/>
             </a:lnSpc>
             <a:spcBef>
               <a:spcPct val="0"/>
@@ -4479,90 +4162,73 @@
             <a:defRPr cap="all"/>
           </a:pPr>
           <a:r>
-            <a:rPr lang="en-US" sz="1300" kern="1200"/>
+            <a:rPr lang="en-US" sz="2600" kern="1200"/>
             <a:t>Modelling</a:t>
           </a:r>
         </a:p>
       </dsp:txBody>
       <dsp:txXfrm>
-        <a:off x="7481489" y="1186034"/>
-        <a:ext cx="1480078" cy="592031"/>
+        <a:off x="0" y="2246923"/>
+        <a:ext cx="7846501" cy="561610"/>
       </dsp:txXfrm>
     </dsp:sp>
-    <dsp:sp modelId="{58F5ED13-A3F7-4ADF-927F-CA39F01553A9}">
+    <dsp:sp modelId="{8618B720-E39D-E447-8883-0F88EBBEE0D0}">
       <dsp:nvSpPr>
         <dsp:cNvPr id="0" name=""/>
         <dsp:cNvSpPr/>
       </dsp:nvSpPr>
       <dsp:spPr>
         <a:xfrm>
-          <a:off x="3422375" y="2148085"/>
-          <a:ext cx="902847" cy="902847"/>
+          <a:off x="0" y="2808534"/>
+          <a:ext cx="7846501" cy="0"/>
         </a:xfrm>
-        <a:prstGeom prst="ellipse">
+        <a:prstGeom prst="line">
           <a:avLst/>
         </a:prstGeom>
-        <a:solidFill>
-          <a:schemeClr val="accent1">
-            <a:tint val="40000"/>
-            <a:hueOff val="0"/>
-            <a:satOff val="0"/>
-            <a:lumOff val="0"/>
-            <a:alphaOff val="0"/>
-          </a:schemeClr>
-        </a:solidFill>
-        <a:ln>
-          <a:noFill/>
-        </a:ln>
-        <a:effectLst/>
-      </dsp:spPr>
-      <dsp:style>
-        <a:lnRef idx="0">
-          <a:scrgbClr r="0" g="0" b="0"/>
-        </a:lnRef>
-        <a:fillRef idx="1">
-          <a:scrgbClr r="0" g="0" b="0"/>
-        </a:fillRef>
-        <a:effectRef idx="0">
-          <a:scrgbClr r="0" g="0" b="0"/>
-        </a:effectRef>
-        <a:fontRef idx="minor"/>
-      </dsp:style>
-    </dsp:sp>
-    <dsp:sp modelId="{960A88A1-50CF-4CAD-8EF4-CDB36579BBF1}">
-      <dsp:nvSpPr>
-        <dsp:cNvPr id="0" name=""/>
-        <dsp:cNvSpPr/>
-      </dsp:nvSpPr>
-      <dsp:spPr>
-        <a:xfrm>
-          <a:off x="3614785" y="2340495"/>
-          <a:ext cx="518027" cy="518027"/>
-        </a:xfrm>
-        <a:prstGeom prst="rect">
-          <a:avLst/>
-        </a:prstGeom>
-        <a:blipFill>
-          <a:blip xmlns:r="http://schemas.openxmlformats.org/officeDocument/2006/relationships" r:embed="rId11">
-            <a:extLst>
-              <a:ext uri="{28A0092B-C50C-407E-A947-70E740481C1C}">
-                <a14:useLocalDpi xmlns:a14="http://schemas.microsoft.com/office/drawing/2010/main" val="0"/>
-              </a:ext>
-              <a:ext uri="{96DAC541-7B7A-43D3-8B79-37D633B846F1}">
-                <asvg:svgBlip xmlns:asvg="http://schemas.microsoft.com/office/drawing/2016/SVG/main" r:embed="rId12"/>
-              </a:ext>
-            </a:extLst>
-          </a:blip>
-          <a:stretch>
-            <a:fillRect/>
-          </a:stretch>
-        </a:blipFill>
-        <a:ln w="12700" cap="flat" cmpd="sng" algn="ctr">
+        <a:gradFill rotWithShape="0">
+          <a:gsLst>
+            <a:gs pos="0">
+              <a:schemeClr val="accent5">
+                <a:hueOff val="-17109320"/>
+                <a:satOff val="35775"/>
+                <a:lumOff val="3432"/>
+                <a:alphaOff val="0"/>
+                <a:satMod val="103000"/>
+                <a:lumMod val="102000"/>
+                <a:tint val="94000"/>
+              </a:schemeClr>
+            </a:gs>
+            <a:gs pos="50000">
+              <a:schemeClr val="accent5">
+                <a:hueOff val="-17109320"/>
+                <a:satOff val="35775"/>
+                <a:lumOff val="3432"/>
+                <a:alphaOff val="0"/>
+                <a:satMod val="110000"/>
+                <a:lumMod val="100000"/>
+                <a:shade val="100000"/>
+              </a:schemeClr>
+            </a:gs>
+            <a:gs pos="100000">
+              <a:schemeClr val="accent5">
+                <a:hueOff val="-17109320"/>
+                <a:satOff val="35775"/>
+                <a:lumOff val="3432"/>
+                <a:alphaOff val="0"/>
+                <a:lumMod val="99000"/>
+                <a:satMod val="120000"/>
+                <a:shade val="78000"/>
+              </a:schemeClr>
+            </a:gs>
+          </a:gsLst>
+          <a:lin ang="5400000" scaled="0"/>
+        </a:gradFill>
+        <a:ln w="6350" cap="flat" cmpd="sng" algn="ctr">
           <a:solidFill>
-            <a:schemeClr val="lt1">
-              <a:hueOff val="0"/>
-              <a:satOff val="0"/>
-              <a:lumOff val="0"/>
+            <a:schemeClr val="accent5">
+              <a:hueOff val="-17109320"/>
+              <a:satOff val="35775"/>
+              <a:lumOff val="3432"/>
               <a:alphaOff val="0"/>
             </a:schemeClr>
           </a:solidFill>
@@ -4572,13 +4238,13 @@
         <a:effectLst/>
       </dsp:spPr>
       <dsp:style>
-        <a:lnRef idx="2">
+        <a:lnRef idx="1">
           <a:scrgbClr r="0" g="0" b="0"/>
         </a:lnRef>
-        <a:fillRef idx="1">
+        <a:fillRef idx="3">
           <a:scrgbClr r="0" g="0" b="0"/>
         </a:fillRef>
-        <a:effectRef idx="0">
+        <a:effectRef idx="2">
           <a:scrgbClr r="0" g="0" b="0"/>
         </a:effectRef>
         <a:fontRef idx="minor">
@@ -4586,15 +4252,15 @@
         </a:fontRef>
       </dsp:style>
     </dsp:sp>
-    <dsp:sp modelId="{9CBFA9F2-F57F-4FB9-8F18-19E1CE5B0AA7}">
+    <dsp:sp modelId="{7502EBF9-1C77-AA44-9957-27A80BFC27C5}">
       <dsp:nvSpPr>
         <dsp:cNvPr id="0" name=""/>
         <dsp:cNvSpPr/>
       </dsp:nvSpPr>
       <dsp:spPr>
         <a:xfrm>
-          <a:off x="3133760" y="3332148"/>
-          <a:ext cx="1480078" cy="592031"/>
+          <a:off x="0" y="2808534"/>
+          <a:ext cx="7846501" cy="561610"/>
         </a:xfrm>
         <a:prstGeom prst="rect">
           <a:avLst/>
@@ -4618,14 +4284,14 @@
         <a:fontRef idx="minor"/>
       </dsp:style>
       <dsp:txBody>
-        <a:bodyPr spcFirstLastPara="0" vert="horz" wrap="square" lIns="0" tIns="0" rIns="0" bIns="0" numCol="1" spcCol="1270" anchor="t" anchorCtr="0">
+        <a:bodyPr spcFirstLastPara="0" vert="horz" wrap="square" lIns="99060" tIns="99060" rIns="99060" bIns="99060" numCol="1" spcCol="1270" anchor="t" anchorCtr="0">
           <a:noAutofit/>
         </a:bodyPr>
         <a:lstStyle/>
         <a:p>
-          <a:pPr marL="0" lvl="0" indent="0" algn="ctr" defTabSz="577850">
+          <a:pPr marL="0" lvl="0" indent="0" algn="l" defTabSz="1155700">
             <a:lnSpc>
-              <a:spcPct val="100000"/>
+              <a:spcPct val="90000"/>
             </a:lnSpc>
             <a:spcBef>
               <a:spcPct val="0"/>
@@ -4637,90 +4303,73 @@
             <a:defRPr cap="all"/>
           </a:pPr>
           <a:r>
-            <a:rPr lang="en-US" sz="1300" kern="1200"/>
+            <a:rPr lang="en-US" sz="2600" kern="1200"/>
             <a:t>Results</a:t>
           </a:r>
         </a:p>
       </dsp:txBody>
       <dsp:txXfrm>
-        <a:off x="3133760" y="3332148"/>
-        <a:ext cx="1480078" cy="592031"/>
+        <a:off x="0" y="2808534"/>
+        <a:ext cx="7846501" cy="561610"/>
       </dsp:txXfrm>
     </dsp:sp>
-    <dsp:sp modelId="{FBAFA1A7-9588-4EAA-9AC4-96AE829226C4}">
+    <dsp:sp modelId="{58785474-204E-4C49-92CA-784B66D2E897}">
       <dsp:nvSpPr>
         <dsp:cNvPr id="0" name=""/>
         <dsp:cNvSpPr/>
       </dsp:nvSpPr>
       <dsp:spPr>
         <a:xfrm>
-          <a:off x="5161467" y="2148085"/>
-          <a:ext cx="902847" cy="902847"/>
+          <a:off x="0" y="3370145"/>
+          <a:ext cx="7846501" cy="0"/>
         </a:xfrm>
-        <a:prstGeom prst="ellipse">
+        <a:prstGeom prst="line">
           <a:avLst/>
         </a:prstGeom>
-        <a:solidFill>
-          <a:schemeClr val="accent1">
-            <a:tint val="40000"/>
-            <a:hueOff val="0"/>
-            <a:satOff val="0"/>
-            <a:lumOff val="0"/>
-            <a:alphaOff val="0"/>
-          </a:schemeClr>
-        </a:solidFill>
-        <a:ln>
-          <a:noFill/>
-        </a:ln>
-        <a:effectLst/>
-      </dsp:spPr>
-      <dsp:style>
-        <a:lnRef idx="0">
-          <a:scrgbClr r="0" g="0" b="0"/>
-        </a:lnRef>
-        <a:fillRef idx="1">
-          <a:scrgbClr r="0" g="0" b="0"/>
-        </a:fillRef>
-        <a:effectRef idx="0">
-          <a:scrgbClr r="0" g="0" b="0"/>
-        </a:effectRef>
-        <a:fontRef idx="minor"/>
-      </dsp:style>
-    </dsp:sp>
-    <dsp:sp modelId="{9EADA870-72F4-4D39-AF6A-82F81DC7E3B7}">
-      <dsp:nvSpPr>
-        <dsp:cNvPr id="0" name=""/>
-        <dsp:cNvSpPr/>
-      </dsp:nvSpPr>
-      <dsp:spPr>
-        <a:xfrm>
-          <a:off x="5353877" y="2340495"/>
-          <a:ext cx="518027" cy="518027"/>
-        </a:xfrm>
-        <a:prstGeom prst="rect">
-          <a:avLst/>
-        </a:prstGeom>
-        <a:blipFill>
-          <a:blip xmlns:r="http://schemas.openxmlformats.org/officeDocument/2006/relationships" r:embed="rId13">
-            <a:extLst>
-              <a:ext uri="{28A0092B-C50C-407E-A947-70E740481C1C}">
-                <a14:useLocalDpi xmlns:a14="http://schemas.microsoft.com/office/drawing/2010/main" val="0"/>
-              </a:ext>
-              <a:ext uri="{96DAC541-7B7A-43D3-8B79-37D633B846F1}">
-                <asvg:svgBlip xmlns:asvg="http://schemas.microsoft.com/office/drawing/2016/SVG/main" r:embed="rId14"/>
-              </a:ext>
-            </a:extLst>
-          </a:blip>
-          <a:stretch>
-            <a:fillRect/>
-          </a:stretch>
-        </a:blipFill>
-        <a:ln w="12700" cap="flat" cmpd="sng" algn="ctr">
+        <a:gradFill rotWithShape="0">
+          <a:gsLst>
+            <a:gs pos="0">
+              <a:schemeClr val="accent5">
+                <a:hueOff val="-20531184"/>
+                <a:satOff val="42930"/>
+                <a:lumOff val="4118"/>
+                <a:alphaOff val="0"/>
+                <a:satMod val="103000"/>
+                <a:lumMod val="102000"/>
+                <a:tint val="94000"/>
+              </a:schemeClr>
+            </a:gs>
+            <a:gs pos="50000">
+              <a:schemeClr val="accent5">
+                <a:hueOff val="-20531184"/>
+                <a:satOff val="42930"/>
+                <a:lumOff val="4118"/>
+                <a:alphaOff val="0"/>
+                <a:satMod val="110000"/>
+                <a:lumMod val="100000"/>
+                <a:shade val="100000"/>
+              </a:schemeClr>
+            </a:gs>
+            <a:gs pos="100000">
+              <a:schemeClr val="accent5">
+                <a:hueOff val="-20531184"/>
+                <a:satOff val="42930"/>
+                <a:lumOff val="4118"/>
+                <a:alphaOff val="0"/>
+                <a:lumMod val="99000"/>
+                <a:satMod val="120000"/>
+                <a:shade val="78000"/>
+              </a:schemeClr>
+            </a:gs>
+          </a:gsLst>
+          <a:lin ang="5400000" scaled="0"/>
+        </a:gradFill>
+        <a:ln w="6350" cap="flat" cmpd="sng" algn="ctr">
           <a:solidFill>
-            <a:schemeClr val="lt1">
-              <a:hueOff val="0"/>
-              <a:satOff val="0"/>
-              <a:lumOff val="0"/>
+            <a:schemeClr val="accent5">
+              <a:hueOff val="-20531184"/>
+              <a:satOff val="42930"/>
+              <a:lumOff val="4118"/>
               <a:alphaOff val="0"/>
             </a:schemeClr>
           </a:solidFill>
@@ -4730,13 +4379,13 @@
         <a:effectLst/>
       </dsp:spPr>
       <dsp:style>
-        <a:lnRef idx="2">
+        <a:lnRef idx="1">
           <a:scrgbClr r="0" g="0" b="0"/>
         </a:lnRef>
-        <a:fillRef idx="1">
+        <a:fillRef idx="3">
           <a:scrgbClr r="0" g="0" b="0"/>
         </a:fillRef>
-        <a:effectRef idx="0">
+        <a:effectRef idx="2">
           <a:scrgbClr r="0" g="0" b="0"/>
         </a:effectRef>
         <a:fontRef idx="minor">
@@ -4744,15 +4393,15 @@
         </a:fontRef>
       </dsp:style>
     </dsp:sp>
-    <dsp:sp modelId="{F12AA22A-B1BF-4037-91A8-1FA70E50454A}">
+    <dsp:sp modelId="{B6D4D8ED-EE98-0D4C-9F8B-C9033D658274}">
       <dsp:nvSpPr>
         <dsp:cNvPr id="0" name=""/>
         <dsp:cNvSpPr/>
       </dsp:nvSpPr>
       <dsp:spPr>
         <a:xfrm>
-          <a:off x="4872851" y="3332148"/>
-          <a:ext cx="1480078" cy="592031"/>
+          <a:off x="0" y="3370145"/>
+          <a:ext cx="7846501" cy="561610"/>
         </a:xfrm>
         <a:prstGeom prst="rect">
           <a:avLst/>
@@ -4776,14 +4425,14 @@
         <a:fontRef idx="minor"/>
       </dsp:style>
       <dsp:txBody>
-        <a:bodyPr spcFirstLastPara="0" vert="horz" wrap="square" lIns="0" tIns="0" rIns="0" bIns="0" numCol="1" spcCol="1270" anchor="t" anchorCtr="0">
+        <a:bodyPr spcFirstLastPara="0" vert="horz" wrap="square" lIns="99060" tIns="99060" rIns="99060" bIns="99060" numCol="1" spcCol="1270" anchor="t" anchorCtr="0">
           <a:noAutofit/>
         </a:bodyPr>
         <a:lstStyle/>
         <a:p>
-          <a:pPr marL="0" lvl="0" indent="0" algn="ctr" defTabSz="577850">
+          <a:pPr marL="0" lvl="0" indent="0" algn="l" defTabSz="1155700">
             <a:lnSpc>
-              <a:spcPct val="100000"/>
+              <a:spcPct val="90000"/>
             </a:lnSpc>
             <a:spcBef>
               <a:spcPct val="0"/>
@@ -4795,14 +4444,14 @@
             <a:defRPr cap="all"/>
           </a:pPr>
           <a:r>
-            <a:rPr lang="en-US" sz="1300" kern="1200"/>
+            <a:rPr lang="en-US" sz="2600" kern="1200"/>
             <a:t>Limitations and Future Works</a:t>
           </a:r>
         </a:p>
       </dsp:txBody>
       <dsp:txXfrm>
-        <a:off x="4872851" y="3332148"/>
-        <a:ext cx="1480078" cy="592031"/>
+        <a:off x="0" y="3370145"/>
+        <a:ext cx="7846501" cy="561610"/>
       </dsp:txXfrm>
     </dsp:sp>
   </dsp:spTree>
@@ -5716,57 +5365,103 @@
 </file>
 
 <file path=ppt/diagrams/layout1.xml><?xml version="1.0" encoding="utf-8"?>
-<dgm:layoutDef xmlns:dgm="http://schemas.openxmlformats.org/drawingml/2006/diagram" xmlns:a="http://schemas.openxmlformats.org/drawingml/2006/main" uniqueId="urn:microsoft.com/office/officeart/2018/5/layout/IconCircleLabelList">
-  <dgm:title val="Icon Circle Label List"/>
-  <dgm:desc val="Use to show non-sequential or grouped chunks of information accompanied by a related visuals. Works best with icons or small pictures with short text captions."/>
+<dgm:layoutDef xmlns:dgm="http://schemas.openxmlformats.org/drawingml/2006/diagram" xmlns:a="http://schemas.openxmlformats.org/drawingml/2006/main" uniqueId="urn:microsoft.com/office/officeart/2008/layout/LinedList">
+  <dgm:title val=""/>
+  <dgm:desc val=""/>
   <dgm:catLst>
-    <dgm:cat type="icon" pri="500"/>
+    <dgm:cat type="hierarchy" pri="8000"/>
+    <dgm:cat type="list" pri="2500"/>
   </dgm:catLst>
-  <dgm:sampData useDef="1">
+  <dgm:sampData>
     <dgm:dataModel>
-      <dgm:ptLst/>
+      <dgm:ptLst>
+        <dgm:pt modelId="0" type="doc"/>
+        <dgm:pt modelId="1">
+          <dgm:prSet phldr="1"/>
+        </dgm:pt>
+        <dgm:pt modelId="11">
+          <dgm:prSet phldr="1"/>
+        </dgm:pt>
+        <dgm:pt modelId="12">
+          <dgm:prSet phldr="1"/>
+        </dgm:pt>
+        <dgm:pt modelId="13">
+          <dgm:prSet phldr="1"/>
+        </dgm:pt>
+      </dgm:ptLst>
+      <dgm:cxnLst>
+        <dgm:cxn modelId="2" srcId="0" destId="1" srcOrd="0" destOrd="0"/>
+        <dgm:cxn modelId="3" srcId="1" destId="11" srcOrd="0" destOrd="0"/>
+        <dgm:cxn modelId="4" srcId="1" destId="12" srcOrd="1" destOrd="0"/>
+        <dgm:cxn modelId="5" srcId="1" destId="13" srcOrd="2" destOrd="0"/>
+      </dgm:cxnLst>
       <dgm:bg/>
       <dgm:whole/>
     </dgm:dataModel>
   </dgm:sampData>
-  <dgm:styleData useDef="1">
+  <dgm:styleData>
     <dgm:dataModel>
-      <dgm:ptLst/>
+      <dgm:ptLst>
+        <dgm:pt modelId="0" type="doc"/>
+        <dgm:pt modelId="1">
+          <dgm:prSet phldr="1"/>
+        </dgm:pt>
+        <dgm:pt modelId="11">
+          <dgm:prSet phldr="1"/>
+        </dgm:pt>
+        <dgm:pt modelId="12">
+          <dgm:prSet phldr="1"/>
+        </dgm:pt>
+      </dgm:ptLst>
+      <dgm:cxnLst>
+        <dgm:cxn modelId="2" srcId="0" destId="1" srcOrd="0" destOrd="0"/>
+        <dgm:cxn modelId="3" srcId="1" destId="11" srcOrd="0" destOrd="0"/>
+        <dgm:cxn modelId="4" srcId="1" destId="12" srcOrd="1" destOrd="0"/>
+      </dgm:cxnLst>
       <dgm:bg/>
       <dgm:whole/>
     </dgm:dataModel>
   </dgm:styleData>
-  <dgm:clrData useDef="1">
+  <dgm:clrData>
     <dgm:dataModel>
-      <dgm:ptLst/>
+      <dgm:ptLst>
+        <dgm:pt modelId="0" type="doc"/>
+        <dgm:pt modelId="1">
+          <dgm:prSet phldr="1"/>
+        </dgm:pt>
+        <dgm:pt modelId="11">
+          <dgm:prSet phldr="1"/>
+        </dgm:pt>
+        <dgm:pt modelId="12">
+          <dgm:prSet phldr="1"/>
+        </dgm:pt>
+      </dgm:ptLst>
+      <dgm:cxnLst>
+        <dgm:cxn modelId="2" srcId="0" destId="1" srcOrd="0" destOrd="0"/>
+        <dgm:cxn modelId="3" srcId="1" destId="11" srcOrd="0" destOrd="0"/>
+        <dgm:cxn modelId="4" srcId="1" destId="12" srcOrd="1" destOrd="0"/>
+      </dgm:cxnLst>
       <dgm:bg/>
       <dgm:whole/>
     </dgm:dataModel>
   </dgm:clrData>
-  <dgm:layoutNode name="root">
+  <dgm:layoutNode name="vert0">
     <dgm:varLst>
       <dgm:dir/>
-      <dgm:resizeHandles val="exact"/>
+      <dgm:animOne val="branch"/>
+      <dgm:animLvl val="lvl"/>
     </dgm:varLst>
     <dgm:choose name="Name0">
-      <dgm:if name="Name1" axis="self" func="var" arg="dir" op="equ" val="norm">
-        <dgm:alg type="snake">
-          <dgm:param type="grDir" val="tL"/>
-          <dgm:param type="flowDir" val="row"/>
-          <dgm:param type="contDir" val="sameDir"/>
-          <dgm:param type="off" val="ctr"/>
-          <dgm:param type="vertAlign" val="mid"/>
-          <dgm:param type="horzAlign" val="ctr"/>
+      <dgm:if name="Name1" func="var" arg="dir" op="equ" val="norm">
+        <dgm:alg type="lin">
+          <dgm:param type="linDir" val="fromT"/>
+          <dgm:param type="nodeHorzAlign" val="l"/>
         </dgm:alg>
       </dgm:if>
       <dgm:else name="Name2">
-        <dgm:alg type="snake">
-          <dgm:param type="grDir" val="tR"/>
-          <dgm:param type="flowDir" val="row"/>
-          <dgm:param type="contDir" val="sameDir"/>
-          <dgm:param type="off" val="ctr"/>
-          <dgm:param type="vertAlign" val="mid"/>
-          <dgm:param type="horzAlign" val="ctr"/>
+        <dgm:alg type="lin">
+          <dgm:param type="linDir" val="fromT"/>
+          <dgm:param type="nodeHorzAlign" val="r"/>
         </dgm:alg>
       </dgm:else>
     </dgm:choose>
@@ -5774,159 +5469,364 @@
       <dgm:adjLst/>
     </dgm:shape>
     <dgm:presOf/>
-    <dgm:choose name="Name3">
-      <dgm:if name="Name4" axis="ch" ptType="node" func="cnt" op="lte" val="2">
-        <dgm:constrLst>
-          <dgm:constr type="h" for="ch" forName="compNode" refType="h" fact="0.4"/>
-          <dgm:constr type="w" for="ch" forName="compNode" val="100"/>
-          <dgm:constr type="w" for="ch" forName="sibTrans" refType="w" refFor="ch" refForName="compNode" fact="0.175"/>
-          <dgm:constr type="sp" refType="w" refFor="ch" refForName="compNode" op="equ" fact="0.25"/>
-          <dgm:constr type="primFontSz" for="des" ptType="node" op="equ" val="44"/>
-          <dgm:constr type="h" for="des" forName="compNode" op="equ"/>
-          <dgm:constr type="h" for="des" forName="textRect" op="equ"/>
-        </dgm:constrLst>
-      </dgm:if>
-      <dgm:if name="Name5" axis="ch" ptType="node" func="cnt" op="lte" val="3">
-        <dgm:constrLst>
-          <dgm:constr type="h" for="ch" forName="compNode" refType="h" fact="0.4"/>
-          <dgm:constr type="w" for="ch" forName="compNode" val="100"/>
-          <dgm:constr type="w" for="ch" forName="sibTrans" refType="w" refFor="ch" refForName="compNode" fact="0.175"/>
-          <dgm:constr type="sp" refType="w" refFor="ch" refForName="compNode" op="equ" fact="0.25"/>
-          <dgm:constr type="primFontSz" for="des" ptType="node" op="equ" val="40"/>
-          <dgm:constr type="h" for="des" forName="compNode" op="equ"/>
-          <dgm:constr type="h" for="des" forName="textRect" op="equ"/>
-        </dgm:constrLst>
-      </dgm:if>
-      <dgm:if name="Name6" axis="ch" ptType="node" func="cnt" op="lte" val="4">
-        <dgm:constrLst>
-          <dgm:constr type="h" for="ch" forName="compNode" refType="h" fact="0.4"/>
-          <dgm:constr type="w" for="ch" forName="compNode" refType="w"/>
-          <dgm:constr type="w" for="ch" forName="sibTrans" refType="w" refFor="ch" refForName="compNode" fact="0.175"/>
-          <dgm:constr type="sp" refType="w" refFor="ch" refForName="compNode" op="equ" fact="0.25"/>
-          <dgm:constr type="primFontSz" for="des" ptType="node" op="equ" val="32"/>
-          <dgm:constr type="h" for="des" forName="compNode" op="equ"/>
-          <dgm:constr type="h" for="des" forName="textRect" op="equ"/>
-        </dgm:constrLst>
-      </dgm:if>
-      <dgm:else name="Name7">
-        <dgm:constrLst>
-          <dgm:constr type="h" for="ch" forName="compNode" refType="h" fact="0.4"/>
-          <dgm:constr type="w" for="ch" forName="compNode" refType="w"/>
-          <dgm:constr type="w" for="ch" forName="sibTrans" refType="w" refFor="ch" refForName="compNode" fact="0.175"/>
-          <dgm:constr type="sp" refType="w" refFor="ch" refForName="compNode" op="equ" fact="0.25"/>
-          <dgm:constr type="primFontSz" for="des" ptType="node" op="equ" val="24"/>
-          <dgm:constr type="h" for="des" forName="compNode" op="equ"/>
-          <dgm:constr type="h" for="des" forName="textRect" op="equ"/>
-        </dgm:constrLst>
-      </dgm:else>
-    </dgm:choose>
-    <dgm:ruleLst>
-      <dgm:rule type="w" for="ch" forName="compNode" val="50" fact="NaN" max="NaN"/>
-    </dgm:ruleLst>
-    <dgm:forEach name="Name8" axis="ch" ptType="node">
-      <dgm:layoutNode name="compNode">
-        <dgm:alg type="composite"/>
+    <dgm:constrLst>
+      <dgm:constr type="w" for="ch" forName="horz1" refType="w"/>
+      <dgm:constr type="h" for="ch" forName="horz1" refType="h"/>
+      <dgm:constr type="h" for="des" forName="vert1" refType="h"/>
+      <dgm:constr type="h" for="des" forName="tx1" refType="h"/>
+      <dgm:constr type="h" for="des" forName="horz2" refType="h"/>
+      <dgm:constr type="h" for="des" forName="vert2" refType="h"/>
+      <dgm:constr type="h" for="des" forName="horz3" refType="h"/>
+      <dgm:constr type="h" for="des" forName="vert3" refType="h"/>
+      <dgm:constr type="h" for="des" forName="horz4" refType="h"/>
+      <dgm:constr type="h" for="des" ptType="node" refType="h"/>
+      <dgm:constr type="primFontSz" for="des" forName="tx1" op="equ" val="65"/>
+      <dgm:constr type="primFontSz" for="des" forName="tx2" op="equ" val="65"/>
+      <dgm:constr type="primFontSz" for="des" forName="tx3" op="equ" val="65"/>
+      <dgm:constr type="primFontSz" for="des" forName="tx4" op="equ" val="65"/>
+      <dgm:constr type="w" for="des" forName="thickLine" refType="w"/>
+      <dgm:constr type="h" for="des" forName="thickLine"/>
+      <dgm:constr type="h" for="des" forName="thinLine1"/>
+      <dgm:constr type="h" for="des" forName="thinLine2b"/>
+      <dgm:constr type="h" for="des" forName="thinLine3"/>
+      <dgm:constr type="h" for="des" forName="vertSpace2a" refType="h" fact="0.05"/>
+      <dgm:constr type="h" for="des" forName="vertSpace2b" refType="h" refFor="des" refForName="vertSpace2a"/>
+    </dgm:constrLst>
+    <dgm:forEach name="Name3" axis="ch" ptType="node">
+      <dgm:layoutNode name="thickLine" styleLbl="alignNode1">
+        <dgm:alg type="sp"/>
+        <dgm:shape xmlns:r="http://schemas.openxmlformats.org/officeDocument/2006/relationships" type="line" r:blip="">
+          <dgm:adjLst/>
+        </dgm:shape>
+        <dgm:presOf/>
+      </dgm:layoutNode>
+      <dgm:layoutNode name="horz1">
+        <dgm:choose name="Name4">
+          <dgm:if name="Name5" func="var" arg="dir" op="equ" val="norm">
+            <dgm:alg type="lin">
+              <dgm:param type="linDir" val="fromL"/>
+              <dgm:param type="nodeVertAlign" val="t"/>
+            </dgm:alg>
+          </dgm:if>
+          <dgm:else name="Name6">
+            <dgm:alg type="lin">
+              <dgm:param type="linDir" val="fromR"/>
+              <dgm:param type="nodeVertAlign" val="t"/>
+            </dgm:alg>
+          </dgm:else>
+        </dgm:choose>
         <dgm:shape xmlns:r="http://schemas.openxmlformats.org/officeDocument/2006/relationships" r:blip="">
           <dgm:adjLst/>
         </dgm:shape>
-        <dgm:presOf axis="self"/>
-        <dgm:constrLst>
-          <dgm:constr type="w" for="ch" forName="iconBgRect" refType="w" fact="0.61"/>
-          <dgm:constr type="h" for="ch" forName="iconBgRect" refType="w" refFor="ch" refForName="iconBgRect"/>
-          <dgm:constr type="t" for="ch" forName="iconBgRect"/>
-          <dgm:constr type="ctrX" for="ch" forName="iconBgRect" refType="w" fact="0.5"/>
-          <dgm:constr type="w" for="ch" forName="iconRect" refType="w" fact="0.35"/>
-          <dgm:constr type="h" for="ch" forName="iconRect" refType="w" refFor="ch" refForName="iconRect"/>
-          <dgm:constr type="ctrX" for="ch" forName="iconRect" refType="ctrX" refFor="ch" refForName="iconBgRect"/>
-          <dgm:constr type="ctrY" for="ch" forName="iconRect" refType="ctrY" refFor="ch" refForName="iconBgRect"/>
-          <dgm:constr type="h" for="ch" forName="spaceRect" refType="w" fact="0.19"/>
-          <dgm:constr type="w" for="ch" forName="spaceRect" refType="w"/>
-          <dgm:constr type="l" for="ch" forName="spaceRect"/>
-          <dgm:constr type="t" for="ch" forName="spaceRect" refType="b" refFor="ch" refForName="iconBgRect"/>
-          <dgm:constr type="h" for="ch" forName="textRect" val="20"/>
-          <dgm:constr type="w" for="ch" forName="textRect" refType="w"/>
-          <dgm:constr type="l" for="ch" forName="textRect"/>
-          <dgm:constr type="t" for="ch" forName="textRect" refType="b" refFor="ch" refForName="spaceRect"/>
-        </dgm:constrLst>
-        <dgm:ruleLst>
-          <dgm:rule type="h" val="INF" fact="NaN" max="NaN"/>
-        </dgm:ruleLst>
-        <dgm:layoutNode name="iconBgRect" styleLbl="bgShp">
-          <dgm:alg type="sp"/>
-          <dgm:shape xmlns:r="http://schemas.openxmlformats.org/officeDocument/2006/relationships" type="ellipse" r:blip="">
-            <dgm:adjLst/>
-          </dgm:shape>
-          <dgm:presOf/>
-          <dgm:constrLst/>
-          <dgm:ruleLst/>
-        </dgm:layoutNode>
-        <dgm:layoutNode name="iconRect" styleLbl="node1">
-          <dgm:alg type="sp"/>
-          <dgm:shape xmlns:r="http://schemas.openxmlformats.org/officeDocument/2006/relationships" type="rect" r:blip="" blipPhldr="1">
-            <dgm:adjLst/>
-          </dgm:shape>
-          <dgm:presOf/>
-          <dgm:constrLst/>
-          <dgm:ruleLst/>
-        </dgm:layoutNode>
-        <dgm:layoutNode name="spaceRect">
-          <dgm:alg type="sp"/>
-          <dgm:shape xmlns:r="http://schemas.openxmlformats.org/officeDocument/2006/relationships" r:blip="">
-            <dgm:adjLst/>
-          </dgm:shape>
-          <dgm:presOf/>
-          <dgm:constrLst/>
-          <dgm:ruleLst/>
-        </dgm:layoutNode>
-        <dgm:layoutNode name="textRect" styleLbl="revTx">
-          <dgm:varLst>
-            <dgm:chMax val="1"/>
-            <dgm:chPref val="1"/>
-          </dgm:varLst>
+        <dgm:presOf/>
+        <dgm:choose name="Name7">
+          <dgm:if name="Name8" axis="root des" func="maxDepth" op="equ" val="1">
+            <dgm:constrLst>
+              <dgm:constr type="w" for="ch" forName="tx1" refType="w"/>
+            </dgm:constrLst>
+          </dgm:if>
+          <dgm:if name="Name9" axis="root des" func="maxDepth" op="equ" val="2">
+            <dgm:constrLst>
+              <dgm:constr type="w" for="ch" forName="tx1" refType="w" fact="0.2"/>
+              <dgm:constr type="w" for="des" forName="tx2" refType="w" fact="0.785"/>
+              <dgm:constr type="w" for="des" forName="horzSpace2" refType="w" fact="0.015"/>
+              <dgm:constr type="w" for="des" forName="thinLine2b" refType="w" fact="0.8"/>
+            </dgm:constrLst>
+          </dgm:if>
+          <dgm:if name="Name10" axis="root des" func="maxDepth" op="equ" val="3">
+            <dgm:constrLst>
+              <dgm:constr type="w" for="ch" forName="tx1" refType="w" fact="0.2"/>
+              <dgm:constr type="w" for="des" forName="tx2" refType="w" fact="0.385"/>
+              <dgm:constr type="w" for="des" forName="tx3" refType="w" fact="0.385"/>
+              <dgm:constr type="w" for="des" forName="horzSpace2" refType="w" fact="0.015"/>
+              <dgm:constr type="w" for="des" forName="horzSpace3" refType="w" fact="0.015"/>
+              <dgm:constr type="w" for="des" forName="thinLine2b" refType="w" fact="0.8"/>
+              <dgm:constr type="w" for="des" forName="thinLine3" refType="w" fact="0.385"/>
+            </dgm:constrLst>
+          </dgm:if>
+          <dgm:if name="Name11" axis="root des" func="maxDepth" op="gte" val="4">
+            <dgm:constrLst>
+              <dgm:constr type="w" for="ch" forName="tx1" refType="w" fact="0.2"/>
+              <dgm:constr type="w" for="des" forName="tx2" refType="w" fact="0.2516"/>
+              <dgm:constr type="w" for="des" forName="tx3" refType="w" fact="0.2516"/>
+              <dgm:constr type="w" for="des" forName="tx4" refType="w" fact="0.2516"/>
+              <dgm:constr type="w" for="des" forName="horzSpace2" refType="w" fact="0.015"/>
+              <dgm:constr type="w" for="des" forName="horzSpace3" refType="w" fact="0.015"/>
+              <dgm:constr type="w" for="des" forName="horzSpace4" refType="w" fact="0.015"/>
+              <dgm:constr type="w" for="des" forName="thinLine2b" refType="w" fact="0.8"/>
+              <dgm:constr type="w" for="des" forName="thinLine3" refType="w" fact="0.5332"/>
+            </dgm:constrLst>
+          </dgm:if>
+          <dgm:else name="Name12"/>
+        </dgm:choose>
+        <dgm:layoutNode name="tx1" styleLbl="revTx">
           <dgm:alg type="tx">
+            <dgm:param type="parTxLTRAlign" val="l"/>
+            <dgm:param type="parTxRTLAlign" val="r"/>
             <dgm:param type="txAnchorVert" val="t"/>
           </dgm:alg>
           <dgm:shape xmlns:r="http://schemas.openxmlformats.org/officeDocument/2006/relationships" type="rect" r:blip="">
             <dgm:adjLst/>
           </dgm:shape>
-          <dgm:presOf axis="self" ptType="node"/>
+          <dgm:presOf axis="self"/>
           <dgm:constrLst>
-            <dgm:constr type="lMarg"/>
-            <dgm:constr type="rMarg"/>
-            <dgm:constr type="tMarg"/>
-            <dgm:constr type="bMarg"/>
+            <dgm:constr type="tMarg" refType="primFontSz" fact="0.3"/>
+            <dgm:constr type="bMarg" refType="primFontSz" fact="0.3"/>
+            <dgm:constr type="lMarg" refType="primFontSz" fact="0.3"/>
+            <dgm:constr type="rMarg" refType="primFontSz" fact="0.3"/>
           </dgm:constrLst>
           <dgm:ruleLst>
-            <dgm:rule type="primFontSz" val="11" fact="NaN" max="NaN"/>
-            <dgm:rule type="h" val="INF" fact="NaN" max="NaN"/>
+            <dgm:rule type="primFontSz" val="5" fact="NaN" max="NaN"/>
           </dgm:ruleLst>
         </dgm:layoutNode>
-      </dgm:layoutNode>
-      <dgm:forEach name="Name9" axis="followSib" ptType="sibTrans" cnt="1">
-        <dgm:layoutNode name="sibTrans">
-          <dgm:alg type="sp"/>
+        <dgm:layoutNode name="vert1">
+          <dgm:choose name="Name13">
+            <dgm:if name="Name14" func="var" arg="dir" op="equ" val="norm">
+              <dgm:alg type="lin">
+                <dgm:param type="linDir" val="fromT"/>
+                <dgm:param type="nodeHorzAlign" val="l"/>
+              </dgm:alg>
+            </dgm:if>
+            <dgm:else name="Name15">
+              <dgm:alg type="lin">
+                <dgm:param type="linDir" val="fromT"/>
+                <dgm:param type="nodeHorzAlign" val="r"/>
+              </dgm:alg>
+            </dgm:else>
+          </dgm:choose>
           <dgm:shape xmlns:r="http://schemas.openxmlformats.org/officeDocument/2006/relationships" r:blip="">
             <dgm:adjLst/>
           </dgm:shape>
-          <dgm:presOf axis="self"/>
-          <dgm:constrLst/>
-          <dgm:ruleLst/>
+          <dgm:presOf/>
+          <dgm:forEach name="Name16" axis="ch" ptType="node">
+            <dgm:choose name="Name17">
+              <dgm:if name="Name18" axis="self" ptType="node" func="pos" op="equ" val="1">
+                <dgm:layoutNode name="vertSpace2a">
+                  <dgm:alg type="sp"/>
+                  <dgm:shape xmlns:r="http://schemas.openxmlformats.org/officeDocument/2006/relationships" r:blip="">
+                    <dgm:adjLst/>
+                  </dgm:shape>
+                  <dgm:presOf/>
+                </dgm:layoutNode>
+              </dgm:if>
+              <dgm:else name="Name19"/>
+            </dgm:choose>
+            <dgm:layoutNode name="horz2">
+              <dgm:choose name="Name20">
+                <dgm:if name="Name21" func="var" arg="dir" op="equ" val="norm">
+                  <dgm:alg type="lin">
+                    <dgm:param type="linDir" val="fromL"/>
+                    <dgm:param type="nodeVertAlign" val="t"/>
+                  </dgm:alg>
+                </dgm:if>
+                <dgm:else name="Name22">
+                  <dgm:alg type="lin">
+                    <dgm:param type="linDir" val="fromR"/>
+                    <dgm:param type="nodeVertAlign" val="t"/>
+                  </dgm:alg>
+                </dgm:else>
+              </dgm:choose>
+              <dgm:shape xmlns:r="http://schemas.openxmlformats.org/officeDocument/2006/relationships" r:blip="">
+                <dgm:adjLst/>
+              </dgm:shape>
+              <dgm:presOf/>
+              <dgm:layoutNode name="horzSpace2">
+                <dgm:alg type="sp"/>
+                <dgm:shape xmlns:r="http://schemas.openxmlformats.org/officeDocument/2006/relationships" r:blip="">
+                  <dgm:adjLst/>
+                </dgm:shape>
+                <dgm:presOf/>
+              </dgm:layoutNode>
+              <dgm:layoutNode name="tx2" styleLbl="revTx">
+                <dgm:alg type="tx">
+                  <dgm:param type="parTxLTRAlign" val="l"/>
+                  <dgm:param type="parTxRTLAlign" val="r"/>
+                  <dgm:param type="txAnchorVert" val="t"/>
+                </dgm:alg>
+                <dgm:shape xmlns:r="http://schemas.openxmlformats.org/officeDocument/2006/relationships" type="rect" r:blip="">
+                  <dgm:adjLst/>
+                </dgm:shape>
+                <dgm:presOf axis="self"/>
+                <dgm:constrLst>
+                  <dgm:constr type="tMarg" refType="primFontSz" fact="0.3"/>
+                  <dgm:constr type="bMarg" refType="primFontSz" fact="0.3"/>
+                  <dgm:constr type="lMarg" refType="primFontSz" fact="0.3"/>
+                  <dgm:constr type="rMarg" refType="primFontSz" fact="0.3"/>
+                </dgm:constrLst>
+                <dgm:ruleLst>
+                  <dgm:rule type="primFontSz" val="5" fact="NaN" max="NaN"/>
+                </dgm:ruleLst>
+              </dgm:layoutNode>
+              <dgm:layoutNode name="vert2">
+                <dgm:choose name="Name23">
+                  <dgm:if name="Name24" func="var" arg="dir" op="equ" val="norm">
+                    <dgm:alg type="lin">
+                      <dgm:param type="linDir" val="fromT"/>
+                      <dgm:param type="nodeHorzAlign" val="l"/>
+                    </dgm:alg>
+                  </dgm:if>
+                  <dgm:else name="Name25">
+                    <dgm:alg type="lin">
+                      <dgm:param type="linDir" val="fromT"/>
+                      <dgm:param type="nodeHorzAlign" val="r"/>
+                    </dgm:alg>
+                  </dgm:else>
+                </dgm:choose>
+                <dgm:shape xmlns:r="http://schemas.openxmlformats.org/officeDocument/2006/relationships" r:blip="">
+                  <dgm:adjLst/>
+                </dgm:shape>
+                <dgm:presOf/>
+                <dgm:forEach name="Name26" axis="ch" ptType="node">
+                  <dgm:layoutNode name="horz3">
+                    <dgm:choose name="Name27">
+                      <dgm:if name="Name28" func="var" arg="dir" op="equ" val="norm">
+                        <dgm:alg type="lin">
+                          <dgm:param type="linDir" val="fromL"/>
+                          <dgm:param type="nodeVertAlign" val="t"/>
+                        </dgm:alg>
+                      </dgm:if>
+                      <dgm:else name="Name29">
+                        <dgm:alg type="lin">
+                          <dgm:param type="linDir" val="fromR"/>
+                          <dgm:param type="nodeVertAlign" val="t"/>
+                        </dgm:alg>
+                      </dgm:else>
+                    </dgm:choose>
+                    <dgm:shape xmlns:r="http://schemas.openxmlformats.org/officeDocument/2006/relationships" r:blip="">
+                      <dgm:adjLst/>
+                    </dgm:shape>
+                    <dgm:presOf/>
+                    <dgm:layoutNode name="horzSpace3">
+                      <dgm:alg type="sp"/>
+                      <dgm:shape xmlns:r="http://schemas.openxmlformats.org/officeDocument/2006/relationships" r:blip="">
+                        <dgm:adjLst/>
+                      </dgm:shape>
+                      <dgm:presOf/>
+                    </dgm:layoutNode>
+                    <dgm:layoutNode name="tx3" styleLbl="revTx">
+                      <dgm:alg type="tx">
+                        <dgm:param type="parTxLTRAlign" val="l"/>
+                        <dgm:param type="parTxRTLAlign" val="r"/>
+                        <dgm:param type="txAnchorVert" val="t"/>
+                      </dgm:alg>
+                      <dgm:shape xmlns:r="http://schemas.openxmlformats.org/officeDocument/2006/relationships" type="rect" r:blip="">
+                        <dgm:adjLst/>
+                      </dgm:shape>
+                      <dgm:presOf axis="self"/>
+                      <dgm:constrLst>
+                        <dgm:constr type="tMarg" refType="primFontSz" fact="0.3"/>
+                        <dgm:constr type="bMarg" refType="primFontSz" fact="0.3"/>
+                        <dgm:constr type="lMarg" refType="primFontSz" fact="0.3"/>
+                        <dgm:constr type="rMarg" refType="primFontSz" fact="0.3"/>
+                      </dgm:constrLst>
+                      <dgm:ruleLst>
+                        <dgm:rule type="primFontSz" val="5" fact="NaN" max="NaN"/>
+                      </dgm:ruleLst>
+                    </dgm:layoutNode>
+                    <dgm:layoutNode name="vert3">
+                      <dgm:choose name="Name30">
+                        <dgm:if name="Name31" func="var" arg="dir" op="equ" val="norm">
+                          <dgm:alg type="lin">
+                            <dgm:param type="linDir" val="fromT"/>
+                            <dgm:param type="nodeHorzAlign" val="l"/>
+                          </dgm:alg>
+                        </dgm:if>
+                        <dgm:else name="Name32">
+                          <dgm:alg type="lin">
+                            <dgm:param type="linDir" val="fromT"/>
+                            <dgm:param type="nodeHorzAlign" val="r"/>
+                          </dgm:alg>
+                        </dgm:else>
+                      </dgm:choose>
+                      <dgm:shape xmlns:r="http://schemas.openxmlformats.org/officeDocument/2006/relationships" r:blip="">
+                        <dgm:adjLst/>
+                      </dgm:shape>
+                      <dgm:presOf/>
+                      <dgm:forEach name="Name33" axis="ch" ptType="node">
+                        <dgm:layoutNode name="horz4">
+                          <dgm:choose name="Name34">
+                            <dgm:if name="Name35" func="var" arg="dir" op="equ" val="norm">
+                              <dgm:alg type="lin">
+                                <dgm:param type="linDir" val="fromL"/>
+                                <dgm:param type="nodeVertAlign" val="t"/>
+                              </dgm:alg>
+                            </dgm:if>
+                            <dgm:else name="Name36">
+                              <dgm:alg type="lin">
+                                <dgm:param type="linDir" val="fromR"/>
+                                <dgm:param type="nodeVertAlign" val="t"/>
+                              </dgm:alg>
+                            </dgm:else>
+                          </dgm:choose>
+                          <dgm:shape xmlns:r="http://schemas.openxmlformats.org/officeDocument/2006/relationships" r:blip="">
+                            <dgm:adjLst/>
+                          </dgm:shape>
+                          <dgm:presOf/>
+                          <dgm:layoutNode name="horzSpace4">
+                            <dgm:alg type="sp"/>
+                            <dgm:shape xmlns:r="http://schemas.openxmlformats.org/officeDocument/2006/relationships" r:blip="">
+                              <dgm:adjLst/>
+                            </dgm:shape>
+                            <dgm:presOf/>
+                          </dgm:layoutNode>
+                          <dgm:layoutNode name="tx4" styleLbl="revTx">
+                            <dgm:varLst>
+                              <dgm:bulletEnabled val="1"/>
+                            </dgm:varLst>
+                            <dgm:alg type="tx">
+                              <dgm:param type="parTxLTRAlign" val="l"/>
+                              <dgm:param type="parTxRTLAlign" val="r"/>
+                              <dgm:param type="txAnchorVert" val="t"/>
+                            </dgm:alg>
+                            <dgm:shape xmlns:r="http://schemas.openxmlformats.org/officeDocument/2006/relationships" type="rect" r:blip="">
+                              <dgm:adjLst/>
+                            </dgm:shape>
+                            <dgm:presOf axis="desOrSelf" ptType="node"/>
+                            <dgm:constrLst>
+                              <dgm:constr type="tMarg" refType="primFontSz" fact="0.3"/>
+                              <dgm:constr type="bMarg" refType="primFontSz" fact="0.3"/>
+                              <dgm:constr type="lMarg" refType="primFontSz" fact="0.3"/>
+                              <dgm:constr type="rMarg" refType="primFontSz" fact="0.3"/>
+                            </dgm:constrLst>
+                            <dgm:ruleLst>
+                              <dgm:rule type="primFontSz" val="5" fact="NaN" max="NaN"/>
+                            </dgm:ruleLst>
+                          </dgm:layoutNode>
+                        </dgm:layoutNode>
+                      </dgm:forEach>
+                    </dgm:layoutNode>
+                  </dgm:layoutNode>
+                  <dgm:forEach name="Name37" axis="followSib" ptType="sibTrans" cnt="1">
+                    <dgm:layoutNode name="thinLine3" styleLbl="callout">
+                      <dgm:alg type="sp"/>
+                      <dgm:shape xmlns:r="http://schemas.openxmlformats.org/officeDocument/2006/relationships" type="line" r:blip="">
+                        <dgm:adjLst/>
+                      </dgm:shape>
+                      <dgm:presOf/>
+                    </dgm:layoutNode>
+                  </dgm:forEach>
+                </dgm:forEach>
+              </dgm:layoutNode>
+            </dgm:layoutNode>
+            <dgm:layoutNode name="thinLine2b" styleLbl="callout">
+              <dgm:alg type="sp"/>
+              <dgm:shape xmlns:r="http://schemas.openxmlformats.org/officeDocument/2006/relationships" type="line" r:blip="">
+                <dgm:adjLst/>
+              </dgm:shape>
+              <dgm:presOf/>
+            </dgm:layoutNode>
+            <dgm:layoutNode name="vertSpace2b">
+              <dgm:alg type="sp"/>
+              <dgm:shape xmlns:r="http://schemas.openxmlformats.org/officeDocument/2006/relationships" r:blip="">
+                <dgm:adjLst/>
+              </dgm:shape>
+              <dgm:presOf/>
+            </dgm:layoutNode>
+          </dgm:forEach>
         </dgm:layoutNode>
-      </dgm:forEach>
+      </dgm:layoutNode>
     </dgm:forEach>
   </dgm:layoutNode>
-  <dgm:extLst>
-    <a:ext uri="{68A01E43-0DF5-4B5B-8FA6-DAF915123BFB}">
-      <dgm1612:lstStyle xmlns:dgm1612="http://schemas.microsoft.com/office/drawing/2016/12/diagram">
-        <a:lvl1pPr>
-          <a:lnSpc>
-            <a:spcPct val="100000"/>
-          </a:lnSpc>
-          <a:defRPr cap="all"/>
-        </a:lvl1pPr>
-      </dgm1612:lstStyle>
-    </a:ext>
-  </dgm:extLst>
 </dgm:layoutDef>
 </file>
 
@@ -6788,11 +6688,11 @@
 </file>
 
 <file path=ppt/diagrams/quickStyle1.xml><?xml version="1.0" encoding="utf-8"?>
-<dgm:styleDef xmlns:dgm="http://schemas.openxmlformats.org/drawingml/2006/diagram" xmlns:a="http://schemas.openxmlformats.org/drawingml/2006/main" uniqueId="urn:microsoft.com/office/officeart/2005/8/quickstyle/simple1">
+<dgm:styleDef xmlns:dgm="http://schemas.openxmlformats.org/drawingml/2006/diagram" xmlns:a="http://schemas.openxmlformats.org/drawingml/2006/main" uniqueId="urn:microsoft.com/office/officeart/2005/8/quickstyle/simple4">
   <dgm:title val=""/>
   <dgm:desc val=""/>
   <dgm:catLst>
-    <dgm:cat type="simple" pri="10100"/>
+    <dgm:cat type="simple" pri="10400"/>
   </dgm:catLst>
   <dgm:scene3d>
     <a:camera prst="orthographicFront"/>
@@ -6806,13 +6706,13 @@
     <dgm:sp3d/>
     <dgm:txPr/>
     <dgm:style>
-      <a:lnRef idx="2">
+      <a:lnRef idx="0">
         <a:scrgbClr r="0" g="0" b="0"/>
       </a:lnRef>
-      <a:fillRef idx="1">
+      <a:fillRef idx="3">
         <a:scrgbClr r="0" g="0" b="0"/>
       </a:fillRef>
-      <a:effectRef idx="0">
+      <a:effectRef idx="2">
         <a:scrgbClr r="0" g="0" b="0"/>
       </a:effectRef>
       <a:fontRef idx="minor">
@@ -6828,13 +6728,13 @@
     <dgm:sp3d/>
     <dgm:txPr/>
     <dgm:style>
-      <a:lnRef idx="2">
+      <a:lnRef idx="1">
         <a:scrgbClr r="0" g="0" b="0"/>
       </a:lnRef>
-      <a:fillRef idx="1">
+      <a:fillRef idx="3">
         <a:scrgbClr r="0" g="0" b="0"/>
       </a:fillRef>
-      <a:effectRef idx="0">
+      <a:effectRef idx="2">
         <a:scrgbClr r="0" g="0" b="0"/>
       </a:effectRef>
       <a:fontRef idx="minor">
@@ -6850,10 +6750,10 @@
     <dgm:sp3d/>
     <dgm:txPr/>
     <dgm:style>
-      <a:lnRef idx="2">
+      <a:lnRef idx="0">
         <a:scrgbClr r="0" g="0" b="0"/>
       </a:lnRef>
-      <a:fillRef idx="1">
+      <a:fillRef idx="3">
         <a:scrgbClr r="0" g="0" b="0"/>
       </a:fillRef>
       <a:effectRef idx="0">
@@ -6872,13 +6772,13 @@
     <dgm:sp3d/>
     <dgm:txPr/>
     <dgm:style>
-      <a:lnRef idx="2">
+      <a:lnRef idx="1">
         <a:scrgbClr r="0" g="0" b="0"/>
       </a:lnRef>
-      <a:fillRef idx="1">
+      <a:fillRef idx="3">
         <a:scrgbClr r="0" g="0" b="0"/>
       </a:fillRef>
-      <a:effectRef idx="0">
+      <a:effectRef idx="2">
         <a:scrgbClr r="0" g="0" b="0"/>
       </a:effectRef>
       <a:fontRef idx="minor">
@@ -6894,13 +6794,13 @@
     <dgm:sp3d/>
     <dgm:txPr/>
     <dgm:style>
-      <a:lnRef idx="2">
+      <a:lnRef idx="0">
         <a:scrgbClr r="0" g="0" b="0"/>
       </a:lnRef>
-      <a:fillRef idx="1">
+      <a:fillRef idx="3">
         <a:scrgbClr r="0" g="0" b="0"/>
       </a:fillRef>
-      <a:effectRef idx="0">
+      <a:effectRef idx="2">
         <a:scrgbClr r="0" g="0" b="0"/>
       </a:effectRef>
       <a:fontRef idx="minor">
@@ -6916,13 +6816,13 @@
     <dgm:sp3d/>
     <dgm:txPr/>
     <dgm:style>
-      <a:lnRef idx="2">
+      <a:lnRef idx="0">
         <a:scrgbClr r="0" g="0" b="0"/>
       </a:lnRef>
-      <a:fillRef idx="1">
+      <a:fillRef idx="3">
         <a:scrgbClr r="0" g="0" b="0"/>
       </a:fillRef>
-      <a:effectRef idx="0">
+      <a:effectRef idx="2">
         <a:scrgbClr r="0" g="0" b="0"/>
       </a:effectRef>
       <a:fontRef idx="minor">
@@ -6938,13 +6838,13 @@
     <dgm:sp3d/>
     <dgm:txPr/>
     <dgm:style>
-      <a:lnRef idx="2">
+      <a:lnRef idx="0">
         <a:scrgbClr r="0" g="0" b="0"/>
       </a:lnRef>
-      <a:fillRef idx="1">
+      <a:fillRef idx="3">
         <a:scrgbClr r="0" g="0" b="0"/>
       </a:fillRef>
-      <a:effectRef idx="0">
+      <a:effectRef idx="2">
         <a:scrgbClr r="0" g="0" b="0"/>
       </a:effectRef>
       <a:fontRef idx="minor">
@@ -6960,13 +6860,13 @@
     <dgm:sp3d/>
     <dgm:txPr/>
     <dgm:style>
-      <a:lnRef idx="2">
+      <a:lnRef idx="0">
         <a:scrgbClr r="0" g="0" b="0"/>
       </a:lnRef>
-      <a:fillRef idx="1">
+      <a:fillRef idx="3">
         <a:scrgbClr r="0" g="0" b="0"/>
       </a:fillRef>
-      <a:effectRef idx="0">
+      <a:effectRef idx="2">
         <a:scrgbClr r="0" g="0" b="0"/>
       </a:effectRef>
       <a:fontRef idx="minor">
@@ -6982,13 +6882,13 @@
     <dgm:sp3d/>
     <dgm:txPr/>
     <dgm:style>
-      <a:lnRef idx="2">
+      <a:lnRef idx="0">
         <a:scrgbClr r="0" g="0" b="0"/>
       </a:lnRef>
       <a:fillRef idx="1">
         <a:scrgbClr r="0" g="0" b="0"/>
       </a:fillRef>
-      <a:effectRef idx="0">
+      <a:effectRef idx="2">
         <a:scrgbClr r="0" g="0" b="0"/>
       </a:effectRef>
       <a:fontRef idx="minor"/>
@@ -7002,13 +6902,13 @@
     <dgm:sp3d/>
     <dgm:txPr/>
     <dgm:style>
-      <a:lnRef idx="2">
+      <a:lnRef idx="0">
         <a:scrgbClr r="0" g="0" b="0"/>
       </a:lnRef>
       <a:fillRef idx="1">
         <a:scrgbClr r="0" g="0" b="0"/>
       </a:fillRef>
-      <a:effectRef idx="0">
+      <a:effectRef idx="2">
         <a:scrgbClr r="0" g="0" b="0"/>
       </a:effectRef>
       <a:fontRef idx="minor"/>
@@ -7022,13 +6922,13 @@
     <dgm:sp3d/>
     <dgm:txPr/>
     <dgm:style>
-      <a:lnRef idx="2">
+      <a:lnRef idx="0">
         <a:scrgbClr r="0" g="0" b="0"/>
       </a:lnRef>
       <a:fillRef idx="1">
         <a:scrgbClr r="0" g="0" b="0"/>
       </a:fillRef>
-      <a:effectRef idx="0">
+      <a:effectRef idx="2">
         <a:scrgbClr r="0" g="0" b="0"/>
       </a:effectRef>
       <a:fontRef idx="minor"/>
@@ -7045,10 +6945,10 @@
       <a:lnRef idx="0">
         <a:scrgbClr r="0" g="0" b="0"/>
       </a:lnRef>
-      <a:fillRef idx="1">
+      <a:fillRef idx="3">
         <a:scrgbClr r="0" g="0" b="0"/>
       </a:fillRef>
-      <a:effectRef idx="0">
+      <a:effectRef idx="2">
         <a:scrgbClr r="0" g="0" b="0"/>
       </a:effectRef>
       <a:fontRef idx="minor">
@@ -7067,10 +6967,10 @@
       <a:lnRef idx="0">
         <a:scrgbClr r="0" g="0" b="0"/>
       </a:lnRef>
-      <a:fillRef idx="1">
+      <a:fillRef idx="3">
         <a:scrgbClr r="0" g="0" b="0"/>
       </a:fillRef>
-      <a:effectRef idx="0">
+      <a:effectRef idx="2">
         <a:scrgbClr r="0" g="0" b="0"/>
       </a:effectRef>
       <a:fontRef idx="minor">
@@ -7089,10 +6989,10 @@
       <a:lnRef idx="0">
         <a:scrgbClr r="0" g="0" b="0"/>
       </a:lnRef>
-      <a:fillRef idx="1">
+      <a:fillRef idx="3">
         <a:scrgbClr r="0" g="0" b="0"/>
       </a:fillRef>
-      <a:effectRef idx="0">
+      <a:effectRef idx="2">
         <a:scrgbClr r="0" g="0" b="0"/>
       </a:effectRef>
       <a:fontRef idx="minor">
@@ -7134,7 +7034,7 @@
       <a:fillRef idx="1">
         <a:scrgbClr r="0" g="0" b="0"/>
       </a:fillRef>
-      <a:effectRef idx="0">
+      <a:effectRef idx="1">
         <a:scrgbClr r="0" g="0" b="0"/>
       </a:effectRef>
       <a:fontRef idx="minor"/>
@@ -7148,13 +7048,13 @@
     <dgm:sp3d/>
     <dgm:txPr/>
     <dgm:style>
-      <a:lnRef idx="2">
+      <a:lnRef idx="0">
         <a:scrgbClr r="0" g="0" b="0"/>
       </a:lnRef>
-      <a:fillRef idx="1">
+      <a:fillRef idx="3">
         <a:scrgbClr r="0" g="0" b="0"/>
       </a:fillRef>
-      <a:effectRef idx="0">
+      <a:effectRef idx="2">
         <a:scrgbClr r="0" g="0" b="0"/>
       </a:effectRef>
       <a:fontRef idx="minor">
@@ -7170,13 +7070,13 @@
     <dgm:sp3d/>
     <dgm:txPr/>
     <dgm:style>
-      <a:lnRef idx="2">
+      <a:lnRef idx="0">
         <a:scrgbClr r="0" g="0" b="0"/>
       </a:lnRef>
-      <a:fillRef idx="1">
+      <a:fillRef idx="3">
         <a:scrgbClr r="0" g="0" b="0"/>
       </a:fillRef>
-      <a:effectRef idx="0">
+      <a:effectRef idx="2">
         <a:scrgbClr r="0" g="0" b="0"/>
       </a:effectRef>
       <a:fontRef idx="minor">
@@ -7192,13 +7092,13 @@
     <dgm:sp3d/>
     <dgm:txPr/>
     <dgm:style>
-      <a:lnRef idx="2">
+      <a:lnRef idx="0">
         <a:scrgbClr r="0" g="0" b="0"/>
       </a:lnRef>
-      <a:fillRef idx="1">
+      <a:fillRef idx="3">
         <a:scrgbClr r="0" g="0" b="0"/>
       </a:fillRef>
-      <a:effectRef idx="0">
+      <a:effectRef idx="2">
         <a:scrgbClr r="0" g="0" b="0"/>
       </a:effectRef>
       <a:fontRef idx="minor">
@@ -7214,13 +7114,13 @@
     <dgm:sp3d/>
     <dgm:txPr/>
     <dgm:style>
-      <a:lnRef idx="2">
+      <a:lnRef idx="0">
         <a:scrgbClr r="0" g="0" b="0"/>
       </a:lnRef>
-      <a:fillRef idx="1">
+      <a:fillRef idx="3">
         <a:scrgbClr r="0" g="0" b="0"/>
       </a:fillRef>
-      <a:effectRef idx="0">
+      <a:effectRef idx="2">
         <a:scrgbClr r="0" g="0" b="0"/>
       </a:effectRef>
       <a:fontRef idx="minor">
@@ -7236,13 +7136,13 @@
     <dgm:sp3d/>
     <dgm:txPr/>
     <dgm:style>
-      <a:lnRef idx="2">
+      <a:lnRef idx="0">
         <a:scrgbClr r="0" g="0" b="0"/>
       </a:lnRef>
-      <a:fillRef idx="1">
+      <a:fillRef idx="3">
         <a:scrgbClr r="0" g="0" b="0"/>
       </a:fillRef>
-      <a:effectRef idx="0">
+      <a:effectRef idx="2">
         <a:scrgbClr r="0" g="0" b="0"/>
       </a:effectRef>
       <a:fontRef idx="minor">
@@ -7258,13 +7158,13 @@
     <dgm:sp3d/>
     <dgm:txPr/>
     <dgm:style>
-      <a:lnRef idx="2">
+      <a:lnRef idx="0">
         <a:scrgbClr r="0" g="0" b="0"/>
       </a:lnRef>
-      <a:fillRef idx="1">
+      <a:fillRef idx="3">
         <a:scrgbClr r="0" g="0" b="0"/>
       </a:fillRef>
-      <a:effectRef idx="0">
+      <a:effectRef idx="2">
         <a:scrgbClr r="0" g="0" b="0"/>
       </a:effectRef>
       <a:fontRef idx="minor">
@@ -7280,13 +7180,13 @@
     <dgm:sp3d/>
     <dgm:txPr/>
     <dgm:style>
-      <a:lnRef idx="2">
+      <a:lnRef idx="0">
         <a:scrgbClr r="0" g="0" b="0"/>
       </a:lnRef>
-      <a:fillRef idx="1">
+      <a:fillRef idx="3">
         <a:scrgbClr r="0" g="0" b="0"/>
       </a:fillRef>
-      <a:effectRef idx="0">
+      <a:effectRef idx="2">
         <a:scrgbClr r="0" g="0" b="0"/>
       </a:effectRef>
       <a:fontRef idx="minor">
@@ -7302,13 +7202,13 @@
     <dgm:sp3d/>
     <dgm:txPr/>
     <dgm:style>
-      <a:lnRef idx="2">
+      <a:lnRef idx="1">
         <a:scrgbClr r="0" g="0" b="0"/>
       </a:lnRef>
-      <a:fillRef idx="1">
+      <a:fillRef idx="3">
         <a:scrgbClr r="0" g="0" b="0"/>
       </a:fillRef>
-      <a:effectRef idx="0">
+      <a:effectRef idx="2">
         <a:scrgbClr r="0" g="0" b="0"/>
       </a:effectRef>
       <a:fontRef idx="minor">
@@ -7324,13 +7224,13 @@
     <dgm:sp3d/>
     <dgm:txPr/>
     <dgm:style>
-      <a:lnRef idx="2">
+      <a:lnRef idx="1">
         <a:scrgbClr r="0" g="0" b="0"/>
       </a:lnRef>
-      <a:fillRef idx="1">
+      <a:fillRef idx="3">
         <a:scrgbClr r="0" g="0" b="0"/>
       </a:fillRef>
-      <a:effectRef idx="0">
+      <a:effectRef idx="2">
         <a:scrgbClr r="0" g="0" b="0"/>
       </a:effectRef>
       <a:fontRef idx="minor">
@@ -7346,7 +7246,7 @@
     <dgm:sp3d/>
     <dgm:txPr/>
     <dgm:style>
-      <a:lnRef idx="2">
+      <a:lnRef idx="1">
         <a:scrgbClr r="0" g="0" b="0"/>
       </a:lnRef>
       <a:fillRef idx="0">
@@ -7366,7 +7266,7 @@
     <dgm:sp3d/>
     <dgm:txPr/>
     <dgm:style>
-      <a:lnRef idx="2">
+      <a:lnRef idx="1">
         <a:scrgbClr r="0" g="0" b="0"/>
       </a:lnRef>
       <a:fillRef idx="0">
@@ -7386,7 +7286,7 @@
     <dgm:sp3d/>
     <dgm:txPr/>
     <dgm:style>
-      <a:lnRef idx="2">
+      <a:lnRef idx="1">
         <a:scrgbClr r="0" g="0" b="0"/>
       </a:lnRef>
       <a:fillRef idx="0">
@@ -7406,7 +7306,7 @@
     <dgm:sp3d/>
     <dgm:txPr/>
     <dgm:style>
-      <a:lnRef idx="2">
+      <a:lnRef idx="1">
         <a:scrgbClr r="0" g="0" b="0"/>
       </a:lnRef>
       <a:fillRef idx="0">
@@ -7426,7 +7326,7 @@
     <dgm:sp3d/>
     <dgm:txPr/>
     <dgm:style>
-      <a:lnRef idx="2">
+      <a:lnRef idx="1">
         <a:scrgbClr r="0" g="0" b="0"/>
       </a:lnRef>
       <a:fillRef idx="1">
@@ -7446,7 +7346,7 @@
     <dgm:sp3d/>
     <dgm:txPr/>
     <dgm:style>
-      <a:lnRef idx="2">
+      <a:lnRef idx="1">
         <a:scrgbClr r="0" g="0" b="0"/>
       </a:lnRef>
       <a:fillRef idx="1">
@@ -7466,7 +7366,7 @@
     <dgm:sp3d/>
     <dgm:txPr/>
     <dgm:style>
-      <a:lnRef idx="2">
+      <a:lnRef idx="1">
         <a:scrgbClr r="0" g="0" b="0"/>
       </a:lnRef>
       <a:fillRef idx="1">
@@ -7506,7 +7406,7 @@
     <dgm:sp3d/>
     <dgm:txPr/>
     <dgm:style>
-      <a:lnRef idx="2">
+      <a:lnRef idx="1">
         <a:scrgbClr r="0" g="0" b="0"/>
       </a:lnRef>
       <a:fillRef idx="1">
@@ -7526,7 +7426,7 @@
     <dgm:sp3d/>
     <dgm:txPr/>
     <dgm:style>
-      <a:lnRef idx="2">
+      <a:lnRef idx="1">
         <a:scrgbClr r="0" g="0" b="0"/>
       </a:lnRef>
       <a:fillRef idx="1">
@@ -7546,7 +7446,7 @@
     <dgm:sp3d/>
     <dgm:txPr/>
     <dgm:style>
-      <a:lnRef idx="2">
+      <a:lnRef idx="1">
         <a:scrgbClr r="0" g="0" b="0"/>
       </a:lnRef>
       <a:fillRef idx="1">
@@ -7566,7 +7466,7 @@
     <dgm:sp3d/>
     <dgm:txPr/>
     <dgm:style>
-      <a:lnRef idx="2">
+      <a:lnRef idx="1">
         <a:scrgbClr r="0" g="0" b="0"/>
       </a:lnRef>
       <a:fillRef idx="1">
@@ -7586,7 +7486,7 @@
     <dgm:sp3d/>
     <dgm:txPr/>
     <dgm:style>
-      <a:lnRef idx="2">
+      <a:lnRef idx="1">
         <a:scrgbClr r="0" g="0" b="0"/>
       </a:lnRef>
       <a:fillRef idx="1">
@@ -7606,7 +7506,7 @@
     <dgm:sp3d/>
     <dgm:txPr/>
     <dgm:style>
-      <a:lnRef idx="2">
+      <a:lnRef idx="1">
         <a:scrgbClr r="0" g="0" b="0"/>
       </a:lnRef>
       <a:fillRef idx="1">
@@ -7626,7 +7526,7 @@
     <dgm:sp3d/>
     <dgm:txPr/>
     <dgm:style>
-      <a:lnRef idx="2">
+      <a:lnRef idx="1">
         <a:scrgbClr r="0" g="0" b="0"/>
       </a:lnRef>
       <a:fillRef idx="1">
@@ -7646,7 +7546,7 @@
     <dgm:sp3d/>
     <dgm:txPr/>
     <dgm:style>
-      <a:lnRef idx="2">
+      <a:lnRef idx="1">
         <a:scrgbClr r="0" g="0" b="0"/>
       </a:lnRef>
       <a:fillRef idx="1">
@@ -7666,7 +7566,7 @@
     <dgm:sp3d/>
     <dgm:txPr/>
     <dgm:style>
-      <a:lnRef idx="2">
+      <a:lnRef idx="1">
         <a:scrgbClr r="0" g="0" b="0"/>
       </a:lnRef>
       <a:fillRef idx="1">
@@ -7686,7 +7586,7 @@
     <dgm:sp3d/>
     <dgm:txPr/>
     <dgm:style>
-      <a:lnRef idx="2">
+      <a:lnRef idx="1">
         <a:scrgbClr r="0" g="0" b="0"/>
       </a:lnRef>
       <a:fillRef idx="1">
@@ -7706,7 +7606,7 @@
     <dgm:sp3d/>
     <dgm:txPr/>
     <dgm:style>
-      <a:lnRef idx="2">
+      <a:lnRef idx="1">
         <a:scrgbClr r="0" g="0" b="0"/>
       </a:lnRef>
       <a:fillRef idx="1">
@@ -7732,7 +7632,7 @@
       <a:fillRef idx="1">
         <a:scrgbClr r="0" g="0" b="0"/>
       </a:fillRef>
-      <a:effectRef idx="0">
+      <a:effectRef idx="2">
         <a:scrgbClr r="0" g="0" b="0"/>
       </a:effectRef>
       <a:fontRef idx="minor"/>
@@ -7752,7 +7652,7 @@
       <a:fillRef idx="1">
         <a:scrgbClr r="0" g="0" b="0"/>
       </a:fillRef>
-      <a:effectRef idx="0">
+      <a:effectRef idx="2">
         <a:scrgbClr r="0" g="0" b="0"/>
       </a:effectRef>
       <a:fontRef idx="minor"/>
@@ -7786,13 +7686,13 @@
     <dgm:sp3d/>
     <dgm:txPr/>
     <dgm:style>
-      <a:lnRef idx="2">
+      <a:lnRef idx="0">
         <a:scrgbClr r="0" g="0" b="0"/>
       </a:lnRef>
-      <a:fillRef idx="1">
+      <a:fillRef idx="3">
         <a:scrgbClr r="0" g="0" b="0"/>
       </a:fillRef>
-      <a:effectRef idx="0">
+      <a:effectRef idx="2">
         <a:scrgbClr r="0" g="0" b="0"/>
       </a:effectRef>
       <a:fontRef idx="minor"/>
@@ -18891,6 +18791,14 @@
 <file path=ppt/slides/slide3.xml><?xml version="1.0" encoding="utf-8"?>
 <p:sld xmlns:a="http://schemas.openxmlformats.org/drawingml/2006/main" xmlns:r="http://schemas.openxmlformats.org/officeDocument/2006/relationships" xmlns:p="http://schemas.openxmlformats.org/presentationml/2006/main">
   <p:cSld>
+    <p:bg>
+      <p:bgPr>
+        <a:solidFill>
+          <a:schemeClr val="bg1"/>
+        </a:solidFill>
+        <a:effectLst/>
+      </p:bgPr>
+    </p:bg>
     <p:spTree>
       <p:nvGrpSpPr>
         <p:cNvPr id="1" name=""/>
@@ -18905,6 +18813,159 @@
           <a:chExt cx="0" cy="0"/>
         </a:xfrm>
       </p:grpSpPr>
+      <p:sp useBgFill="1">
+        <p:nvSpPr>
+          <p:cNvPr id="12" name="Rectangle 11">
+            <a:extLst>
+              <a:ext uri="{FF2B5EF4-FFF2-40B4-BE49-F238E27FC236}">
+                <a16:creationId xmlns:a16="http://schemas.microsoft.com/office/drawing/2014/main" id="{23BB7E73-E730-42EA-AACE-D1E323EA547E}"/>
+              </a:ext>
+              <a:ext uri="{C183D7F6-B498-43B3-948B-1728B52AA6E4}">
+                <adec:decorative xmlns:adec="http://schemas.microsoft.com/office/drawing/2017/decorative" val="1"/>
+              </a:ext>
+            </a:extLst>
+          </p:cNvPr>
+          <p:cNvSpPr>
+            <a:spLocks noGrp="1" noRot="1" noChangeAspect="1" noMove="1" noResize="1" noEditPoints="1" noAdjustHandles="1" noChangeArrowheads="1" noChangeShapeType="1" noTextEdit="1"/>
+          </p:cNvSpPr>
+          <p:nvPr>
+            <p:extLst>
+              <p:ext uri="{386F3935-93C4-4BCD-93E2-E3B085C9AB24}">
+                <p16:designElem xmlns:p16="http://schemas.microsoft.com/office/powerpoint/2015/main" val="1"/>
+              </p:ext>
+            </p:extLst>
+          </p:nvPr>
+        </p:nvSpPr>
+        <p:spPr>
+          <a:xfrm>
+            <a:off x="0" y="0"/>
+            <a:ext cx="12188952" cy="6858000"/>
+          </a:xfrm>
+          <a:prstGeom prst="rect">
+            <a:avLst/>
+          </a:prstGeom>
+          <a:ln>
+            <a:noFill/>
+          </a:ln>
+        </p:spPr>
+        <p:style>
+          <a:lnRef idx="2">
+            <a:schemeClr val="accent1">
+              <a:shade val="50000"/>
+            </a:schemeClr>
+          </a:lnRef>
+          <a:fillRef idx="1">
+            <a:schemeClr val="accent1"/>
+          </a:fillRef>
+          <a:effectRef idx="0">
+            <a:schemeClr val="accent1"/>
+          </a:effectRef>
+          <a:fontRef idx="minor">
+            <a:schemeClr val="lt1"/>
+          </a:fontRef>
+        </p:style>
+        <p:txBody>
+          <a:bodyPr rtlCol="0" anchor="ctr"/>
+          <a:lstStyle/>
+          <a:p>
+            <a:pPr algn="ctr"/>
+            <a:endParaRPr lang="en-US"/>
+          </a:p>
+        </p:txBody>
+      </p:sp>
+      <p:sp>
+        <p:nvSpPr>
+          <p:cNvPr id="14" name="Rectangle 13">
+            <a:extLst>
+              <a:ext uri="{FF2B5EF4-FFF2-40B4-BE49-F238E27FC236}">
+                <a16:creationId xmlns:a16="http://schemas.microsoft.com/office/drawing/2014/main" id="{F1F6C2E9-B316-4410-88E5-74F044FC3575}"/>
+              </a:ext>
+              <a:ext uri="{C183D7F6-B498-43B3-948B-1728B52AA6E4}">
+                <adec:decorative xmlns:adec="http://schemas.microsoft.com/office/drawing/2017/decorative" val="1"/>
+              </a:ext>
+            </a:extLst>
+          </p:cNvPr>
+          <p:cNvSpPr>
+            <a:spLocks noGrp="1" noRot="1" noChangeAspect="1" noMove="1" noResize="1" noEditPoints="1" noAdjustHandles="1" noChangeArrowheads="1" noChangeShapeType="1" noTextEdit="1"/>
+          </p:cNvSpPr>
+          <p:nvPr>
+            <p:extLst>
+              <p:ext uri="{386F3935-93C4-4BCD-93E2-E3B085C9AB24}">
+                <p16:designElem xmlns:p16="http://schemas.microsoft.com/office/powerpoint/2015/main" val="1"/>
+              </p:ext>
+            </p:extLst>
+          </p:nvPr>
+        </p:nvSpPr>
+        <p:spPr>
+          <a:xfrm>
+            <a:off x="9421301" y="565153"/>
+            <a:ext cx="2770699" cy="6292847"/>
+          </a:xfrm>
+          <a:prstGeom prst="rect">
+            <a:avLst/>
+          </a:prstGeom>
+          <a:gradFill flip="none" rotWithShape="1">
+            <a:gsLst>
+              <a:gs pos="0">
+                <a:schemeClr val="accent1">
+                  <a:alpha val="50000"/>
+                </a:schemeClr>
+              </a:gs>
+              <a:gs pos="81000">
+                <a:schemeClr val="accent4">
+                  <a:alpha val="50000"/>
+                </a:schemeClr>
+              </a:gs>
+              <a:gs pos="25000">
+                <a:schemeClr val="accent2">
+                  <a:alpha val="60000"/>
+                </a:schemeClr>
+              </a:gs>
+              <a:gs pos="50000">
+                <a:schemeClr val="accent3">
+                  <a:alpha val="55000"/>
+                </a:schemeClr>
+              </a:gs>
+              <a:gs pos="99000">
+                <a:schemeClr val="accent5">
+                  <a:alpha val="50000"/>
+                </a:schemeClr>
+              </a:gs>
+            </a:gsLst>
+            <a:path path="circle">
+              <a:fillToRect r="100000" b="100000"/>
+            </a:path>
+            <a:tileRect l="-100000" t="-100000"/>
+          </a:gradFill>
+          <a:ln>
+            <a:noFill/>
+          </a:ln>
+        </p:spPr>
+        <p:style>
+          <a:lnRef idx="2">
+            <a:schemeClr val="accent1">
+              <a:shade val="50000"/>
+            </a:schemeClr>
+          </a:lnRef>
+          <a:fillRef idx="1">
+            <a:schemeClr val="accent1"/>
+          </a:fillRef>
+          <a:effectRef idx="0">
+            <a:schemeClr val="accent1"/>
+          </a:effectRef>
+          <a:fontRef idx="minor">
+            <a:schemeClr val="lt1"/>
+          </a:fontRef>
+        </p:style>
+        <p:txBody>
+          <a:bodyPr rtlCol="0" anchor="ctr"/>
+          <a:lstStyle/>
+          <a:p>
+            <a:pPr algn="ctr"/>
+            <a:endParaRPr lang="en-US"/>
+          </a:p>
+        </p:txBody>
+      </p:sp>
       <p:sp>
         <p:nvSpPr>
           <p:cNvPr id="2" name="Title 1">
@@ -18921,9 +18982,16 @@
             <p:ph type="title"/>
           </p:nvPr>
         </p:nvSpPr>
-        <p:spPr/>
+        <p:spPr>
+          <a:xfrm>
+            <a:off x="1117601" y="455362"/>
+            <a:ext cx="7846501" cy="1550419"/>
+          </a:xfrm>
+        </p:spPr>
         <p:txBody>
-          <a:bodyPr/>
+          <a:bodyPr>
+            <a:normAutofit/>
+          </a:bodyPr>
           <a:lstStyle/>
           <a:p>
             <a:r>
@@ -18933,6 +19001,99 @@
           </a:p>
         </p:txBody>
       </p:sp>
+      <p:sp>
+        <p:nvSpPr>
+          <p:cNvPr id="16" name="Rectangle 15">
+            <a:extLst>
+              <a:ext uri="{FF2B5EF4-FFF2-40B4-BE49-F238E27FC236}">
+                <a16:creationId xmlns:a16="http://schemas.microsoft.com/office/drawing/2014/main" id="{83D07262-43A6-451F-9B19-77B943C6399D}"/>
+              </a:ext>
+              <a:ext uri="{C183D7F6-B498-43B3-948B-1728B52AA6E4}">
+                <adec:decorative xmlns:adec="http://schemas.microsoft.com/office/drawing/2017/decorative" val="1"/>
+              </a:ext>
+            </a:extLst>
+          </p:cNvPr>
+          <p:cNvSpPr>
+            <a:spLocks noGrp="1" noRot="1" noChangeAspect="1" noMove="1" noResize="1" noEditPoints="1" noAdjustHandles="1" noChangeArrowheads="1" noChangeShapeType="1" noTextEdit="1"/>
+          </p:cNvSpPr>
+          <p:nvPr>
+            <p:extLst>
+              <p:ext uri="{386F3935-93C4-4BCD-93E2-E3B085C9AB24}">
+                <p16:designElem xmlns:p16="http://schemas.microsoft.com/office/powerpoint/2015/main" val="1"/>
+              </p:ext>
+            </p:extLst>
+          </p:nvPr>
+        </p:nvSpPr>
+        <p:spPr>
+          <a:xfrm>
+            <a:off x="9990007" y="1"/>
+            <a:ext cx="2201993" cy="6857999"/>
+          </a:xfrm>
+          <a:prstGeom prst="rect">
+            <a:avLst/>
+          </a:prstGeom>
+          <a:gradFill flip="none" rotWithShape="1">
+            <a:gsLst>
+              <a:gs pos="0">
+                <a:schemeClr val="accent1">
+                  <a:alpha val="50000"/>
+                </a:schemeClr>
+              </a:gs>
+              <a:gs pos="81000">
+                <a:schemeClr val="accent4">
+                  <a:alpha val="50000"/>
+                </a:schemeClr>
+              </a:gs>
+              <a:gs pos="25000">
+                <a:schemeClr val="accent2">
+                  <a:alpha val="60000"/>
+                </a:schemeClr>
+              </a:gs>
+              <a:gs pos="49000">
+                <a:schemeClr val="accent3">
+                  <a:alpha val="55000"/>
+                </a:schemeClr>
+              </a:gs>
+              <a:gs pos="99000">
+                <a:schemeClr val="accent5">
+                  <a:alpha val="50000"/>
+                </a:schemeClr>
+              </a:gs>
+            </a:gsLst>
+            <a:path path="circle">
+              <a:fillToRect r="100000" b="100000"/>
+            </a:path>
+            <a:tileRect l="-100000" t="-100000"/>
+          </a:gradFill>
+          <a:ln>
+            <a:noFill/>
+          </a:ln>
+        </p:spPr>
+        <p:style>
+          <a:lnRef idx="2">
+            <a:schemeClr val="accent1">
+              <a:shade val="50000"/>
+            </a:schemeClr>
+          </a:lnRef>
+          <a:fillRef idx="1">
+            <a:schemeClr val="accent1"/>
+          </a:fillRef>
+          <a:effectRef idx="0">
+            <a:schemeClr val="accent1"/>
+          </a:effectRef>
+          <a:fontRef idx="minor">
+            <a:schemeClr val="lt1"/>
+          </a:fontRef>
+        </p:style>
+        <p:txBody>
+          <a:bodyPr rtlCol="0" anchor="ctr"/>
+          <a:lstStyle/>
+          <a:p>
+            <a:pPr algn="ctr"/>
+            <a:endParaRPr lang="en-US"/>
+          </a:p>
+        </p:txBody>
+      </p:sp>
       <p:graphicFrame>
         <p:nvGraphicFramePr>
           <p:cNvPr id="7" name="Content Placeholder 2">
@@ -18947,11 +19108,16 @@
           </p:cNvGraphicFramePr>
           <p:nvPr>
             <p:ph idx="1"/>
+            <p:extLst>
+              <p:ext uri="{D42A27DB-BD31-4B8C-83A1-F6EECF244321}">
+                <p14:modId xmlns:p14="http://schemas.microsoft.com/office/powerpoint/2010/main" val="2891714315"/>
+              </p:ext>
+            </p:extLst>
           </p:nvPr>
         </p:nvGraphicFramePr>
         <p:xfrm>
-          <a:off x="1587710" y="2160016"/>
-          <a:ext cx="9486690" cy="3926152"/>
+          <a:off x="1117601" y="2160588"/>
+          <a:ext cx="7846501" cy="3932237"/>
         </p:xfrm>
         <a:graphic>
           <a:graphicData uri="http://schemas.openxmlformats.org/drawingml/2006/diagram">

</xml_diff>